<commit_message>
Motivation-ish slides and random graph background slides.
</commit_message>
<xml_diff>
--- a/documents/PopeMartinGraphTheoryPresentation.pptx
+++ b/documents/PopeMartinGraphTheoryPresentation.pptx
@@ -5,14 +5,23 @@
     <p:sldMasterId id="2147483648" r:id="rId1"/>
   </p:sldMasterIdLst>
   <p:notesMasterIdLst>
-    <p:notesMasterId r:id="rId4"/>
+    <p:notesMasterId r:id="rId13"/>
   </p:notesMasterIdLst>
   <p:handoutMasterIdLst>
-    <p:handoutMasterId r:id="rId5"/>
+    <p:handoutMasterId r:id="rId14"/>
   </p:handoutMasterIdLst>
   <p:sldIdLst>
     <p:sldId id="256" r:id="rId2"/>
     <p:sldId id="257" r:id="rId3"/>
+    <p:sldId id="259" r:id="rId4"/>
+    <p:sldId id="258" r:id="rId5"/>
+    <p:sldId id="270" r:id="rId6"/>
+    <p:sldId id="269" r:id="rId7"/>
+    <p:sldId id="260" r:id="rId8"/>
+    <p:sldId id="265" r:id="rId9"/>
+    <p:sldId id="266" r:id="rId10"/>
+    <p:sldId id="267" r:id="rId11"/>
+    <p:sldId id="268" r:id="rId12"/>
   </p:sldIdLst>
   <p:sldSz cx="9144000" cy="6858000" type="screen4x3"/>
   <p:notesSz cx="6858000" cy="9144000"/>
@@ -197,7 +206,7 @@
             <a:fld id="{1A3E7708-B72C-7D4F-874D-E4F747318BE7}" type="datetimeFigureOut">
               <a:rPr lang="en-US" smtClean="0"/>
               <a:pPr/>
-              <a:t>2/24/11</a:t>
+              <a:t>5/7/2014</a:t>
             </a:fld>
             <a:endParaRPr lang="en-US"/>
           </a:p>
@@ -365,7 +374,7 @@
             <a:fld id="{D859A437-E9EA-CA40-B494-753BD8954286}" type="datetimeFigureOut">
               <a:rPr lang="en-US" smtClean="0"/>
               <a:pPr/>
-              <a:t>2/24/11</a:t>
+              <a:t>5/7/2014</a:t>
             </a:fld>
             <a:endParaRPr lang="en-US"/>
           </a:p>
@@ -2883,7 +2892,7 @@
             </a:lvl1pPr>
           </a:lstStyle>
           <a:p>
-            <a:pPr marL="0" marR="0" lvl="0" indent="0" algn="l" defTabSz="457200" rtl="0" eaLnBrk="1" fontAlgn="auto" latinLnBrk="0" hangingPunct="1">
+            <a:pPr marL="0" marR="0" lvl="0" indent="0" algn="ctr" defTabSz="457200" rtl="0" eaLnBrk="1" fontAlgn="auto" latinLnBrk="0" hangingPunct="1">
               <a:lnSpc>
                 <a:spcPct val="100000"/>
               </a:lnSpc>
@@ -2915,188 +2924,20 @@
                 <a:ea typeface="+mj-ea"/>
                 <a:cs typeface="Georgia"/>
               </a:rPr>
-              <a:t>CLICK TO ADD TITLE</a:t>
-            </a:r>
-          </a:p>
-        </p:txBody>
-      </p:sp>
-      <p:sp>
-        <p:nvSpPr>
-          <p:cNvPr id="12" name="Text Placeholder 2"/>
-          <p:cNvSpPr txBox="1">
-            <a:spLocks/>
-          </p:cNvSpPr>
-          <p:nvPr/>
-        </p:nvSpPr>
-        <p:spPr>
-          <a:xfrm>
-            <a:off x="722313" y="742569"/>
-            <a:ext cx="7772400" cy="1500187"/>
-          </a:xfrm>
-          <a:prstGeom prst="rect">
-            <a:avLst/>
-          </a:prstGeom>
-        </p:spPr>
-        <p:txBody>
-          <a:bodyPr vert="horz" lIns="91440" tIns="45720" rIns="91440" bIns="45720" rtlCol="0" anchor="b">
-            <a:normAutofit/>
-          </a:bodyPr>
-          <a:lstStyle>
-            <a:lvl1pPr marL="0" indent="0">
-              <a:buNone/>
-              <a:defRPr sz="2000">
-                <a:solidFill>
-                  <a:srgbClr val="E7CD79"/>
-                </a:solidFill>
-                <a:latin typeface="Georgia"/>
-                <a:cs typeface="Georgia"/>
-              </a:defRPr>
-            </a:lvl1pPr>
-            <a:lvl2pPr marL="457200" indent="0">
-              <a:buNone/>
-              <a:defRPr sz="1800">
-                <a:solidFill>
-                  <a:schemeClr val="tx1">
-                    <a:tint val="75000"/>
-                  </a:schemeClr>
-                </a:solidFill>
-              </a:defRPr>
-            </a:lvl2pPr>
-            <a:lvl3pPr marL="914400" indent="0">
-              <a:buNone/>
-              <a:defRPr sz="1600">
-                <a:solidFill>
-                  <a:schemeClr val="tx1">
-                    <a:tint val="75000"/>
-                  </a:schemeClr>
-                </a:solidFill>
-              </a:defRPr>
-            </a:lvl3pPr>
-            <a:lvl4pPr marL="1371600" indent="0">
-              <a:buNone/>
-              <a:defRPr sz="1400">
-                <a:solidFill>
-                  <a:schemeClr val="tx1">
-                    <a:tint val="75000"/>
-                  </a:schemeClr>
-                </a:solidFill>
-              </a:defRPr>
-            </a:lvl4pPr>
-            <a:lvl5pPr marL="1828800" indent="0">
-              <a:buNone/>
-              <a:defRPr sz="1400">
-                <a:solidFill>
-                  <a:schemeClr val="tx1">
-                    <a:tint val="75000"/>
-                  </a:schemeClr>
-                </a:solidFill>
-              </a:defRPr>
-            </a:lvl5pPr>
-            <a:lvl6pPr marL="2286000" indent="0">
-              <a:buNone/>
-              <a:defRPr sz="1400">
-                <a:solidFill>
-                  <a:schemeClr val="tx1">
-                    <a:tint val="75000"/>
-                  </a:schemeClr>
-                </a:solidFill>
-              </a:defRPr>
-            </a:lvl6pPr>
-            <a:lvl7pPr marL="2743200" indent="0">
-              <a:buNone/>
-              <a:defRPr sz="1400">
-                <a:solidFill>
-                  <a:schemeClr val="tx1">
-                    <a:tint val="75000"/>
-                  </a:schemeClr>
-                </a:solidFill>
-              </a:defRPr>
-            </a:lvl7pPr>
-            <a:lvl8pPr marL="3200400" indent="0">
-              <a:buNone/>
-              <a:defRPr sz="1400">
-                <a:solidFill>
-                  <a:schemeClr val="tx1">
-                    <a:tint val="75000"/>
-                  </a:schemeClr>
-                </a:solidFill>
-              </a:defRPr>
-            </a:lvl8pPr>
-            <a:lvl9pPr marL="3657600" indent="0">
-              <a:buNone/>
-              <a:defRPr sz="1400">
-                <a:solidFill>
-                  <a:schemeClr val="tx1">
-                    <a:tint val="75000"/>
-                  </a:schemeClr>
-                </a:solidFill>
-              </a:defRPr>
-            </a:lvl9pPr>
-          </a:lstStyle>
-          <a:p>
-            <a:pPr marL="0" marR="0" lvl="0" indent="0" algn="l" defTabSz="457200" rtl="0" eaLnBrk="1" fontAlgn="auto" latinLnBrk="0" hangingPunct="1">
-              <a:lnSpc>
-                <a:spcPct val="100000"/>
-              </a:lnSpc>
-              <a:spcBef>
-                <a:spcPct val="20000"/>
-              </a:spcBef>
-              <a:spcAft>
-                <a:spcPts val="0"/>
-              </a:spcAft>
-              <a:buClrTx/>
-              <a:buSzTx/>
-              <a:buFont typeface="Arial"/>
-              <a:buNone/>
-              <a:tabLst/>
-              <a:defRPr/>
-            </a:pPr>
-            <a:r>
-              <a:rPr kumimoji="0" lang="en-US" sz="2000" b="0" i="0" u="none" strike="noStrike" kern="1200" cap="none" spc="0" normalizeH="0" baseline="0" noProof="0" dirty="0" smtClean="0">
-                <a:ln>
-                  <a:noFill/>
-                </a:ln>
-                <a:solidFill>
-                  <a:srgbClr val="1B6917"/>
-                </a:solidFill>
-                <a:effectLst/>
-                <a:uLnTx/>
-                <a:uFillTx/>
-                <a:latin typeface="Georgia"/>
-                <a:ea typeface="+mn-ea"/>
-                <a:cs typeface="Georgia"/>
-              </a:rPr>
-              <a:t>Click</a:t>
-            </a:r>
-            <a:r>
-              <a:rPr kumimoji="0" lang="en-US" sz="2000" b="0" i="0" u="none" strike="noStrike" kern="1200" cap="none" spc="0" normalizeH="0" noProof="0" dirty="0" smtClean="0">
-                <a:ln>
-                  <a:noFill/>
-                </a:ln>
-                <a:solidFill>
-                  <a:srgbClr val="1B6917"/>
-                </a:solidFill>
-                <a:effectLst/>
-                <a:uLnTx/>
-                <a:uFillTx/>
-                <a:latin typeface="Georgia"/>
-                <a:ea typeface="+mn-ea"/>
-                <a:cs typeface="Georgia"/>
-              </a:rPr>
-              <a:t> to add subtitle</a:t>
-            </a:r>
-            <a:endParaRPr kumimoji="0" lang="en-US" sz="2000" b="0" i="0" u="none" strike="noStrike" kern="1200" cap="none" spc="0" normalizeH="0" baseline="0" noProof="0" dirty="0" smtClean="0">
+              <a:t>Evolution OF Random graph generators</a:t>
+            </a:r>
+            <a:endParaRPr kumimoji="0" lang="en-US" sz="4000" b="1" i="0" u="none" strike="noStrike" kern="1200" cap="all" spc="0" normalizeH="0" baseline="0" noProof="0" dirty="0" smtClean="0">
               <a:ln>
                 <a:noFill/>
               </a:ln>
               <a:solidFill>
-                <a:srgbClr val="1B6917"/>
+                <a:srgbClr val="404044"/>
               </a:solidFill>
               <a:effectLst/>
               <a:uLnTx/>
               <a:uFillTx/>
               <a:latin typeface="Georgia"/>
-              <a:ea typeface="+mn-ea"/>
+              <a:ea typeface="+mj-ea"/>
               <a:cs typeface="Georgia"/>
             </a:endParaRPr>
           </a:p>
@@ -3122,11 +2963,193 @@
           <a:bodyPr/>
           <a:lstStyle/>
           <a:p>
-            <a:r>
-              <a:rPr lang="en-US" dirty="0" smtClean="0"/>
-              <a:t>December 20, 2010</a:t>
-            </a:r>
+            <a:fld id="{2DF2F369-FEC4-46F1-8DF7-A48BA6D9D568}" type="datetime4">
+              <a:rPr lang="en-US" smtClean="0"/>
+              <a:t>May 7, 2014</a:t>
+            </a:fld>
             <a:endParaRPr lang="en-US" dirty="0"/>
+          </a:p>
+        </p:txBody>
+      </p:sp>
+      <p:sp>
+        <p:nvSpPr>
+          <p:cNvPr id="5" name="Text Placeholder 2"/>
+          <p:cNvSpPr txBox="1">
+            <a:spLocks/>
+          </p:cNvSpPr>
+          <p:nvPr/>
+        </p:nvSpPr>
+        <p:spPr>
+          <a:xfrm>
+            <a:off x="722313" y="3676270"/>
+            <a:ext cx="7772400" cy="619506"/>
+          </a:xfrm>
+          <a:prstGeom prst="rect">
+            <a:avLst/>
+          </a:prstGeom>
+        </p:spPr>
+        <p:txBody>
+          <a:bodyPr vert="horz" lIns="91440" tIns="45720" rIns="91440" bIns="45720" rtlCol="0" anchor="b">
+            <a:normAutofit/>
+          </a:bodyPr>
+          <a:lstStyle>
+            <a:lvl1pPr marL="0" indent="0">
+              <a:buNone/>
+              <a:defRPr sz="2000">
+                <a:solidFill>
+                  <a:srgbClr val="E7CD79"/>
+                </a:solidFill>
+                <a:latin typeface="Georgia"/>
+                <a:cs typeface="Georgia"/>
+              </a:defRPr>
+            </a:lvl1pPr>
+            <a:lvl2pPr marL="457200" indent="0">
+              <a:buNone/>
+              <a:defRPr sz="1800">
+                <a:solidFill>
+                  <a:schemeClr val="tx1">
+                    <a:tint val="75000"/>
+                  </a:schemeClr>
+                </a:solidFill>
+              </a:defRPr>
+            </a:lvl2pPr>
+            <a:lvl3pPr marL="914400" indent="0">
+              <a:buNone/>
+              <a:defRPr sz="1600">
+                <a:solidFill>
+                  <a:schemeClr val="tx1">
+                    <a:tint val="75000"/>
+                  </a:schemeClr>
+                </a:solidFill>
+              </a:defRPr>
+            </a:lvl3pPr>
+            <a:lvl4pPr marL="1371600" indent="0">
+              <a:buNone/>
+              <a:defRPr sz="1400">
+                <a:solidFill>
+                  <a:schemeClr val="tx1">
+                    <a:tint val="75000"/>
+                  </a:schemeClr>
+                </a:solidFill>
+              </a:defRPr>
+            </a:lvl4pPr>
+            <a:lvl5pPr marL="1828800" indent="0">
+              <a:buNone/>
+              <a:defRPr sz="1400">
+                <a:solidFill>
+                  <a:schemeClr val="tx1">
+                    <a:tint val="75000"/>
+                  </a:schemeClr>
+                </a:solidFill>
+              </a:defRPr>
+            </a:lvl5pPr>
+            <a:lvl6pPr marL="2286000" indent="0">
+              <a:buNone/>
+              <a:defRPr sz="1400">
+                <a:solidFill>
+                  <a:schemeClr val="tx1">
+                    <a:tint val="75000"/>
+                  </a:schemeClr>
+                </a:solidFill>
+              </a:defRPr>
+            </a:lvl6pPr>
+            <a:lvl7pPr marL="2743200" indent="0">
+              <a:buNone/>
+              <a:defRPr sz="1400">
+                <a:solidFill>
+                  <a:schemeClr val="tx1">
+                    <a:tint val="75000"/>
+                  </a:schemeClr>
+                </a:solidFill>
+              </a:defRPr>
+            </a:lvl7pPr>
+            <a:lvl8pPr marL="3200400" indent="0">
+              <a:buNone/>
+              <a:defRPr sz="1400">
+                <a:solidFill>
+                  <a:schemeClr val="tx1">
+                    <a:tint val="75000"/>
+                  </a:schemeClr>
+                </a:solidFill>
+              </a:defRPr>
+            </a:lvl8pPr>
+            <a:lvl9pPr marL="3657600" indent="0">
+              <a:buNone/>
+              <a:defRPr sz="1400">
+                <a:solidFill>
+                  <a:schemeClr val="tx1">
+                    <a:tint val="75000"/>
+                  </a:schemeClr>
+                </a:solidFill>
+              </a:defRPr>
+            </a:lvl9pPr>
+          </a:lstStyle>
+          <a:p>
+            <a:pPr marL="0" marR="0" lvl="0" indent="0" algn="ctr" defTabSz="457200" rtl="0" eaLnBrk="1" fontAlgn="auto" latinLnBrk="0" hangingPunct="1">
+              <a:lnSpc>
+                <a:spcPct val="100000"/>
+              </a:lnSpc>
+              <a:spcBef>
+                <a:spcPct val="20000"/>
+              </a:spcBef>
+              <a:spcAft>
+                <a:spcPts val="0"/>
+              </a:spcAft>
+              <a:buClrTx/>
+              <a:buSzTx/>
+              <a:buFont typeface="Arial"/>
+              <a:buNone/>
+              <a:tabLst/>
+              <a:defRPr/>
+            </a:pPr>
+            <a:r>
+              <a:rPr kumimoji="0" lang="en-US" sz="2000" b="0" i="0" u="none" strike="noStrike" kern="1200" cap="none" spc="0" normalizeH="0" baseline="0" noProof="0" dirty="0" smtClean="0">
+                <a:ln>
+                  <a:noFill/>
+                </a:ln>
+                <a:solidFill>
+                  <a:srgbClr val="1B6917"/>
+                </a:solidFill>
+                <a:effectLst/>
+                <a:uLnTx/>
+                <a:uFillTx/>
+                <a:latin typeface="Georgia"/>
+                <a:ea typeface="+mn-ea"/>
+                <a:cs typeface="Georgia"/>
+              </a:rPr>
+              <a:t>Matthew Martin	Aaron</a:t>
+            </a:r>
+            <a:r>
+              <a:rPr kumimoji="0" lang="en-US" sz="2000" b="0" i="0" u="none" strike="noStrike" kern="1200" cap="none" spc="0" normalizeH="0" noProof="0" dirty="0" smtClean="0">
+                <a:ln>
+                  <a:noFill/>
+                </a:ln>
+                <a:solidFill>
+                  <a:srgbClr val="1B6917"/>
+                </a:solidFill>
+                <a:effectLst/>
+                <a:uLnTx/>
+                <a:uFillTx/>
+                <a:latin typeface="Georgia"/>
+                <a:ea typeface="+mn-ea"/>
+                <a:cs typeface="Georgia"/>
+              </a:rPr>
+              <a:t> Pope</a:t>
+            </a:r>
+            <a:endParaRPr kumimoji="0" lang="en-US" sz="2000" b="0" i="0" u="none" strike="noStrike" kern="1200" cap="none" spc="0" normalizeH="0" baseline="0" noProof="0" dirty="0" smtClean="0">
+              <a:ln>
+                <a:noFill/>
+              </a:ln>
+              <a:solidFill>
+                <a:srgbClr val="1B6917"/>
+              </a:solidFill>
+              <a:effectLst/>
+              <a:uLnTx/>
+              <a:uFillTx/>
+              <a:latin typeface="Georgia"/>
+              <a:ea typeface="+mn-ea"/>
+              <a:cs typeface="Georgia"/>
+            </a:endParaRPr>
           </a:p>
         </p:txBody>
       </p:sp>
@@ -3138,7 +3161,2951 @@
   <p:timing>
     <p:tnLst>
       <p:par>
-        <p:cTn xmlns:p14="http://schemas.microsoft.com/office/powerpoint/2010/main" id="1" dur="indefinite" restart="never" nodeType="tmRoot"/>
+        <p:cTn id="1" dur="indefinite" restart="never" nodeType="tmRoot"/>
+      </p:par>
+    </p:tnLst>
+  </p:timing>
+</p:sld>
+</file>
+
+<file path=ppt/slides/slide10.xml><?xml version="1.0" encoding="utf-8"?>
+<p:sld xmlns:a="http://schemas.openxmlformats.org/drawingml/2006/main" xmlns:r="http://schemas.openxmlformats.org/officeDocument/2006/relationships" xmlns:p="http://schemas.openxmlformats.org/presentationml/2006/main">
+  <p:cSld>
+    <p:spTree>
+      <p:nvGrpSpPr>
+        <p:cNvPr id="1" name=""/>
+        <p:cNvGrpSpPr/>
+        <p:nvPr/>
+      </p:nvGrpSpPr>
+      <p:grpSpPr>
+        <a:xfrm>
+          <a:off x="0" y="0"/>
+          <a:ext cx="0" cy="0"/>
+          <a:chOff x="0" y="0"/>
+          <a:chExt cx="0" cy="0"/>
+        </a:xfrm>
+      </p:grpSpPr>
+      <p:sp>
+        <p:nvSpPr>
+          <p:cNvPr id="2" name="Title 1"/>
+          <p:cNvSpPr>
+            <a:spLocks noGrp="1"/>
+          </p:cNvSpPr>
+          <p:nvPr>
+            <p:ph type="title"/>
+          </p:nvPr>
+        </p:nvSpPr>
+        <p:spPr/>
+        <p:txBody>
+          <a:bodyPr/>
+          <a:lstStyle/>
+          <a:p>
+            <a:r>
+              <a:rPr lang="en-US" dirty="0" smtClean="0"/>
+              <a:t>Click to </a:t>
+            </a:r>
+            <a:r>
+              <a:rPr lang="en-US" smtClean="0"/>
+              <a:t>add title</a:t>
+            </a:r>
+            <a:endParaRPr lang="en-US" dirty="0"/>
+          </a:p>
+        </p:txBody>
+      </p:sp>
+      <p:sp>
+        <p:nvSpPr>
+          <p:cNvPr id="5" name="Slide Number Placeholder 4"/>
+          <p:cNvSpPr>
+            <a:spLocks noGrp="1"/>
+          </p:cNvSpPr>
+          <p:nvPr>
+            <p:ph type="sldNum" sz="quarter" idx="11"/>
+          </p:nvPr>
+        </p:nvSpPr>
+        <p:spPr>
+          <a:xfrm>
+            <a:off x="6366508" y="6505575"/>
+            <a:ext cx="2320292" cy="365125"/>
+          </a:xfrm>
+        </p:spPr>
+        <p:txBody>
+          <a:bodyPr/>
+          <a:lstStyle/>
+          <a:p>
+            <a:fld id="{6189B349-B284-884E-BF58-0D68D479BD97}" type="slidenum">
+              <a:rPr lang="en-US" smtClean="0"/>
+              <a:pPr/>
+              <a:t>10</a:t>
+            </a:fld>
+            <a:endParaRPr lang="en-US" dirty="0"/>
+          </a:p>
+        </p:txBody>
+      </p:sp>
+      <p:sp>
+        <p:nvSpPr>
+          <p:cNvPr id="4" name="Content Placeholder 2"/>
+          <p:cNvSpPr txBox="1">
+            <a:spLocks/>
+          </p:cNvSpPr>
+          <p:nvPr/>
+        </p:nvSpPr>
+        <p:spPr>
+          <a:xfrm>
+            <a:off x="1622812" y="1651000"/>
+            <a:ext cx="7063988" cy="4072754"/>
+          </a:xfrm>
+          <a:prstGeom prst="rect">
+            <a:avLst/>
+          </a:prstGeom>
+        </p:spPr>
+        <p:txBody>
+          <a:bodyPr vert="horz" lIns="91440" tIns="45720" rIns="91440" bIns="45720" rtlCol="0">
+            <a:normAutofit fontScale="77500" lnSpcReduction="20000"/>
+          </a:bodyPr>
+          <a:lstStyle/>
+          <a:p>
+            <a:pPr marL="342900" marR="0" lvl="0" indent="-342900" algn="l" defTabSz="457200" rtl="0" eaLnBrk="1" fontAlgn="auto" latinLnBrk="0" hangingPunct="1">
+              <a:lnSpc>
+                <a:spcPct val="100000"/>
+              </a:lnSpc>
+              <a:spcBef>
+                <a:spcPct val="20000"/>
+              </a:spcBef>
+              <a:spcAft>
+                <a:spcPts val="0"/>
+              </a:spcAft>
+              <a:buClrTx/>
+              <a:buSzTx/>
+              <a:buFont typeface="Arial"/>
+              <a:buChar char="•"/>
+              <a:tabLst/>
+              <a:defRPr/>
+            </a:pPr>
+            <a:r>
+              <a:rPr kumimoji="0" lang="en-US" sz="3200" b="0" i="0" u="none" strike="noStrike" kern="1200" cap="none" spc="0" normalizeH="0" baseline="0" noProof="0" dirty="0" err="1" smtClean="0">
+                <a:ln>
+                  <a:noFill/>
+                </a:ln>
+                <a:solidFill>
+                  <a:schemeClr val="tx1"/>
+                </a:solidFill>
+                <a:effectLst/>
+                <a:uLnTx/>
+                <a:uFillTx/>
+                <a:latin typeface="Georgia"/>
+                <a:ea typeface="+mn-ea"/>
+                <a:cs typeface="Georgia"/>
+              </a:rPr>
+              <a:t>Lorem</a:t>
+            </a:r>
+            <a:r>
+              <a:rPr kumimoji="0" lang="en-US" sz="3200" b="0" i="0" u="none" strike="noStrike" kern="1200" cap="none" spc="0" normalizeH="0" baseline="0" noProof="0" dirty="0" smtClean="0">
+                <a:ln>
+                  <a:noFill/>
+                </a:ln>
+                <a:solidFill>
+                  <a:schemeClr val="tx1"/>
+                </a:solidFill>
+                <a:effectLst/>
+                <a:uLnTx/>
+                <a:uFillTx/>
+                <a:latin typeface="Georgia"/>
+                <a:ea typeface="+mn-ea"/>
+                <a:cs typeface="Georgia"/>
+              </a:rPr>
+              <a:t> </a:t>
+            </a:r>
+            <a:r>
+              <a:rPr kumimoji="0" lang="en-US" sz="3200" b="0" i="0" u="none" strike="noStrike" kern="1200" cap="none" spc="0" normalizeH="0" baseline="0" noProof="0" dirty="0" err="1" smtClean="0">
+                <a:ln>
+                  <a:noFill/>
+                </a:ln>
+                <a:solidFill>
+                  <a:schemeClr val="tx1"/>
+                </a:solidFill>
+                <a:effectLst/>
+                <a:uLnTx/>
+                <a:uFillTx/>
+                <a:latin typeface="Georgia"/>
+                <a:ea typeface="+mn-ea"/>
+                <a:cs typeface="Georgia"/>
+              </a:rPr>
+              <a:t>ipsum</a:t>
+            </a:r>
+            <a:r>
+              <a:rPr kumimoji="0" lang="en-US" sz="3200" b="0" i="0" u="none" strike="noStrike" kern="1200" cap="none" spc="0" normalizeH="0" baseline="0" noProof="0" dirty="0" smtClean="0">
+                <a:ln>
+                  <a:noFill/>
+                </a:ln>
+                <a:solidFill>
+                  <a:schemeClr val="tx1"/>
+                </a:solidFill>
+                <a:effectLst/>
+                <a:uLnTx/>
+                <a:uFillTx/>
+                <a:latin typeface="Georgia"/>
+                <a:ea typeface="+mn-ea"/>
+                <a:cs typeface="Georgia"/>
+              </a:rPr>
+              <a:t> dolor sit </a:t>
+            </a:r>
+            <a:r>
+              <a:rPr kumimoji="0" lang="en-US" sz="3200" b="0" i="0" u="none" strike="noStrike" kern="1200" cap="none" spc="0" normalizeH="0" baseline="0" noProof="0" dirty="0" err="1" smtClean="0">
+                <a:ln>
+                  <a:noFill/>
+                </a:ln>
+                <a:solidFill>
+                  <a:schemeClr val="tx1"/>
+                </a:solidFill>
+                <a:effectLst/>
+                <a:uLnTx/>
+                <a:uFillTx/>
+                <a:latin typeface="Georgia"/>
+                <a:ea typeface="+mn-ea"/>
+                <a:cs typeface="Georgia"/>
+              </a:rPr>
+              <a:t>amet</a:t>
+            </a:r>
+            <a:r>
+              <a:rPr kumimoji="0" lang="en-US" sz="3200" b="0" i="0" u="none" strike="noStrike" kern="1200" cap="none" spc="0" normalizeH="0" baseline="0" noProof="0" dirty="0" smtClean="0">
+                <a:ln>
+                  <a:noFill/>
+                </a:ln>
+                <a:solidFill>
+                  <a:schemeClr val="tx1"/>
+                </a:solidFill>
+                <a:effectLst/>
+                <a:uLnTx/>
+                <a:uFillTx/>
+                <a:latin typeface="Georgia"/>
+                <a:ea typeface="+mn-ea"/>
+                <a:cs typeface="Georgia"/>
+              </a:rPr>
+              <a:t>, </a:t>
+            </a:r>
+            <a:r>
+              <a:rPr kumimoji="0" lang="en-US" sz="3200" b="0" i="0" u="none" strike="noStrike" kern="1200" cap="none" spc="0" normalizeH="0" baseline="0" noProof="0" dirty="0" err="1" smtClean="0">
+                <a:ln>
+                  <a:noFill/>
+                </a:ln>
+                <a:solidFill>
+                  <a:schemeClr val="tx1"/>
+                </a:solidFill>
+                <a:effectLst/>
+                <a:uLnTx/>
+                <a:uFillTx/>
+                <a:latin typeface="Georgia"/>
+                <a:ea typeface="+mn-ea"/>
+                <a:cs typeface="Georgia"/>
+              </a:rPr>
+              <a:t>consectetur</a:t>
+            </a:r>
+            <a:r>
+              <a:rPr kumimoji="0" lang="en-US" sz="3200" b="0" i="0" u="none" strike="noStrike" kern="1200" cap="none" spc="0" normalizeH="0" baseline="0" noProof="0" dirty="0" smtClean="0">
+                <a:ln>
+                  <a:noFill/>
+                </a:ln>
+                <a:solidFill>
+                  <a:schemeClr val="tx1"/>
+                </a:solidFill>
+                <a:effectLst/>
+                <a:uLnTx/>
+                <a:uFillTx/>
+                <a:latin typeface="Georgia"/>
+                <a:ea typeface="+mn-ea"/>
+                <a:cs typeface="Georgia"/>
+              </a:rPr>
+              <a:t> </a:t>
+            </a:r>
+            <a:r>
+              <a:rPr kumimoji="0" lang="en-US" sz="3200" b="0" i="0" u="none" strike="noStrike" kern="1200" cap="none" spc="0" normalizeH="0" baseline="0" noProof="0" dirty="0" err="1" smtClean="0">
+                <a:ln>
+                  <a:noFill/>
+                </a:ln>
+                <a:solidFill>
+                  <a:schemeClr val="tx1"/>
+                </a:solidFill>
+                <a:effectLst/>
+                <a:uLnTx/>
+                <a:uFillTx/>
+                <a:latin typeface="Georgia"/>
+                <a:ea typeface="+mn-ea"/>
+                <a:cs typeface="Georgia"/>
+              </a:rPr>
+              <a:t>adipiscing</a:t>
+            </a:r>
+            <a:r>
+              <a:rPr kumimoji="0" lang="en-US" sz="3200" b="0" i="0" u="none" strike="noStrike" kern="1200" cap="none" spc="0" normalizeH="0" baseline="0" noProof="0" dirty="0" smtClean="0">
+                <a:ln>
+                  <a:noFill/>
+                </a:ln>
+                <a:solidFill>
+                  <a:schemeClr val="tx1"/>
+                </a:solidFill>
+                <a:effectLst/>
+                <a:uLnTx/>
+                <a:uFillTx/>
+                <a:latin typeface="Georgia"/>
+                <a:ea typeface="+mn-ea"/>
+                <a:cs typeface="Georgia"/>
+              </a:rPr>
+              <a:t> </a:t>
+            </a:r>
+            <a:r>
+              <a:rPr kumimoji="0" lang="en-US" sz="3200" b="0" i="0" u="none" strike="noStrike" kern="1200" cap="none" spc="0" normalizeH="0" baseline="0" noProof="0" dirty="0" err="1" smtClean="0">
+                <a:ln>
+                  <a:noFill/>
+                </a:ln>
+                <a:solidFill>
+                  <a:schemeClr val="tx1"/>
+                </a:solidFill>
+                <a:effectLst/>
+                <a:uLnTx/>
+                <a:uFillTx/>
+                <a:latin typeface="Georgia"/>
+                <a:ea typeface="+mn-ea"/>
+                <a:cs typeface="Georgia"/>
+              </a:rPr>
+              <a:t>elit</a:t>
+            </a:r>
+            <a:r>
+              <a:rPr kumimoji="0" lang="en-US" sz="3200" b="0" i="0" u="none" strike="noStrike" kern="1200" cap="none" spc="0" normalizeH="0" baseline="0" noProof="0" dirty="0" smtClean="0">
+                <a:ln>
+                  <a:noFill/>
+                </a:ln>
+                <a:solidFill>
+                  <a:schemeClr val="tx1"/>
+                </a:solidFill>
+                <a:effectLst/>
+                <a:uLnTx/>
+                <a:uFillTx/>
+                <a:latin typeface="Georgia"/>
+                <a:ea typeface="+mn-ea"/>
+                <a:cs typeface="Georgia"/>
+              </a:rPr>
+              <a:t>.</a:t>
+            </a:r>
+          </a:p>
+          <a:p>
+            <a:pPr marL="342900" marR="0" lvl="0" indent="-342900" algn="l" defTabSz="457200" rtl="0" eaLnBrk="1" fontAlgn="auto" latinLnBrk="0" hangingPunct="1">
+              <a:lnSpc>
+                <a:spcPct val="100000"/>
+              </a:lnSpc>
+              <a:spcBef>
+                <a:spcPct val="20000"/>
+              </a:spcBef>
+              <a:spcAft>
+                <a:spcPts val="0"/>
+              </a:spcAft>
+              <a:buClrTx/>
+              <a:buSzTx/>
+              <a:buFont typeface="Arial"/>
+              <a:buChar char="•"/>
+              <a:tabLst/>
+              <a:defRPr/>
+            </a:pPr>
+            <a:r>
+              <a:rPr kumimoji="0" lang="en-US" sz="3200" b="0" i="0" u="none" strike="noStrike" kern="1200" cap="none" spc="0" normalizeH="0" baseline="0" noProof="0" dirty="0" err="1" smtClean="0">
+                <a:ln>
+                  <a:noFill/>
+                </a:ln>
+                <a:solidFill>
+                  <a:schemeClr val="tx1"/>
+                </a:solidFill>
+                <a:effectLst/>
+                <a:uLnTx/>
+                <a:uFillTx/>
+                <a:latin typeface="Georgia"/>
+                <a:ea typeface="+mn-ea"/>
+                <a:cs typeface="Georgia"/>
+              </a:rPr>
+              <a:t>Sed</a:t>
+            </a:r>
+            <a:r>
+              <a:rPr kumimoji="0" lang="en-US" sz="3200" b="0" i="0" u="none" strike="noStrike" kern="1200" cap="none" spc="0" normalizeH="0" baseline="0" noProof="0" dirty="0" smtClean="0">
+                <a:ln>
+                  <a:noFill/>
+                </a:ln>
+                <a:solidFill>
+                  <a:schemeClr val="tx1"/>
+                </a:solidFill>
+                <a:effectLst/>
+                <a:uLnTx/>
+                <a:uFillTx/>
+                <a:latin typeface="Georgia"/>
+                <a:ea typeface="+mn-ea"/>
+                <a:cs typeface="Georgia"/>
+              </a:rPr>
+              <a:t> </a:t>
+            </a:r>
+            <a:r>
+              <a:rPr kumimoji="0" lang="en-US" sz="3200" b="0" i="0" u="none" strike="noStrike" kern="1200" cap="none" spc="0" normalizeH="0" baseline="0" noProof="0" dirty="0" err="1" smtClean="0">
+                <a:ln>
+                  <a:noFill/>
+                </a:ln>
+                <a:solidFill>
+                  <a:schemeClr val="tx1"/>
+                </a:solidFill>
+                <a:effectLst/>
+                <a:uLnTx/>
+                <a:uFillTx/>
+                <a:latin typeface="Georgia"/>
+                <a:ea typeface="+mn-ea"/>
+                <a:cs typeface="Georgia"/>
+              </a:rPr>
+              <a:t>pretium</a:t>
+            </a:r>
+            <a:r>
+              <a:rPr kumimoji="0" lang="en-US" sz="3200" b="0" i="0" u="none" strike="noStrike" kern="1200" cap="none" spc="0" normalizeH="0" baseline="0" noProof="0" dirty="0" smtClean="0">
+                <a:ln>
+                  <a:noFill/>
+                </a:ln>
+                <a:solidFill>
+                  <a:schemeClr val="tx1"/>
+                </a:solidFill>
+                <a:effectLst/>
+                <a:uLnTx/>
+                <a:uFillTx/>
+                <a:latin typeface="Georgia"/>
+                <a:ea typeface="+mn-ea"/>
+                <a:cs typeface="Georgia"/>
+              </a:rPr>
+              <a:t> </a:t>
+            </a:r>
+            <a:r>
+              <a:rPr kumimoji="0" lang="en-US" sz="3200" b="0" i="0" u="none" strike="noStrike" kern="1200" cap="none" spc="0" normalizeH="0" baseline="0" noProof="0" dirty="0" err="1" smtClean="0">
+                <a:ln>
+                  <a:noFill/>
+                </a:ln>
+                <a:solidFill>
+                  <a:schemeClr val="tx1"/>
+                </a:solidFill>
+                <a:effectLst/>
+                <a:uLnTx/>
+                <a:uFillTx/>
+                <a:latin typeface="Georgia"/>
+                <a:ea typeface="+mn-ea"/>
+                <a:cs typeface="Georgia"/>
+              </a:rPr>
+              <a:t>libero</a:t>
+            </a:r>
+            <a:r>
+              <a:rPr kumimoji="0" lang="en-US" sz="3200" b="0" i="0" u="none" strike="noStrike" kern="1200" cap="none" spc="0" normalizeH="0" baseline="0" noProof="0" dirty="0" smtClean="0">
+                <a:ln>
+                  <a:noFill/>
+                </a:ln>
+                <a:solidFill>
+                  <a:schemeClr val="tx1"/>
+                </a:solidFill>
+                <a:effectLst/>
+                <a:uLnTx/>
+                <a:uFillTx/>
+                <a:latin typeface="Georgia"/>
+                <a:ea typeface="+mn-ea"/>
+                <a:cs typeface="Georgia"/>
+              </a:rPr>
+              <a:t> </a:t>
+            </a:r>
+            <a:r>
+              <a:rPr kumimoji="0" lang="en-US" sz="3200" b="0" i="0" u="none" strike="noStrike" kern="1200" cap="none" spc="0" normalizeH="0" baseline="0" noProof="0" dirty="0" err="1" smtClean="0">
+                <a:ln>
+                  <a:noFill/>
+                </a:ln>
+                <a:solidFill>
+                  <a:schemeClr val="tx1"/>
+                </a:solidFill>
+                <a:effectLst/>
+                <a:uLnTx/>
+                <a:uFillTx/>
+                <a:latin typeface="Georgia"/>
+                <a:ea typeface="+mn-ea"/>
+                <a:cs typeface="Georgia"/>
+              </a:rPr>
+              <a:t>quis</a:t>
+            </a:r>
+            <a:r>
+              <a:rPr kumimoji="0" lang="en-US" sz="3200" b="0" i="0" u="none" strike="noStrike" kern="1200" cap="none" spc="0" normalizeH="0" baseline="0" noProof="0" dirty="0" smtClean="0">
+                <a:ln>
+                  <a:noFill/>
+                </a:ln>
+                <a:solidFill>
+                  <a:schemeClr val="tx1"/>
+                </a:solidFill>
+                <a:effectLst/>
+                <a:uLnTx/>
+                <a:uFillTx/>
+                <a:latin typeface="Georgia"/>
+                <a:ea typeface="+mn-ea"/>
+                <a:cs typeface="Georgia"/>
+              </a:rPr>
+              <a:t> dui </a:t>
+            </a:r>
+            <a:r>
+              <a:rPr kumimoji="0" lang="en-US" sz="3200" b="0" i="0" u="none" strike="noStrike" kern="1200" cap="none" spc="0" normalizeH="0" baseline="0" noProof="0" dirty="0" err="1" smtClean="0">
+                <a:ln>
+                  <a:noFill/>
+                </a:ln>
+                <a:solidFill>
+                  <a:schemeClr val="tx1"/>
+                </a:solidFill>
+                <a:effectLst/>
+                <a:uLnTx/>
+                <a:uFillTx/>
+                <a:latin typeface="Georgia"/>
+                <a:ea typeface="+mn-ea"/>
+                <a:cs typeface="Georgia"/>
+              </a:rPr>
+              <a:t>blandit</a:t>
+            </a:r>
+            <a:r>
+              <a:rPr kumimoji="0" lang="en-US" sz="3200" b="0" i="0" u="none" strike="noStrike" kern="1200" cap="none" spc="0" normalizeH="0" baseline="0" noProof="0" dirty="0" smtClean="0">
+                <a:ln>
+                  <a:noFill/>
+                </a:ln>
+                <a:solidFill>
+                  <a:schemeClr val="tx1"/>
+                </a:solidFill>
+                <a:effectLst/>
+                <a:uLnTx/>
+                <a:uFillTx/>
+                <a:latin typeface="Georgia"/>
+                <a:ea typeface="+mn-ea"/>
+                <a:cs typeface="Georgia"/>
+              </a:rPr>
+              <a:t> </a:t>
+            </a:r>
+            <a:r>
+              <a:rPr kumimoji="0" lang="en-US" sz="3200" b="0" i="0" u="none" strike="noStrike" kern="1200" cap="none" spc="0" normalizeH="0" baseline="0" noProof="0" dirty="0" err="1" smtClean="0">
+                <a:ln>
+                  <a:noFill/>
+                </a:ln>
+                <a:solidFill>
+                  <a:schemeClr val="tx1"/>
+                </a:solidFill>
+                <a:effectLst/>
+                <a:uLnTx/>
+                <a:uFillTx/>
+                <a:latin typeface="Georgia"/>
+                <a:ea typeface="+mn-ea"/>
+                <a:cs typeface="Georgia"/>
+              </a:rPr>
+              <a:t>pellentesque</a:t>
+            </a:r>
+            <a:r>
+              <a:rPr kumimoji="0" lang="en-US" sz="3200" b="0" i="0" u="none" strike="noStrike" kern="1200" cap="none" spc="0" normalizeH="0" baseline="0" noProof="0" dirty="0" smtClean="0">
+                <a:ln>
+                  <a:noFill/>
+                </a:ln>
+                <a:solidFill>
+                  <a:schemeClr val="tx1"/>
+                </a:solidFill>
+                <a:effectLst/>
+                <a:uLnTx/>
+                <a:uFillTx/>
+                <a:latin typeface="Georgia"/>
+                <a:ea typeface="+mn-ea"/>
+                <a:cs typeface="Georgia"/>
+              </a:rPr>
+              <a:t> </a:t>
+            </a:r>
+            <a:r>
+              <a:rPr kumimoji="0" lang="en-US" sz="3200" b="0" i="0" u="none" strike="noStrike" kern="1200" cap="none" spc="0" normalizeH="0" baseline="0" noProof="0" dirty="0" err="1" smtClean="0">
+                <a:ln>
+                  <a:noFill/>
+                </a:ln>
+                <a:solidFill>
+                  <a:schemeClr val="tx1"/>
+                </a:solidFill>
+                <a:effectLst/>
+                <a:uLnTx/>
+                <a:uFillTx/>
+                <a:latin typeface="Georgia"/>
+                <a:ea typeface="+mn-ea"/>
+                <a:cs typeface="Georgia"/>
+              </a:rPr>
+              <a:t>consequat</a:t>
+            </a:r>
+            <a:r>
+              <a:rPr kumimoji="0" lang="en-US" sz="3200" b="0" i="0" u="none" strike="noStrike" kern="1200" cap="none" spc="0" normalizeH="0" baseline="0" noProof="0" dirty="0" smtClean="0">
+                <a:ln>
+                  <a:noFill/>
+                </a:ln>
+                <a:solidFill>
+                  <a:schemeClr val="tx1"/>
+                </a:solidFill>
+                <a:effectLst/>
+                <a:uLnTx/>
+                <a:uFillTx/>
+                <a:latin typeface="Georgia"/>
+                <a:ea typeface="+mn-ea"/>
+                <a:cs typeface="Georgia"/>
+              </a:rPr>
+              <a:t> </a:t>
+            </a:r>
+            <a:r>
+              <a:rPr kumimoji="0" lang="en-US" sz="3200" b="0" i="0" u="none" strike="noStrike" kern="1200" cap="none" spc="0" normalizeH="0" baseline="0" noProof="0" dirty="0" err="1" smtClean="0">
+                <a:ln>
+                  <a:noFill/>
+                </a:ln>
+                <a:solidFill>
+                  <a:schemeClr val="tx1"/>
+                </a:solidFill>
+                <a:effectLst/>
+                <a:uLnTx/>
+                <a:uFillTx/>
+                <a:latin typeface="Georgia"/>
+                <a:ea typeface="+mn-ea"/>
+                <a:cs typeface="Georgia"/>
+              </a:rPr>
+              <a:t>libero</a:t>
+            </a:r>
+            <a:r>
+              <a:rPr kumimoji="0" lang="en-US" sz="3200" b="0" i="0" u="none" strike="noStrike" kern="1200" cap="none" spc="0" normalizeH="0" baseline="0" noProof="0" dirty="0" smtClean="0">
+                <a:ln>
+                  <a:noFill/>
+                </a:ln>
+                <a:solidFill>
+                  <a:schemeClr val="tx1"/>
+                </a:solidFill>
+                <a:effectLst/>
+                <a:uLnTx/>
+                <a:uFillTx/>
+                <a:latin typeface="Georgia"/>
+                <a:ea typeface="+mn-ea"/>
+                <a:cs typeface="Georgia"/>
+              </a:rPr>
+              <a:t> </a:t>
+            </a:r>
+            <a:r>
+              <a:rPr kumimoji="0" lang="en-US" sz="3200" b="0" i="0" u="none" strike="noStrike" kern="1200" cap="none" spc="0" normalizeH="0" baseline="0" noProof="0" dirty="0" err="1" smtClean="0">
+                <a:ln>
+                  <a:noFill/>
+                </a:ln>
+                <a:solidFill>
+                  <a:schemeClr val="tx1"/>
+                </a:solidFill>
+                <a:effectLst/>
+                <a:uLnTx/>
+                <a:uFillTx/>
+                <a:latin typeface="Georgia"/>
+                <a:ea typeface="+mn-ea"/>
+                <a:cs typeface="Georgia"/>
+              </a:rPr>
+              <a:t>gravida</a:t>
+            </a:r>
+            <a:r>
+              <a:rPr kumimoji="0" lang="en-US" sz="3200" b="0" i="0" u="none" strike="noStrike" kern="1200" cap="none" spc="0" normalizeH="0" baseline="0" noProof="0" dirty="0" smtClean="0">
+                <a:ln>
+                  <a:noFill/>
+                </a:ln>
+                <a:solidFill>
+                  <a:schemeClr val="tx1"/>
+                </a:solidFill>
+                <a:effectLst/>
+                <a:uLnTx/>
+                <a:uFillTx/>
+                <a:latin typeface="Georgia"/>
+                <a:ea typeface="+mn-ea"/>
+                <a:cs typeface="Georgia"/>
+              </a:rPr>
+              <a:t>.</a:t>
+            </a:r>
+          </a:p>
+          <a:p>
+            <a:pPr marL="342900" marR="0" lvl="0" indent="-342900" algn="l" defTabSz="457200" rtl="0" eaLnBrk="1" fontAlgn="auto" latinLnBrk="0" hangingPunct="1">
+              <a:lnSpc>
+                <a:spcPct val="100000"/>
+              </a:lnSpc>
+              <a:spcBef>
+                <a:spcPct val="20000"/>
+              </a:spcBef>
+              <a:spcAft>
+                <a:spcPts val="0"/>
+              </a:spcAft>
+              <a:buClrTx/>
+              <a:buSzTx/>
+              <a:buFont typeface="Arial"/>
+              <a:buChar char="•"/>
+              <a:tabLst/>
+              <a:defRPr/>
+            </a:pPr>
+            <a:r>
+              <a:rPr kumimoji="0" lang="en-US" sz="3200" b="0" i="0" u="none" strike="noStrike" kern="1200" cap="none" spc="0" normalizeH="0" baseline="0" noProof="0" dirty="0" smtClean="0">
+                <a:ln>
+                  <a:noFill/>
+                </a:ln>
+                <a:solidFill>
+                  <a:schemeClr val="tx1"/>
+                </a:solidFill>
+                <a:effectLst/>
+                <a:uLnTx/>
+                <a:uFillTx/>
+                <a:latin typeface="Georgia"/>
+                <a:ea typeface="+mn-ea"/>
+                <a:cs typeface="Georgia"/>
+              </a:rPr>
+              <a:t>In </a:t>
+            </a:r>
+            <a:r>
+              <a:rPr kumimoji="0" lang="en-US" sz="3200" b="0" i="0" u="none" strike="noStrike" kern="1200" cap="none" spc="0" normalizeH="0" baseline="0" noProof="0" dirty="0" err="1" smtClean="0">
+                <a:ln>
+                  <a:noFill/>
+                </a:ln>
+                <a:solidFill>
+                  <a:schemeClr val="tx1"/>
+                </a:solidFill>
+                <a:effectLst/>
+                <a:uLnTx/>
+                <a:uFillTx/>
+                <a:latin typeface="Georgia"/>
+                <a:ea typeface="+mn-ea"/>
+                <a:cs typeface="Georgia"/>
+              </a:rPr>
+              <a:t>venenatis</a:t>
+            </a:r>
+            <a:r>
+              <a:rPr kumimoji="0" lang="en-US" sz="3200" b="0" i="0" u="none" strike="noStrike" kern="1200" cap="none" spc="0" normalizeH="0" baseline="0" noProof="0" dirty="0" smtClean="0">
+                <a:ln>
+                  <a:noFill/>
+                </a:ln>
+                <a:solidFill>
+                  <a:schemeClr val="tx1"/>
+                </a:solidFill>
+                <a:effectLst/>
+                <a:uLnTx/>
+                <a:uFillTx/>
+                <a:latin typeface="Georgia"/>
+                <a:ea typeface="+mn-ea"/>
+                <a:cs typeface="Georgia"/>
+              </a:rPr>
+              <a:t> lacus </a:t>
+            </a:r>
+            <a:r>
+              <a:rPr kumimoji="0" lang="en-US" sz="3200" b="0" i="0" u="none" strike="noStrike" kern="1200" cap="none" spc="0" normalizeH="0" baseline="0" noProof="0" dirty="0" err="1" smtClean="0">
+                <a:ln>
+                  <a:noFill/>
+                </a:ln>
+                <a:solidFill>
+                  <a:schemeClr val="tx1"/>
+                </a:solidFill>
+                <a:effectLst/>
+                <a:uLnTx/>
+                <a:uFillTx/>
+                <a:latin typeface="Georgia"/>
+                <a:ea typeface="+mn-ea"/>
+                <a:cs typeface="Georgia"/>
+              </a:rPr>
+              <a:t>imperdiet</a:t>
+            </a:r>
+            <a:r>
+              <a:rPr kumimoji="0" lang="en-US" sz="3200" b="0" i="0" u="none" strike="noStrike" kern="1200" cap="none" spc="0" normalizeH="0" baseline="0" noProof="0" dirty="0" smtClean="0">
+                <a:ln>
+                  <a:noFill/>
+                </a:ln>
+                <a:solidFill>
+                  <a:schemeClr val="tx1"/>
+                </a:solidFill>
+                <a:effectLst/>
+                <a:uLnTx/>
+                <a:uFillTx/>
+                <a:latin typeface="Georgia"/>
+                <a:ea typeface="+mn-ea"/>
+                <a:cs typeface="Georgia"/>
+              </a:rPr>
+              <a:t> </a:t>
+            </a:r>
+            <a:r>
+              <a:rPr kumimoji="0" lang="en-US" sz="3200" b="0" i="0" u="none" strike="noStrike" kern="1200" cap="none" spc="0" normalizeH="0" baseline="0" noProof="0" dirty="0" err="1" smtClean="0">
+                <a:ln>
+                  <a:noFill/>
+                </a:ln>
+                <a:solidFill>
+                  <a:schemeClr val="tx1"/>
+                </a:solidFill>
+                <a:effectLst/>
+                <a:uLnTx/>
+                <a:uFillTx/>
+                <a:latin typeface="Georgia"/>
+                <a:ea typeface="+mn-ea"/>
+                <a:cs typeface="Georgia"/>
+              </a:rPr>
+              <a:t>tellus</a:t>
+            </a:r>
+            <a:r>
+              <a:rPr kumimoji="0" lang="en-US" sz="3200" b="0" i="0" u="none" strike="noStrike" kern="1200" cap="none" spc="0" normalizeH="0" baseline="0" noProof="0" dirty="0" smtClean="0">
+                <a:ln>
+                  <a:noFill/>
+                </a:ln>
+                <a:solidFill>
+                  <a:schemeClr val="tx1"/>
+                </a:solidFill>
+                <a:effectLst/>
+                <a:uLnTx/>
+                <a:uFillTx/>
+                <a:latin typeface="Georgia"/>
+                <a:ea typeface="+mn-ea"/>
+                <a:cs typeface="Georgia"/>
+              </a:rPr>
+              <a:t> </a:t>
+            </a:r>
+            <a:r>
+              <a:rPr kumimoji="0" lang="en-US" sz="3200" b="0" i="0" u="none" strike="noStrike" kern="1200" cap="none" spc="0" normalizeH="0" baseline="0" noProof="0" dirty="0" err="1" smtClean="0">
+                <a:ln>
+                  <a:noFill/>
+                </a:ln>
+                <a:solidFill>
+                  <a:schemeClr val="tx1"/>
+                </a:solidFill>
+                <a:effectLst/>
+                <a:uLnTx/>
+                <a:uFillTx/>
+                <a:latin typeface="Georgia"/>
+                <a:ea typeface="+mn-ea"/>
+                <a:cs typeface="Georgia"/>
+              </a:rPr>
+              <a:t>rutrum</a:t>
+            </a:r>
+            <a:r>
+              <a:rPr kumimoji="0" lang="en-US" sz="3200" b="0" i="0" u="none" strike="noStrike" kern="1200" cap="none" spc="0" normalizeH="0" baseline="0" noProof="0" dirty="0" smtClean="0">
+                <a:ln>
+                  <a:noFill/>
+                </a:ln>
+                <a:solidFill>
+                  <a:schemeClr val="tx1"/>
+                </a:solidFill>
+                <a:effectLst/>
+                <a:uLnTx/>
+                <a:uFillTx/>
+                <a:latin typeface="Georgia"/>
+                <a:ea typeface="+mn-ea"/>
+                <a:cs typeface="Georgia"/>
+              </a:rPr>
+              <a:t> </a:t>
+            </a:r>
+            <a:r>
+              <a:rPr kumimoji="0" lang="en-US" sz="3200" b="0" i="0" u="none" strike="noStrike" kern="1200" cap="none" spc="0" normalizeH="0" baseline="0" noProof="0" dirty="0" err="1" smtClean="0">
+                <a:ln>
+                  <a:noFill/>
+                </a:ln>
+                <a:solidFill>
+                  <a:schemeClr val="tx1"/>
+                </a:solidFill>
+                <a:effectLst/>
+                <a:uLnTx/>
+                <a:uFillTx/>
+                <a:latin typeface="Georgia"/>
+                <a:ea typeface="+mn-ea"/>
+                <a:cs typeface="Georgia"/>
+              </a:rPr>
+              <a:t>auctor</a:t>
+            </a:r>
+            <a:r>
+              <a:rPr kumimoji="0" lang="en-US" sz="3200" b="0" i="0" u="none" strike="noStrike" kern="1200" cap="none" spc="0" normalizeH="0" baseline="0" noProof="0" dirty="0" smtClean="0">
+                <a:ln>
+                  <a:noFill/>
+                </a:ln>
+                <a:solidFill>
+                  <a:schemeClr val="tx1"/>
+                </a:solidFill>
+                <a:effectLst/>
+                <a:uLnTx/>
+                <a:uFillTx/>
+                <a:latin typeface="Georgia"/>
+                <a:ea typeface="+mn-ea"/>
+                <a:cs typeface="Georgia"/>
+              </a:rPr>
+              <a:t>.</a:t>
+            </a:r>
+          </a:p>
+          <a:p>
+            <a:pPr marL="342900" marR="0" lvl="0" indent="-342900" algn="l" defTabSz="457200" rtl="0" eaLnBrk="1" fontAlgn="auto" latinLnBrk="0" hangingPunct="1">
+              <a:lnSpc>
+                <a:spcPct val="100000"/>
+              </a:lnSpc>
+              <a:spcBef>
+                <a:spcPct val="20000"/>
+              </a:spcBef>
+              <a:spcAft>
+                <a:spcPts val="0"/>
+              </a:spcAft>
+              <a:buClrTx/>
+              <a:buSzTx/>
+              <a:buFont typeface="Arial"/>
+              <a:buChar char="•"/>
+              <a:tabLst/>
+              <a:defRPr/>
+            </a:pPr>
+            <a:r>
+              <a:rPr kumimoji="0" lang="en-US" sz="3200" b="0" i="0" u="none" strike="noStrike" kern="1200" cap="none" spc="0" normalizeH="0" baseline="0" noProof="0" dirty="0" err="1" smtClean="0">
+                <a:ln>
+                  <a:noFill/>
+                </a:ln>
+                <a:solidFill>
+                  <a:schemeClr val="tx1"/>
+                </a:solidFill>
+                <a:effectLst/>
+                <a:uLnTx/>
+                <a:uFillTx/>
+                <a:latin typeface="Georgia"/>
+                <a:ea typeface="+mn-ea"/>
+                <a:cs typeface="Georgia"/>
+              </a:rPr>
+              <a:t>Curabitur</a:t>
+            </a:r>
+            <a:r>
+              <a:rPr kumimoji="0" lang="en-US" sz="3200" b="0" i="0" u="none" strike="noStrike" kern="1200" cap="none" spc="0" normalizeH="0" baseline="0" noProof="0" dirty="0" smtClean="0">
+                <a:ln>
+                  <a:noFill/>
+                </a:ln>
+                <a:solidFill>
+                  <a:schemeClr val="tx1"/>
+                </a:solidFill>
+                <a:effectLst/>
+                <a:uLnTx/>
+                <a:uFillTx/>
+                <a:latin typeface="Georgia"/>
+                <a:ea typeface="+mn-ea"/>
+                <a:cs typeface="Georgia"/>
+              </a:rPr>
+              <a:t> </a:t>
+            </a:r>
+            <a:r>
+              <a:rPr kumimoji="0" lang="en-US" sz="3200" b="0" i="0" u="none" strike="noStrike" kern="1200" cap="none" spc="0" normalizeH="0" baseline="0" noProof="0" dirty="0" err="1" smtClean="0">
+                <a:ln>
+                  <a:noFill/>
+                </a:ln>
+                <a:solidFill>
+                  <a:schemeClr val="tx1"/>
+                </a:solidFill>
+                <a:effectLst/>
+                <a:uLnTx/>
+                <a:uFillTx/>
+                <a:latin typeface="Georgia"/>
+                <a:ea typeface="+mn-ea"/>
+                <a:cs typeface="Georgia"/>
+              </a:rPr>
+              <a:t>condimentum</a:t>
+            </a:r>
+            <a:r>
+              <a:rPr kumimoji="0" lang="en-US" sz="3200" b="0" i="0" u="none" strike="noStrike" kern="1200" cap="none" spc="0" normalizeH="0" baseline="0" noProof="0" dirty="0" smtClean="0">
+                <a:ln>
+                  <a:noFill/>
+                </a:ln>
+                <a:solidFill>
+                  <a:schemeClr val="tx1"/>
+                </a:solidFill>
+                <a:effectLst/>
+                <a:uLnTx/>
+                <a:uFillTx/>
+                <a:latin typeface="Georgia"/>
+                <a:ea typeface="+mn-ea"/>
+                <a:cs typeface="Georgia"/>
+              </a:rPr>
+              <a:t> </a:t>
+            </a:r>
+            <a:r>
+              <a:rPr kumimoji="0" lang="en-US" sz="3200" b="0" i="0" u="none" strike="noStrike" kern="1200" cap="none" spc="0" normalizeH="0" baseline="0" noProof="0" dirty="0" err="1" smtClean="0">
+                <a:ln>
+                  <a:noFill/>
+                </a:ln>
+                <a:solidFill>
+                  <a:schemeClr val="tx1"/>
+                </a:solidFill>
+                <a:effectLst/>
+                <a:uLnTx/>
+                <a:uFillTx/>
+                <a:latin typeface="Georgia"/>
+                <a:ea typeface="+mn-ea"/>
+                <a:cs typeface="Georgia"/>
+              </a:rPr>
+              <a:t>consequat</a:t>
+            </a:r>
+            <a:r>
+              <a:rPr kumimoji="0" lang="en-US" sz="3200" b="0" i="0" u="none" strike="noStrike" kern="1200" cap="none" spc="0" normalizeH="0" baseline="0" noProof="0" dirty="0" smtClean="0">
+                <a:ln>
+                  <a:noFill/>
+                </a:ln>
+                <a:solidFill>
+                  <a:schemeClr val="tx1"/>
+                </a:solidFill>
+                <a:effectLst/>
+                <a:uLnTx/>
+                <a:uFillTx/>
+                <a:latin typeface="Georgia"/>
+                <a:ea typeface="+mn-ea"/>
+                <a:cs typeface="Georgia"/>
+              </a:rPr>
+              <a:t> nisi, in </a:t>
+            </a:r>
+            <a:r>
+              <a:rPr kumimoji="0" lang="en-US" sz="3200" b="0" i="0" u="none" strike="noStrike" kern="1200" cap="none" spc="0" normalizeH="0" baseline="0" noProof="0" dirty="0" err="1" smtClean="0">
+                <a:ln>
+                  <a:noFill/>
+                </a:ln>
+                <a:solidFill>
+                  <a:schemeClr val="tx1"/>
+                </a:solidFill>
+                <a:effectLst/>
+                <a:uLnTx/>
+                <a:uFillTx/>
+                <a:latin typeface="Georgia"/>
+                <a:ea typeface="+mn-ea"/>
+                <a:cs typeface="Georgia"/>
+              </a:rPr>
+              <a:t>aliquam</a:t>
+            </a:r>
+            <a:r>
+              <a:rPr kumimoji="0" lang="en-US" sz="3200" b="0" i="0" u="none" strike="noStrike" kern="1200" cap="none" spc="0" normalizeH="0" baseline="0" noProof="0" dirty="0" smtClean="0">
+                <a:ln>
+                  <a:noFill/>
+                </a:ln>
+                <a:solidFill>
+                  <a:schemeClr val="tx1"/>
+                </a:solidFill>
+                <a:effectLst/>
+                <a:uLnTx/>
+                <a:uFillTx/>
+                <a:latin typeface="Georgia"/>
+                <a:ea typeface="+mn-ea"/>
+                <a:cs typeface="Georgia"/>
+              </a:rPr>
+              <a:t> </a:t>
+            </a:r>
+            <a:r>
+              <a:rPr kumimoji="0" lang="en-US" sz="3200" b="0" i="0" u="none" strike="noStrike" kern="1200" cap="none" spc="0" normalizeH="0" baseline="0" noProof="0" dirty="0" err="1" smtClean="0">
+                <a:ln>
+                  <a:noFill/>
+                </a:ln>
+                <a:solidFill>
+                  <a:schemeClr val="tx1"/>
+                </a:solidFill>
+                <a:effectLst/>
+                <a:uLnTx/>
+                <a:uFillTx/>
+                <a:latin typeface="Georgia"/>
+                <a:ea typeface="+mn-ea"/>
+                <a:cs typeface="Georgia"/>
+              </a:rPr>
+              <a:t>nibh</a:t>
+            </a:r>
+            <a:r>
+              <a:rPr kumimoji="0" lang="en-US" sz="3200" b="0" i="0" u="none" strike="noStrike" kern="1200" cap="none" spc="0" normalizeH="0" baseline="0" noProof="0" dirty="0" smtClean="0">
+                <a:ln>
+                  <a:noFill/>
+                </a:ln>
+                <a:solidFill>
+                  <a:schemeClr val="tx1"/>
+                </a:solidFill>
+                <a:effectLst/>
+                <a:uLnTx/>
+                <a:uFillTx/>
+                <a:latin typeface="Georgia"/>
+                <a:ea typeface="+mn-ea"/>
+                <a:cs typeface="Georgia"/>
+              </a:rPr>
+              <a:t> </a:t>
+            </a:r>
+            <a:r>
+              <a:rPr kumimoji="0" lang="en-US" sz="3200" b="0" i="0" u="none" strike="noStrike" kern="1200" cap="none" spc="0" normalizeH="0" baseline="0" noProof="0" dirty="0" err="1" smtClean="0">
+                <a:ln>
+                  <a:noFill/>
+                </a:ln>
+                <a:solidFill>
+                  <a:schemeClr val="tx1"/>
+                </a:solidFill>
+                <a:effectLst/>
+                <a:uLnTx/>
+                <a:uFillTx/>
+                <a:latin typeface="Georgia"/>
+                <a:ea typeface="+mn-ea"/>
+                <a:cs typeface="Georgia"/>
+              </a:rPr>
+              <a:t>placerat</a:t>
+            </a:r>
+            <a:r>
+              <a:rPr kumimoji="0" lang="en-US" sz="3200" b="0" i="0" u="none" strike="noStrike" kern="1200" cap="none" spc="0" normalizeH="0" baseline="0" noProof="0" dirty="0" smtClean="0">
+                <a:ln>
+                  <a:noFill/>
+                </a:ln>
+                <a:solidFill>
+                  <a:schemeClr val="tx1"/>
+                </a:solidFill>
+                <a:effectLst/>
+                <a:uLnTx/>
+                <a:uFillTx/>
+                <a:latin typeface="Georgia"/>
+                <a:ea typeface="+mn-ea"/>
+                <a:cs typeface="Georgia"/>
+              </a:rPr>
+              <a:t> vel.</a:t>
+            </a:r>
+          </a:p>
+          <a:p>
+            <a:pPr marL="342900" marR="0" lvl="0" indent="-342900" algn="l" defTabSz="457200" rtl="0" eaLnBrk="1" fontAlgn="auto" latinLnBrk="0" hangingPunct="1">
+              <a:lnSpc>
+                <a:spcPct val="100000"/>
+              </a:lnSpc>
+              <a:spcBef>
+                <a:spcPct val="20000"/>
+              </a:spcBef>
+              <a:spcAft>
+                <a:spcPts val="0"/>
+              </a:spcAft>
+              <a:buClrTx/>
+              <a:buSzTx/>
+              <a:buFont typeface="Arial"/>
+              <a:buChar char="•"/>
+              <a:tabLst/>
+              <a:defRPr/>
+            </a:pPr>
+            <a:r>
+              <a:rPr kumimoji="0" lang="en-US" sz="3200" b="0" i="0" u="none" strike="noStrike" kern="1200" cap="none" spc="0" normalizeH="0" baseline="0" noProof="0" dirty="0" err="1" smtClean="0">
+                <a:ln>
+                  <a:noFill/>
+                </a:ln>
+                <a:solidFill>
+                  <a:schemeClr val="tx1"/>
+                </a:solidFill>
+                <a:effectLst/>
+                <a:uLnTx/>
+                <a:uFillTx/>
+                <a:latin typeface="Georgia"/>
+                <a:ea typeface="+mn-ea"/>
+                <a:cs typeface="Georgia"/>
+              </a:rPr>
+              <a:t>Curabitur</a:t>
+            </a:r>
+            <a:r>
+              <a:rPr kumimoji="0" lang="en-US" sz="3200" b="0" i="0" u="none" strike="noStrike" kern="1200" cap="none" spc="0" normalizeH="0" baseline="0" noProof="0" dirty="0" smtClean="0">
+                <a:ln>
+                  <a:noFill/>
+                </a:ln>
+                <a:solidFill>
+                  <a:schemeClr val="tx1"/>
+                </a:solidFill>
+                <a:effectLst/>
+                <a:uLnTx/>
+                <a:uFillTx/>
+                <a:latin typeface="Georgia"/>
+                <a:ea typeface="+mn-ea"/>
+                <a:cs typeface="Georgia"/>
+              </a:rPr>
+              <a:t> et </a:t>
+            </a:r>
+            <a:r>
+              <a:rPr kumimoji="0" lang="en-US" sz="3200" b="0" i="0" u="none" strike="noStrike" kern="1200" cap="none" spc="0" normalizeH="0" baseline="0" noProof="0" dirty="0" err="1" smtClean="0">
+                <a:ln>
+                  <a:noFill/>
+                </a:ln>
+                <a:solidFill>
+                  <a:schemeClr val="tx1"/>
+                </a:solidFill>
+                <a:effectLst/>
+                <a:uLnTx/>
+                <a:uFillTx/>
+                <a:latin typeface="Georgia"/>
+                <a:ea typeface="+mn-ea"/>
+                <a:cs typeface="Georgia"/>
+              </a:rPr>
+              <a:t>purus</a:t>
+            </a:r>
+            <a:r>
+              <a:rPr kumimoji="0" lang="en-US" sz="3200" b="0" i="0" u="none" strike="noStrike" kern="1200" cap="none" spc="0" normalizeH="0" baseline="0" noProof="0" dirty="0" smtClean="0">
+                <a:ln>
+                  <a:noFill/>
+                </a:ln>
+                <a:solidFill>
+                  <a:schemeClr val="tx1"/>
+                </a:solidFill>
+                <a:effectLst/>
+                <a:uLnTx/>
+                <a:uFillTx/>
+                <a:latin typeface="Georgia"/>
+                <a:ea typeface="+mn-ea"/>
+                <a:cs typeface="Georgia"/>
+              </a:rPr>
+              <a:t> </a:t>
+            </a:r>
+            <a:r>
+              <a:rPr kumimoji="0" lang="en-US" sz="3200" b="0" i="0" u="none" strike="noStrike" kern="1200" cap="none" spc="0" normalizeH="0" baseline="0" noProof="0" dirty="0" err="1" smtClean="0">
+                <a:ln>
+                  <a:noFill/>
+                </a:ln>
+                <a:solidFill>
+                  <a:schemeClr val="tx1"/>
+                </a:solidFill>
+                <a:effectLst/>
+                <a:uLnTx/>
+                <a:uFillTx/>
+                <a:latin typeface="Georgia"/>
+                <a:ea typeface="+mn-ea"/>
+                <a:cs typeface="Georgia"/>
+              </a:rPr>
+              <a:t>est</a:t>
+            </a:r>
+            <a:r>
+              <a:rPr kumimoji="0" lang="en-US" sz="3200" b="0" i="0" u="none" strike="noStrike" kern="1200" cap="none" spc="0" normalizeH="0" baseline="0" noProof="0" dirty="0" smtClean="0">
+                <a:ln>
+                  <a:noFill/>
+                </a:ln>
+                <a:solidFill>
+                  <a:schemeClr val="tx1"/>
+                </a:solidFill>
+                <a:effectLst/>
+                <a:uLnTx/>
+                <a:uFillTx/>
+                <a:latin typeface="Georgia"/>
+                <a:ea typeface="+mn-ea"/>
+                <a:cs typeface="Georgia"/>
+              </a:rPr>
+              <a:t>, at </a:t>
+            </a:r>
+            <a:r>
+              <a:rPr kumimoji="0" lang="en-US" sz="3200" b="0" i="0" u="none" strike="noStrike" kern="1200" cap="none" spc="0" normalizeH="0" baseline="0" noProof="0" dirty="0" err="1" smtClean="0">
+                <a:ln>
+                  <a:noFill/>
+                </a:ln>
+                <a:solidFill>
+                  <a:schemeClr val="tx1"/>
+                </a:solidFill>
+                <a:effectLst/>
+                <a:uLnTx/>
+                <a:uFillTx/>
+                <a:latin typeface="Georgia"/>
+                <a:ea typeface="+mn-ea"/>
+                <a:cs typeface="Georgia"/>
+              </a:rPr>
+              <a:t>facilisis</a:t>
+            </a:r>
+            <a:r>
+              <a:rPr kumimoji="0" lang="en-US" sz="3200" b="0" i="0" u="none" strike="noStrike" kern="1200" cap="none" spc="0" normalizeH="0" baseline="0" noProof="0" dirty="0" smtClean="0">
+                <a:ln>
+                  <a:noFill/>
+                </a:ln>
+                <a:solidFill>
+                  <a:schemeClr val="tx1"/>
+                </a:solidFill>
+                <a:effectLst/>
+                <a:uLnTx/>
+                <a:uFillTx/>
+                <a:latin typeface="Georgia"/>
+                <a:ea typeface="+mn-ea"/>
+                <a:cs typeface="Georgia"/>
+              </a:rPr>
+              <a:t> </a:t>
+            </a:r>
+            <a:r>
+              <a:rPr kumimoji="0" lang="en-US" sz="3200" b="0" i="0" u="none" strike="noStrike" kern="1200" cap="none" spc="0" normalizeH="0" baseline="0" noProof="0" dirty="0" err="1" smtClean="0">
+                <a:ln>
+                  <a:noFill/>
+                </a:ln>
+                <a:solidFill>
+                  <a:schemeClr val="tx1"/>
+                </a:solidFill>
+                <a:effectLst/>
+                <a:uLnTx/>
+                <a:uFillTx/>
+                <a:latin typeface="Georgia"/>
+                <a:ea typeface="+mn-ea"/>
+                <a:cs typeface="Georgia"/>
+              </a:rPr>
+              <a:t>nisl</a:t>
+            </a:r>
+            <a:r>
+              <a:rPr kumimoji="0" lang="en-US" sz="3200" b="0" i="0" u="none" strike="noStrike" kern="1200" cap="none" spc="0" normalizeH="0" baseline="0" noProof="0" dirty="0" smtClean="0">
+                <a:ln>
+                  <a:noFill/>
+                </a:ln>
+                <a:solidFill>
+                  <a:schemeClr val="tx1"/>
+                </a:solidFill>
+                <a:effectLst/>
+                <a:uLnTx/>
+                <a:uFillTx/>
+                <a:latin typeface="Georgia"/>
+                <a:ea typeface="+mn-ea"/>
+                <a:cs typeface="Georgia"/>
+              </a:rPr>
+              <a:t>.</a:t>
+            </a:r>
+          </a:p>
+          <a:p>
+            <a:pPr marL="342900" marR="0" lvl="0" indent="-342900" algn="l" defTabSz="457200" rtl="0" eaLnBrk="1" fontAlgn="auto" latinLnBrk="0" hangingPunct="1">
+              <a:lnSpc>
+                <a:spcPct val="100000"/>
+              </a:lnSpc>
+              <a:spcBef>
+                <a:spcPct val="20000"/>
+              </a:spcBef>
+              <a:spcAft>
+                <a:spcPts val="0"/>
+              </a:spcAft>
+              <a:buClrTx/>
+              <a:buSzTx/>
+              <a:buFont typeface="Arial"/>
+              <a:buChar char="•"/>
+              <a:tabLst/>
+              <a:defRPr/>
+            </a:pPr>
+            <a:r>
+              <a:rPr kumimoji="0" lang="en-US" sz="3200" b="0" i="0" u="none" strike="noStrike" kern="1200" cap="none" spc="0" normalizeH="0" baseline="0" noProof="0" dirty="0" err="1" smtClean="0">
+                <a:ln>
+                  <a:noFill/>
+                </a:ln>
+                <a:solidFill>
+                  <a:schemeClr val="tx1"/>
+                </a:solidFill>
+                <a:effectLst/>
+                <a:uLnTx/>
+                <a:uFillTx/>
+                <a:latin typeface="Georgia"/>
+                <a:ea typeface="+mn-ea"/>
+                <a:cs typeface="Georgia"/>
+              </a:rPr>
+              <a:t>Aenean</a:t>
+            </a:r>
+            <a:r>
+              <a:rPr kumimoji="0" lang="en-US" sz="3200" b="0" i="0" u="none" strike="noStrike" kern="1200" cap="none" spc="0" normalizeH="0" baseline="0" noProof="0" dirty="0" smtClean="0">
+                <a:ln>
+                  <a:noFill/>
+                </a:ln>
+                <a:solidFill>
+                  <a:schemeClr val="tx1"/>
+                </a:solidFill>
+                <a:effectLst/>
+                <a:uLnTx/>
+                <a:uFillTx/>
+                <a:latin typeface="Georgia"/>
+                <a:ea typeface="+mn-ea"/>
+                <a:cs typeface="Georgia"/>
+              </a:rPr>
+              <a:t> </a:t>
+            </a:r>
+            <a:r>
+              <a:rPr kumimoji="0" lang="en-US" sz="3200" b="0" i="0" u="none" strike="noStrike" kern="1200" cap="none" spc="0" normalizeH="0" baseline="0" noProof="0" dirty="0" err="1" smtClean="0">
+                <a:ln>
+                  <a:noFill/>
+                </a:ln>
+                <a:solidFill>
+                  <a:schemeClr val="tx1"/>
+                </a:solidFill>
+                <a:effectLst/>
+                <a:uLnTx/>
+                <a:uFillTx/>
+                <a:latin typeface="Georgia"/>
+                <a:ea typeface="+mn-ea"/>
+                <a:cs typeface="Georgia"/>
+              </a:rPr>
+              <a:t>posuere</a:t>
+            </a:r>
+            <a:r>
+              <a:rPr kumimoji="0" lang="en-US" sz="3200" b="0" i="0" u="none" strike="noStrike" kern="1200" cap="none" spc="0" normalizeH="0" baseline="0" noProof="0" dirty="0" smtClean="0">
+                <a:ln>
+                  <a:noFill/>
+                </a:ln>
+                <a:solidFill>
+                  <a:schemeClr val="tx1"/>
+                </a:solidFill>
+                <a:effectLst/>
+                <a:uLnTx/>
+                <a:uFillTx/>
+                <a:latin typeface="Georgia"/>
+                <a:ea typeface="+mn-ea"/>
+                <a:cs typeface="Georgia"/>
+              </a:rPr>
+              <a:t> lacus non </a:t>
+            </a:r>
+            <a:r>
+              <a:rPr kumimoji="0" lang="en-US" sz="3200" b="0" i="0" u="none" strike="noStrike" kern="1200" cap="none" spc="0" normalizeH="0" baseline="0" noProof="0" dirty="0" err="1" smtClean="0">
+                <a:ln>
+                  <a:noFill/>
+                </a:ln>
+                <a:solidFill>
+                  <a:schemeClr val="tx1"/>
+                </a:solidFill>
+                <a:effectLst/>
+                <a:uLnTx/>
+                <a:uFillTx/>
+                <a:latin typeface="Georgia"/>
+                <a:ea typeface="+mn-ea"/>
+                <a:cs typeface="Georgia"/>
+              </a:rPr>
+              <a:t>lectus</a:t>
+            </a:r>
+            <a:r>
+              <a:rPr kumimoji="0" lang="en-US" sz="3200" b="0" i="0" u="none" strike="noStrike" kern="1200" cap="none" spc="0" normalizeH="0" baseline="0" noProof="0" dirty="0" smtClean="0">
+                <a:ln>
+                  <a:noFill/>
+                </a:ln>
+                <a:solidFill>
+                  <a:schemeClr val="tx1"/>
+                </a:solidFill>
+                <a:effectLst/>
+                <a:uLnTx/>
+                <a:uFillTx/>
+                <a:latin typeface="Georgia"/>
+                <a:ea typeface="+mn-ea"/>
+                <a:cs typeface="Georgia"/>
+              </a:rPr>
+              <a:t> </a:t>
+            </a:r>
+            <a:r>
+              <a:rPr kumimoji="0" lang="en-US" sz="3200" b="0" i="0" u="none" strike="noStrike" kern="1200" cap="none" spc="0" normalizeH="0" baseline="0" noProof="0" dirty="0" err="1" smtClean="0">
+                <a:ln>
+                  <a:noFill/>
+                </a:ln>
+                <a:solidFill>
+                  <a:schemeClr val="tx1"/>
+                </a:solidFill>
+                <a:effectLst/>
+                <a:uLnTx/>
+                <a:uFillTx/>
+                <a:latin typeface="Georgia"/>
+                <a:ea typeface="+mn-ea"/>
+                <a:cs typeface="Georgia"/>
+              </a:rPr>
+              <a:t>malesuada</a:t>
+            </a:r>
+            <a:r>
+              <a:rPr kumimoji="0" lang="en-US" sz="3200" b="0" i="0" u="none" strike="noStrike" kern="1200" cap="none" spc="0" normalizeH="0" baseline="0" noProof="0" dirty="0" smtClean="0">
+                <a:ln>
+                  <a:noFill/>
+                </a:ln>
+                <a:solidFill>
+                  <a:schemeClr val="tx1"/>
+                </a:solidFill>
+                <a:effectLst/>
+                <a:uLnTx/>
+                <a:uFillTx/>
+                <a:latin typeface="Georgia"/>
+                <a:ea typeface="+mn-ea"/>
+                <a:cs typeface="Georgia"/>
+              </a:rPr>
+              <a:t> </a:t>
+            </a:r>
+            <a:r>
+              <a:rPr kumimoji="0" lang="en-US" sz="3200" b="0" i="0" u="none" strike="noStrike" kern="1200" cap="none" spc="0" normalizeH="0" baseline="0" noProof="0" dirty="0" err="1" smtClean="0">
+                <a:ln>
+                  <a:noFill/>
+                </a:ln>
+                <a:solidFill>
+                  <a:schemeClr val="tx1"/>
+                </a:solidFill>
+                <a:effectLst/>
+                <a:uLnTx/>
+                <a:uFillTx/>
+                <a:latin typeface="Georgia"/>
+                <a:ea typeface="+mn-ea"/>
+                <a:cs typeface="Georgia"/>
+              </a:rPr>
+              <a:t>congue</a:t>
+            </a:r>
+            <a:r>
+              <a:rPr kumimoji="0" lang="en-US" sz="3200" b="0" i="0" u="none" strike="noStrike" kern="1200" cap="none" spc="0" normalizeH="0" baseline="0" noProof="0" dirty="0" smtClean="0">
+                <a:ln>
+                  <a:noFill/>
+                </a:ln>
+                <a:solidFill>
+                  <a:schemeClr val="tx1"/>
+                </a:solidFill>
+                <a:effectLst/>
+                <a:uLnTx/>
+                <a:uFillTx/>
+                <a:latin typeface="Georgia"/>
+                <a:ea typeface="+mn-ea"/>
+                <a:cs typeface="Georgia"/>
+              </a:rPr>
+              <a:t>.</a:t>
+            </a:r>
+          </a:p>
+        </p:txBody>
+      </p:sp>
+    </p:spTree>
+    <p:extLst>
+      <p:ext uri="{BB962C8B-B14F-4D97-AF65-F5344CB8AC3E}">
+        <p14:creationId xmlns:p14="http://schemas.microsoft.com/office/powerpoint/2010/main" val="3302816026"/>
+      </p:ext>
+    </p:extLst>
+  </p:cSld>
+  <p:clrMapOvr>
+    <a:masterClrMapping/>
+  </p:clrMapOvr>
+  <p:timing>
+    <p:tnLst>
+      <p:par>
+        <p:cTn id="1" dur="indefinite" restart="never" nodeType="tmRoot"/>
+      </p:par>
+    </p:tnLst>
+  </p:timing>
+</p:sld>
+</file>
+
+<file path=ppt/slides/slide11.xml><?xml version="1.0" encoding="utf-8"?>
+<p:sld xmlns:a="http://schemas.openxmlformats.org/drawingml/2006/main" xmlns:r="http://schemas.openxmlformats.org/officeDocument/2006/relationships" xmlns:p="http://schemas.openxmlformats.org/presentationml/2006/main">
+  <p:cSld>
+    <p:spTree>
+      <p:nvGrpSpPr>
+        <p:cNvPr id="1" name=""/>
+        <p:cNvGrpSpPr/>
+        <p:nvPr/>
+      </p:nvGrpSpPr>
+      <p:grpSpPr>
+        <a:xfrm>
+          <a:off x="0" y="0"/>
+          <a:ext cx="0" cy="0"/>
+          <a:chOff x="0" y="0"/>
+          <a:chExt cx="0" cy="0"/>
+        </a:xfrm>
+      </p:grpSpPr>
+      <p:sp>
+        <p:nvSpPr>
+          <p:cNvPr id="2" name="Title 1"/>
+          <p:cNvSpPr>
+            <a:spLocks noGrp="1"/>
+          </p:cNvSpPr>
+          <p:nvPr>
+            <p:ph type="title"/>
+          </p:nvPr>
+        </p:nvSpPr>
+        <p:spPr/>
+        <p:txBody>
+          <a:bodyPr/>
+          <a:lstStyle/>
+          <a:p>
+            <a:r>
+              <a:rPr lang="en-US" dirty="0" smtClean="0"/>
+              <a:t>Click to </a:t>
+            </a:r>
+            <a:r>
+              <a:rPr lang="en-US" smtClean="0"/>
+              <a:t>add title</a:t>
+            </a:r>
+            <a:endParaRPr lang="en-US" dirty="0"/>
+          </a:p>
+        </p:txBody>
+      </p:sp>
+      <p:sp>
+        <p:nvSpPr>
+          <p:cNvPr id="5" name="Slide Number Placeholder 4"/>
+          <p:cNvSpPr>
+            <a:spLocks noGrp="1"/>
+          </p:cNvSpPr>
+          <p:nvPr>
+            <p:ph type="sldNum" sz="quarter" idx="11"/>
+          </p:nvPr>
+        </p:nvSpPr>
+        <p:spPr>
+          <a:xfrm>
+            <a:off x="6366508" y="6505575"/>
+            <a:ext cx="2320292" cy="365125"/>
+          </a:xfrm>
+        </p:spPr>
+        <p:txBody>
+          <a:bodyPr/>
+          <a:lstStyle/>
+          <a:p>
+            <a:fld id="{6189B349-B284-884E-BF58-0D68D479BD97}" type="slidenum">
+              <a:rPr lang="en-US" smtClean="0"/>
+              <a:pPr/>
+              <a:t>11</a:t>
+            </a:fld>
+            <a:endParaRPr lang="en-US" dirty="0"/>
+          </a:p>
+        </p:txBody>
+      </p:sp>
+      <p:sp>
+        <p:nvSpPr>
+          <p:cNvPr id="4" name="Content Placeholder 2"/>
+          <p:cNvSpPr txBox="1">
+            <a:spLocks/>
+          </p:cNvSpPr>
+          <p:nvPr/>
+        </p:nvSpPr>
+        <p:spPr>
+          <a:xfrm>
+            <a:off x="1622812" y="1651000"/>
+            <a:ext cx="7063988" cy="4072754"/>
+          </a:xfrm>
+          <a:prstGeom prst="rect">
+            <a:avLst/>
+          </a:prstGeom>
+        </p:spPr>
+        <p:txBody>
+          <a:bodyPr vert="horz" lIns="91440" tIns="45720" rIns="91440" bIns="45720" rtlCol="0">
+            <a:normAutofit fontScale="77500" lnSpcReduction="20000"/>
+          </a:bodyPr>
+          <a:lstStyle/>
+          <a:p>
+            <a:pPr marL="342900" marR="0" lvl="0" indent="-342900" algn="l" defTabSz="457200" rtl="0" eaLnBrk="1" fontAlgn="auto" latinLnBrk="0" hangingPunct="1">
+              <a:lnSpc>
+                <a:spcPct val="100000"/>
+              </a:lnSpc>
+              <a:spcBef>
+                <a:spcPct val="20000"/>
+              </a:spcBef>
+              <a:spcAft>
+                <a:spcPts val="0"/>
+              </a:spcAft>
+              <a:buClrTx/>
+              <a:buSzTx/>
+              <a:buFont typeface="Arial"/>
+              <a:buChar char="•"/>
+              <a:tabLst/>
+              <a:defRPr/>
+            </a:pPr>
+            <a:r>
+              <a:rPr kumimoji="0" lang="en-US" sz="3200" b="0" i="0" u="none" strike="noStrike" kern="1200" cap="none" spc="0" normalizeH="0" baseline="0" noProof="0" dirty="0" err="1" smtClean="0">
+                <a:ln>
+                  <a:noFill/>
+                </a:ln>
+                <a:solidFill>
+                  <a:schemeClr val="tx1"/>
+                </a:solidFill>
+                <a:effectLst/>
+                <a:uLnTx/>
+                <a:uFillTx/>
+                <a:latin typeface="Georgia"/>
+                <a:ea typeface="+mn-ea"/>
+                <a:cs typeface="Georgia"/>
+              </a:rPr>
+              <a:t>Lorem</a:t>
+            </a:r>
+            <a:r>
+              <a:rPr kumimoji="0" lang="en-US" sz="3200" b="0" i="0" u="none" strike="noStrike" kern="1200" cap="none" spc="0" normalizeH="0" baseline="0" noProof="0" dirty="0" smtClean="0">
+                <a:ln>
+                  <a:noFill/>
+                </a:ln>
+                <a:solidFill>
+                  <a:schemeClr val="tx1"/>
+                </a:solidFill>
+                <a:effectLst/>
+                <a:uLnTx/>
+                <a:uFillTx/>
+                <a:latin typeface="Georgia"/>
+                <a:ea typeface="+mn-ea"/>
+                <a:cs typeface="Georgia"/>
+              </a:rPr>
+              <a:t> </a:t>
+            </a:r>
+            <a:r>
+              <a:rPr kumimoji="0" lang="en-US" sz="3200" b="0" i="0" u="none" strike="noStrike" kern="1200" cap="none" spc="0" normalizeH="0" baseline="0" noProof="0" dirty="0" err="1" smtClean="0">
+                <a:ln>
+                  <a:noFill/>
+                </a:ln>
+                <a:solidFill>
+                  <a:schemeClr val="tx1"/>
+                </a:solidFill>
+                <a:effectLst/>
+                <a:uLnTx/>
+                <a:uFillTx/>
+                <a:latin typeface="Georgia"/>
+                <a:ea typeface="+mn-ea"/>
+                <a:cs typeface="Georgia"/>
+              </a:rPr>
+              <a:t>ipsum</a:t>
+            </a:r>
+            <a:r>
+              <a:rPr kumimoji="0" lang="en-US" sz="3200" b="0" i="0" u="none" strike="noStrike" kern="1200" cap="none" spc="0" normalizeH="0" baseline="0" noProof="0" dirty="0" smtClean="0">
+                <a:ln>
+                  <a:noFill/>
+                </a:ln>
+                <a:solidFill>
+                  <a:schemeClr val="tx1"/>
+                </a:solidFill>
+                <a:effectLst/>
+                <a:uLnTx/>
+                <a:uFillTx/>
+                <a:latin typeface="Georgia"/>
+                <a:ea typeface="+mn-ea"/>
+                <a:cs typeface="Georgia"/>
+              </a:rPr>
+              <a:t> dolor sit </a:t>
+            </a:r>
+            <a:r>
+              <a:rPr kumimoji="0" lang="en-US" sz="3200" b="0" i="0" u="none" strike="noStrike" kern="1200" cap="none" spc="0" normalizeH="0" baseline="0" noProof="0" dirty="0" err="1" smtClean="0">
+                <a:ln>
+                  <a:noFill/>
+                </a:ln>
+                <a:solidFill>
+                  <a:schemeClr val="tx1"/>
+                </a:solidFill>
+                <a:effectLst/>
+                <a:uLnTx/>
+                <a:uFillTx/>
+                <a:latin typeface="Georgia"/>
+                <a:ea typeface="+mn-ea"/>
+                <a:cs typeface="Georgia"/>
+              </a:rPr>
+              <a:t>amet</a:t>
+            </a:r>
+            <a:r>
+              <a:rPr kumimoji="0" lang="en-US" sz="3200" b="0" i="0" u="none" strike="noStrike" kern="1200" cap="none" spc="0" normalizeH="0" baseline="0" noProof="0" dirty="0" smtClean="0">
+                <a:ln>
+                  <a:noFill/>
+                </a:ln>
+                <a:solidFill>
+                  <a:schemeClr val="tx1"/>
+                </a:solidFill>
+                <a:effectLst/>
+                <a:uLnTx/>
+                <a:uFillTx/>
+                <a:latin typeface="Georgia"/>
+                <a:ea typeface="+mn-ea"/>
+                <a:cs typeface="Georgia"/>
+              </a:rPr>
+              <a:t>, </a:t>
+            </a:r>
+            <a:r>
+              <a:rPr kumimoji="0" lang="en-US" sz="3200" b="0" i="0" u="none" strike="noStrike" kern="1200" cap="none" spc="0" normalizeH="0" baseline="0" noProof="0" dirty="0" err="1" smtClean="0">
+                <a:ln>
+                  <a:noFill/>
+                </a:ln>
+                <a:solidFill>
+                  <a:schemeClr val="tx1"/>
+                </a:solidFill>
+                <a:effectLst/>
+                <a:uLnTx/>
+                <a:uFillTx/>
+                <a:latin typeface="Georgia"/>
+                <a:ea typeface="+mn-ea"/>
+                <a:cs typeface="Georgia"/>
+              </a:rPr>
+              <a:t>consectetur</a:t>
+            </a:r>
+            <a:r>
+              <a:rPr kumimoji="0" lang="en-US" sz="3200" b="0" i="0" u="none" strike="noStrike" kern="1200" cap="none" spc="0" normalizeH="0" baseline="0" noProof="0" dirty="0" smtClean="0">
+                <a:ln>
+                  <a:noFill/>
+                </a:ln>
+                <a:solidFill>
+                  <a:schemeClr val="tx1"/>
+                </a:solidFill>
+                <a:effectLst/>
+                <a:uLnTx/>
+                <a:uFillTx/>
+                <a:latin typeface="Georgia"/>
+                <a:ea typeface="+mn-ea"/>
+                <a:cs typeface="Georgia"/>
+              </a:rPr>
+              <a:t> </a:t>
+            </a:r>
+            <a:r>
+              <a:rPr kumimoji="0" lang="en-US" sz="3200" b="0" i="0" u="none" strike="noStrike" kern="1200" cap="none" spc="0" normalizeH="0" baseline="0" noProof="0" dirty="0" err="1" smtClean="0">
+                <a:ln>
+                  <a:noFill/>
+                </a:ln>
+                <a:solidFill>
+                  <a:schemeClr val="tx1"/>
+                </a:solidFill>
+                <a:effectLst/>
+                <a:uLnTx/>
+                <a:uFillTx/>
+                <a:latin typeface="Georgia"/>
+                <a:ea typeface="+mn-ea"/>
+                <a:cs typeface="Georgia"/>
+              </a:rPr>
+              <a:t>adipiscing</a:t>
+            </a:r>
+            <a:r>
+              <a:rPr kumimoji="0" lang="en-US" sz="3200" b="0" i="0" u="none" strike="noStrike" kern="1200" cap="none" spc="0" normalizeH="0" baseline="0" noProof="0" dirty="0" smtClean="0">
+                <a:ln>
+                  <a:noFill/>
+                </a:ln>
+                <a:solidFill>
+                  <a:schemeClr val="tx1"/>
+                </a:solidFill>
+                <a:effectLst/>
+                <a:uLnTx/>
+                <a:uFillTx/>
+                <a:latin typeface="Georgia"/>
+                <a:ea typeface="+mn-ea"/>
+                <a:cs typeface="Georgia"/>
+              </a:rPr>
+              <a:t> </a:t>
+            </a:r>
+            <a:r>
+              <a:rPr kumimoji="0" lang="en-US" sz="3200" b="0" i="0" u="none" strike="noStrike" kern="1200" cap="none" spc="0" normalizeH="0" baseline="0" noProof="0" dirty="0" err="1" smtClean="0">
+                <a:ln>
+                  <a:noFill/>
+                </a:ln>
+                <a:solidFill>
+                  <a:schemeClr val="tx1"/>
+                </a:solidFill>
+                <a:effectLst/>
+                <a:uLnTx/>
+                <a:uFillTx/>
+                <a:latin typeface="Georgia"/>
+                <a:ea typeface="+mn-ea"/>
+                <a:cs typeface="Georgia"/>
+              </a:rPr>
+              <a:t>elit</a:t>
+            </a:r>
+            <a:r>
+              <a:rPr kumimoji="0" lang="en-US" sz="3200" b="0" i="0" u="none" strike="noStrike" kern="1200" cap="none" spc="0" normalizeH="0" baseline="0" noProof="0" dirty="0" smtClean="0">
+                <a:ln>
+                  <a:noFill/>
+                </a:ln>
+                <a:solidFill>
+                  <a:schemeClr val="tx1"/>
+                </a:solidFill>
+                <a:effectLst/>
+                <a:uLnTx/>
+                <a:uFillTx/>
+                <a:latin typeface="Georgia"/>
+                <a:ea typeface="+mn-ea"/>
+                <a:cs typeface="Georgia"/>
+              </a:rPr>
+              <a:t>.</a:t>
+            </a:r>
+          </a:p>
+          <a:p>
+            <a:pPr marL="342900" marR="0" lvl="0" indent="-342900" algn="l" defTabSz="457200" rtl="0" eaLnBrk="1" fontAlgn="auto" latinLnBrk="0" hangingPunct="1">
+              <a:lnSpc>
+                <a:spcPct val="100000"/>
+              </a:lnSpc>
+              <a:spcBef>
+                <a:spcPct val="20000"/>
+              </a:spcBef>
+              <a:spcAft>
+                <a:spcPts val="0"/>
+              </a:spcAft>
+              <a:buClrTx/>
+              <a:buSzTx/>
+              <a:buFont typeface="Arial"/>
+              <a:buChar char="•"/>
+              <a:tabLst/>
+              <a:defRPr/>
+            </a:pPr>
+            <a:r>
+              <a:rPr kumimoji="0" lang="en-US" sz="3200" b="0" i="0" u="none" strike="noStrike" kern="1200" cap="none" spc="0" normalizeH="0" baseline="0" noProof="0" dirty="0" err="1" smtClean="0">
+                <a:ln>
+                  <a:noFill/>
+                </a:ln>
+                <a:solidFill>
+                  <a:schemeClr val="tx1"/>
+                </a:solidFill>
+                <a:effectLst/>
+                <a:uLnTx/>
+                <a:uFillTx/>
+                <a:latin typeface="Georgia"/>
+                <a:ea typeface="+mn-ea"/>
+                <a:cs typeface="Georgia"/>
+              </a:rPr>
+              <a:t>Sed</a:t>
+            </a:r>
+            <a:r>
+              <a:rPr kumimoji="0" lang="en-US" sz="3200" b="0" i="0" u="none" strike="noStrike" kern="1200" cap="none" spc="0" normalizeH="0" baseline="0" noProof="0" dirty="0" smtClean="0">
+                <a:ln>
+                  <a:noFill/>
+                </a:ln>
+                <a:solidFill>
+                  <a:schemeClr val="tx1"/>
+                </a:solidFill>
+                <a:effectLst/>
+                <a:uLnTx/>
+                <a:uFillTx/>
+                <a:latin typeface="Georgia"/>
+                <a:ea typeface="+mn-ea"/>
+                <a:cs typeface="Georgia"/>
+              </a:rPr>
+              <a:t> </a:t>
+            </a:r>
+            <a:r>
+              <a:rPr kumimoji="0" lang="en-US" sz="3200" b="0" i="0" u="none" strike="noStrike" kern="1200" cap="none" spc="0" normalizeH="0" baseline="0" noProof="0" dirty="0" err="1" smtClean="0">
+                <a:ln>
+                  <a:noFill/>
+                </a:ln>
+                <a:solidFill>
+                  <a:schemeClr val="tx1"/>
+                </a:solidFill>
+                <a:effectLst/>
+                <a:uLnTx/>
+                <a:uFillTx/>
+                <a:latin typeface="Georgia"/>
+                <a:ea typeface="+mn-ea"/>
+                <a:cs typeface="Georgia"/>
+              </a:rPr>
+              <a:t>pretium</a:t>
+            </a:r>
+            <a:r>
+              <a:rPr kumimoji="0" lang="en-US" sz="3200" b="0" i="0" u="none" strike="noStrike" kern="1200" cap="none" spc="0" normalizeH="0" baseline="0" noProof="0" dirty="0" smtClean="0">
+                <a:ln>
+                  <a:noFill/>
+                </a:ln>
+                <a:solidFill>
+                  <a:schemeClr val="tx1"/>
+                </a:solidFill>
+                <a:effectLst/>
+                <a:uLnTx/>
+                <a:uFillTx/>
+                <a:latin typeface="Georgia"/>
+                <a:ea typeface="+mn-ea"/>
+                <a:cs typeface="Georgia"/>
+              </a:rPr>
+              <a:t> </a:t>
+            </a:r>
+            <a:r>
+              <a:rPr kumimoji="0" lang="en-US" sz="3200" b="0" i="0" u="none" strike="noStrike" kern="1200" cap="none" spc="0" normalizeH="0" baseline="0" noProof="0" dirty="0" err="1" smtClean="0">
+                <a:ln>
+                  <a:noFill/>
+                </a:ln>
+                <a:solidFill>
+                  <a:schemeClr val="tx1"/>
+                </a:solidFill>
+                <a:effectLst/>
+                <a:uLnTx/>
+                <a:uFillTx/>
+                <a:latin typeface="Georgia"/>
+                <a:ea typeface="+mn-ea"/>
+                <a:cs typeface="Georgia"/>
+              </a:rPr>
+              <a:t>libero</a:t>
+            </a:r>
+            <a:r>
+              <a:rPr kumimoji="0" lang="en-US" sz="3200" b="0" i="0" u="none" strike="noStrike" kern="1200" cap="none" spc="0" normalizeH="0" baseline="0" noProof="0" dirty="0" smtClean="0">
+                <a:ln>
+                  <a:noFill/>
+                </a:ln>
+                <a:solidFill>
+                  <a:schemeClr val="tx1"/>
+                </a:solidFill>
+                <a:effectLst/>
+                <a:uLnTx/>
+                <a:uFillTx/>
+                <a:latin typeface="Georgia"/>
+                <a:ea typeface="+mn-ea"/>
+                <a:cs typeface="Georgia"/>
+              </a:rPr>
+              <a:t> </a:t>
+            </a:r>
+            <a:r>
+              <a:rPr kumimoji="0" lang="en-US" sz="3200" b="0" i="0" u="none" strike="noStrike" kern="1200" cap="none" spc="0" normalizeH="0" baseline="0" noProof="0" dirty="0" err="1" smtClean="0">
+                <a:ln>
+                  <a:noFill/>
+                </a:ln>
+                <a:solidFill>
+                  <a:schemeClr val="tx1"/>
+                </a:solidFill>
+                <a:effectLst/>
+                <a:uLnTx/>
+                <a:uFillTx/>
+                <a:latin typeface="Georgia"/>
+                <a:ea typeface="+mn-ea"/>
+                <a:cs typeface="Georgia"/>
+              </a:rPr>
+              <a:t>quis</a:t>
+            </a:r>
+            <a:r>
+              <a:rPr kumimoji="0" lang="en-US" sz="3200" b="0" i="0" u="none" strike="noStrike" kern="1200" cap="none" spc="0" normalizeH="0" baseline="0" noProof="0" dirty="0" smtClean="0">
+                <a:ln>
+                  <a:noFill/>
+                </a:ln>
+                <a:solidFill>
+                  <a:schemeClr val="tx1"/>
+                </a:solidFill>
+                <a:effectLst/>
+                <a:uLnTx/>
+                <a:uFillTx/>
+                <a:latin typeface="Georgia"/>
+                <a:ea typeface="+mn-ea"/>
+                <a:cs typeface="Georgia"/>
+              </a:rPr>
+              <a:t> dui </a:t>
+            </a:r>
+            <a:r>
+              <a:rPr kumimoji="0" lang="en-US" sz="3200" b="0" i="0" u="none" strike="noStrike" kern="1200" cap="none" spc="0" normalizeH="0" baseline="0" noProof="0" dirty="0" err="1" smtClean="0">
+                <a:ln>
+                  <a:noFill/>
+                </a:ln>
+                <a:solidFill>
+                  <a:schemeClr val="tx1"/>
+                </a:solidFill>
+                <a:effectLst/>
+                <a:uLnTx/>
+                <a:uFillTx/>
+                <a:latin typeface="Georgia"/>
+                <a:ea typeface="+mn-ea"/>
+                <a:cs typeface="Georgia"/>
+              </a:rPr>
+              <a:t>blandit</a:t>
+            </a:r>
+            <a:r>
+              <a:rPr kumimoji="0" lang="en-US" sz="3200" b="0" i="0" u="none" strike="noStrike" kern="1200" cap="none" spc="0" normalizeH="0" baseline="0" noProof="0" dirty="0" smtClean="0">
+                <a:ln>
+                  <a:noFill/>
+                </a:ln>
+                <a:solidFill>
+                  <a:schemeClr val="tx1"/>
+                </a:solidFill>
+                <a:effectLst/>
+                <a:uLnTx/>
+                <a:uFillTx/>
+                <a:latin typeface="Georgia"/>
+                <a:ea typeface="+mn-ea"/>
+                <a:cs typeface="Georgia"/>
+              </a:rPr>
+              <a:t> </a:t>
+            </a:r>
+            <a:r>
+              <a:rPr kumimoji="0" lang="en-US" sz="3200" b="0" i="0" u="none" strike="noStrike" kern="1200" cap="none" spc="0" normalizeH="0" baseline="0" noProof="0" dirty="0" err="1" smtClean="0">
+                <a:ln>
+                  <a:noFill/>
+                </a:ln>
+                <a:solidFill>
+                  <a:schemeClr val="tx1"/>
+                </a:solidFill>
+                <a:effectLst/>
+                <a:uLnTx/>
+                <a:uFillTx/>
+                <a:latin typeface="Georgia"/>
+                <a:ea typeface="+mn-ea"/>
+                <a:cs typeface="Georgia"/>
+              </a:rPr>
+              <a:t>pellentesque</a:t>
+            </a:r>
+            <a:r>
+              <a:rPr kumimoji="0" lang="en-US" sz="3200" b="0" i="0" u="none" strike="noStrike" kern="1200" cap="none" spc="0" normalizeH="0" baseline="0" noProof="0" dirty="0" smtClean="0">
+                <a:ln>
+                  <a:noFill/>
+                </a:ln>
+                <a:solidFill>
+                  <a:schemeClr val="tx1"/>
+                </a:solidFill>
+                <a:effectLst/>
+                <a:uLnTx/>
+                <a:uFillTx/>
+                <a:latin typeface="Georgia"/>
+                <a:ea typeface="+mn-ea"/>
+                <a:cs typeface="Georgia"/>
+              </a:rPr>
+              <a:t> </a:t>
+            </a:r>
+            <a:r>
+              <a:rPr kumimoji="0" lang="en-US" sz="3200" b="0" i="0" u="none" strike="noStrike" kern="1200" cap="none" spc="0" normalizeH="0" baseline="0" noProof="0" dirty="0" err="1" smtClean="0">
+                <a:ln>
+                  <a:noFill/>
+                </a:ln>
+                <a:solidFill>
+                  <a:schemeClr val="tx1"/>
+                </a:solidFill>
+                <a:effectLst/>
+                <a:uLnTx/>
+                <a:uFillTx/>
+                <a:latin typeface="Georgia"/>
+                <a:ea typeface="+mn-ea"/>
+                <a:cs typeface="Georgia"/>
+              </a:rPr>
+              <a:t>consequat</a:t>
+            </a:r>
+            <a:r>
+              <a:rPr kumimoji="0" lang="en-US" sz="3200" b="0" i="0" u="none" strike="noStrike" kern="1200" cap="none" spc="0" normalizeH="0" baseline="0" noProof="0" dirty="0" smtClean="0">
+                <a:ln>
+                  <a:noFill/>
+                </a:ln>
+                <a:solidFill>
+                  <a:schemeClr val="tx1"/>
+                </a:solidFill>
+                <a:effectLst/>
+                <a:uLnTx/>
+                <a:uFillTx/>
+                <a:latin typeface="Georgia"/>
+                <a:ea typeface="+mn-ea"/>
+                <a:cs typeface="Georgia"/>
+              </a:rPr>
+              <a:t> </a:t>
+            </a:r>
+            <a:r>
+              <a:rPr kumimoji="0" lang="en-US" sz="3200" b="0" i="0" u="none" strike="noStrike" kern="1200" cap="none" spc="0" normalizeH="0" baseline="0" noProof="0" dirty="0" err="1" smtClean="0">
+                <a:ln>
+                  <a:noFill/>
+                </a:ln>
+                <a:solidFill>
+                  <a:schemeClr val="tx1"/>
+                </a:solidFill>
+                <a:effectLst/>
+                <a:uLnTx/>
+                <a:uFillTx/>
+                <a:latin typeface="Georgia"/>
+                <a:ea typeface="+mn-ea"/>
+                <a:cs typeface="Georgia"/>
+              </a:rPr>
+              <a:t>libero</a:t>
+            </a:r>
+            <a:r>
+              <a:rPr kumimoji="0" lang="en-US" sz="3200" b="0" i="0" u="none" strike="noStrike" kern="1200" cap="none" spc="0" normalizeH="0" baseline="0" noProof="0" dirty="0" smtClean="0">
+                <a:ln>
+                  <a:noFill/>
+                </a:ln>
+                <a:solidFill>
+                  <a:schemeClr val="tx1"/>
+                </a:solidFill>
+                <a:effectLst/>
+                <a:uLnTx/>
+                <a:uFillTx/>
+                <a:latin typeface="Georgia"/>
+                <a:ea typeface="+mn-ea"/>
+                <a:cs typeface="Georgia"/>
+              </a:rPr>
+              <a:t> </a:t>
+            </a:r>
+            <a:r>
+              <a:rPr kumimoji="0" lang="en-US" sz="3200" b="0" i="0" u="none" strike="noStrike" kern="1200" cap="none" spc="0" normalizeH="0" baseline="0" noProof="0" dirty="0" err="1" smtClean="0">
+                <a:ln>
+                  <a:noFill/>
+                </a:ln>
+                <a:solidFill>
+                  <a:schemeClr val="tx1"/>
+                </a:solidFill>
+                <a:effectLst/>
+                <a:uLnTx/>
+                <a:uFillTx/>
+                <a:latin typeface="Georgia"/>
+                <a:ea typeface="+mn-ea"/>
+                <a:cs typeface="Georgia"/>
+              </a:rPr>
+              <a:t>gravida</a:t>
+            </a:r>
+            <a:r>
+              <a:rPr kumimoji="0" lang="en-US" sz="3200" b="0" i="0" u="none" strike="noStrike" kern="1200" cap="none" spc="0" normalizeH="0" baseline="0" noProof="0" dirty="0" smtClean="0">
+                <a:ln>
+                  <a:noFill/>
+                </a:ln>
+                <a:solidFill>
+                  <a:schemeClr val="tx1"/>
+                </a:solidFill>
+                <a:effectLst/>
+                <a:uLnTx/>
+                <a:uFillTx/>
+                <a:latin typeface="Georgia"/>
+                <a:ea typeface="+mn-ea"/>
+                <a:cs typeface="Georgia"/>
+              </a:rPr>
+              <a:t>.</a:t>
+            </a:r>
+          </a:p>
+          <a:p>
+            <a:pPr marL="342900" marR="0" lvl="0" indent="-342900" algn="l" defTabSz="457200" rtl="0" eaLnBrk="1" fontAlgn="auto" latinLnBrk="0" hangingPunct="1">
+              <a:lnSpc>
+                <a:spcPct val="100000"/>
+              </a:lnSpc>
+              <a:spcBef>
+                <a:spcPct val="20000"/>
+              </a:spcBef>
+              <a:spcAft>
+                <a:spcPts val="0"/>
+              </a:spcAft>
+              <a:buClrTx/>
+              <a:buSzTx/>
+              <a:buFont typeface="Arial"/>
+              <a:buChar char="•"/>
+              <a:tabLst/>
+              <a:defRPr/>
+            </a:pPr>
+            <a:r>
+              <a:rPr kumimoji="0" lang="en-US" sz="3200" b="0" i="0" u="none" strike="noStrike" kern="1200" cap="none" spc="0" normalizeH="0" baseline="0" noProof="0" dirty="0" smtClean="0">
+                <a:ln>
+                  <a:noFill/>
+                </a:ln>
+                <a:solidFill>
+                  <a:schemeClr val="tx1"/>
+                </a:solidFill>
+                <a:effectLst/>
+                <a:uLnTx/>
+                <a:uFillTx/>
+                <a:latin typeface="Georgia"/>
+                <a:ea typeface="+mn-ea"/>
+                <a:cs typeface="Georgia"/>
+              </a:rPr>
+              <a:t>In </a:t>
+            </a:r>
+            <a:r>
+              <a:rPr kumimoji="0" lang="en-US" sz="3200" b="0" i="0" u="none" strike="noStrike" kern="1200" cap="none" spc="0" normalizeH="0" baseline="0" noProof="0" dirty="0" err="1" smtClean="0">
+                <a:ln>
+                  <a:noFill/>
+                </a:ln>
+                <a:solidFill>
+                  <a:schemeClr val="tx1"/>
+                </a:solidFill>
+                <a:effectLst/>
+                <a:uLnTx/>
+                <a:uFillTx/>
+                <a:latin typeface="Georgia"/>
+                <a:ea typeface="+mn-ea"/>
+                <a:cs typeface="Georgia"/>
+              </a:rPr>
+              <a:t>venenatis</a:t>
+            </a:r>
+            <a:r>
+              <a:rPr kumimoji="0" lang="en-US" sz="3200" b="0" i="0" u="none" strike="noStrike" kern="1200" cap="none" spc="0" normalizeH="0" baseline="0" noProof="0" dirty="0" smtClean="0">
+                <a:ln>
+                  <a:noFill/>
+                </a:ln>
+                <a:solidFill>
+                  <a:schemeClr val="tx1"/>
+                </a:solidFill>
+                <a:effectLst/>
+                <a:uLnTx/>
+                <a:uFillTx/>
+                <a:latin typeface="Georgia"/>
+                <a:ea typeface="+mn-ea"/>
+                <a:cs typeface="Georgia"/>
+              </a:rPr>
+              <a:t> lacus </a:t>
+            </a:r>
+            <a:r>
+              <a:rPr kumimoji="0" lang="en-US" sz="3200" b="0" i="0" u="none" strike="noStrike" kern="1200" cap="none" spc="0" normalizeH="0" baseline="0" noProof="0" dirty="0" err="1" smtClean="0">
+                <a:ln>
+                  <a:noFill/>
+                </a:ln>
+                <a:solidFill>
+                  <a:schemeClr val="tx1"/>
+                </a:solidFill>
+                <a:effectLst/>
+                <a:uLnTx/>
+                <a:uFillTx/>
+                <a:latin typeface="Georgia"/>
+                <a:ea typeface="+mn-ea"/>
+                <a:cs typeface="Georgia"/>
+              </a:rPr>
+              <a:t>imperdiet</a:t>
+            </a:r>
+            <a:r>
+              <a:rPr kumimoji="0" lang="en-US" sz="3200" b="0" i="0" u="none" strike="noStrike" kern="1200" cap="none" spc="0" normalizeH="0" baseline="0" noProof="0" dirty="0" smtClean="0">
+                <a:ln>
+                  <a:noFill/>
+                </a:ln>
+                <a:solidFill>
+                  <a:schemeClr val="tx1"/>
+                </a:solidFill>
+                <a:effectLst/>
+                <a:uLnTx/>
+                <a:uFillTx/>
+                <a:latin typeface="Georgia"/>
+                <a:ea typeface="+mn-ea"/>
+                <a:cs typeface="Georgia"/>
+              </a:rPr>
+              <a:t> </a:t>
+            </a:r>
+            <a:r>
+              <a:rPr kumimoji="0" lang="en-US" sz="3200" b="0" i="0" u="none" strike="noStrike" kern="1200" cap="none" spc="0" normalizeH="0" baseline="0" noProof="0" dirty="0" err="1" smtClean="0">
+                <a:ln>
+                  <a:noFill/>
+                </a:ln>
+                <a:solidFill>
+                  <a:schemeClr val="tx1"/>
+                </a:solidFill>
+                <a:effectLst/>
+                <a:uLnTx/>
+                <a:uFillTx/>
+                <a:latin typeface="Georgia"/>
+                <a:ea typeface="+mn-ea"/>
+                <a:cs typeface="Georgia"/>
+              </a:rPr>
+              <a:t>tellus</a:t>
+            </a:r>
+            <a:r>
+              <a:rPr kumimoji="0" lang="en-US" sz="3200" b="0" i="0" u="none" strike="noStrike" kern="1200" cap="none" spc="0" normalizeH="0" baseline="0" noProof="0" dirty="0" smtClean="0">
+                <a:ln>
+                  <a:noFill/>
+                </a:ln>
+                <a:solidFill>
+                  <a:schemeClr val="tx1"/>
+                </a:solidFill>
+                <a:effectLst/>
+                <a:uLnTx/>
+                <a:uFillTx/>
+                <a:latin typeface="Georgia"/>
+                <a:ea typeface="+mn-ea"/>
+                <a:cs typeface="Georgia"/>
+              </a:rPr>
+              <a:t> </a:t>
+            </a:r>
+            <a:r>
+              <a:rPr kumimoji="0" lang="en-US" sz="3200" b="0" i="0" u="none" strike="noStrike" kern="1200" cap="none" spc="0" normalizeH="0" baseline="0" noProof="0" dirty="0" err="1" smtClean="0">
+                <a:ln>
+                  <a:noFill/>
+                </a:ln>
+                <a:solidFill>
+                  <a:schemeClr val="tx1"/>
+                </a:solidFill>
+                <a:effectLst/>
+                <a:uLnTx/>
+                <a:uFillTx/>
+                <a:latin typeface="Georgia"/>
+                <a:ea typeface="+mn-ea"/>
+                <a:cs typeface="Georgia"/>
+              </a:rPr>
+              <a:t>rutrum</a:t>
+            </a:r>
+            <a:r>
+              <a:rPr kumimoji="0" lang="en-US" sz="3200" b="0" i="0" u="none" strike="noStrike" kern="1200" cap="none" spc="0" normalizeH="0" baseline="0" noProof="0" dirty="0" smtClean="0">
+                <a:ln>
+                  <a:noFill/>
+                </a:ln>
+                <a:solidFill>
+                  <a:schemeClr val="tx1"/>
+                </a:solidFill>
+                <a:effectLst/>
+                <a:uLnTx/>
+                <a:uFillTx/>
+                <a:latin typeface="Georgia"/>
+                <a:ea typeface="+mn-ea"/>
+                <a:cs typeface="Georgia"/>
+              </a:rPr>
+              <a:t> </a:t>
+            </a:r>
+            <a:r>
+              <a:rPr kumimoji="0" lang="en-US" sz="3200" b="0" i="0" u="none" strike="noStrike" kern="1200" cap="none" spc="0" normalizeH="0" baseline="0" noProof="0" dirty="0" err="1" smtClean="0">
+                <a:ln>
+                  <a:noFill/>
+                </a:ln>
+                <a:solidFill>
+                  <a:schemeClr val="tx1"/>
+                </a:solidFill>
+                <a:effectLst/>
+                <a:uLnTx/>
+                <a:uFillTx/>
+                <a:latin typeface="Georgia"/>
+                <a:ea typeface="+mn-ea"/>
+                <a:cs typeface="Georgia"/>
+              </a:rPr>
+              <a:t>auctor</a:t>
+            </a:r>
+            <a:r>
+              <a:rPr kumimoji="0" lang="en-US" sz="3200" b="0" i="0" u="none" strike="noStrike" kern="1200" cap="none" spc="0" normalizeH="0" baseline="0" noProof="0" dirty="0" smtClean="0">
+                <a:ln>
+                  <a:noFill/>
+                </a:ln>
+                <a:solidFill>
+                  <a:schemeClr val="tx1"/>
+                </a:solidFill>
+                <a:effectLst/>
+                <a:uLnTx/>
+                <a:uFillTx/>
+                <a:latin typeface="Georgia"/>
+                <a:ea typeface="+mn-ea"/>
+                <a:cs typeface="Georgia"/>
+              </a:rPr>
+              <a:t>.</a:t>
+            </a:r>
+          </a:p>
+          <a:p>
+            <a:pPr marL="342900" marR="0" lvl="0" indent="-342900" algn="l" defTabSz="457200" rtl="0" eaLnBrk="1" fontAlgn="auto" latinLnBrk="0" hangingPunct="1">
+              <a:lnSpc>
+                <a:spcPct val="100000"/>
+              </a:lnSpc>
+              <a:spcBef>
+                <a:spcPct val="20000"/>
+              </a:spcBef>
+              <a:spcAft>
+                <a:spcPts val="0"/>
+              </a:spcAft>
+              <a:buClrTx/>
+              <a:buSzTx/>
+              <a:buFont typeface="Arial"/>
+              <a:buChar char="•"/>
+              <a:tabLst/>
+              <a:defRPr/>
+            </a:pPr>
+            <a:r>
+              <a:rPr kumimoji="0" lang="en-US" sz="3200" b="0" i="0" u="none" strike="noStrike" kern="1200" cap="none" spc="0" normalizeH="0" baseline="0" noProof="0" dirty="0" err="1" smtClean="0">
+                <a:ln>
+                  <a:noFill/>
+                </a:ln>
+                <a:solidFill>
+                  <a:schemeClr val="tx1"/>
+                </a:solidFill>
+                <a:effectLst/>
+                <a:uLnTx/>
+                <a:uFillTx/>
+                <a:latin typeface="Georgia"/>
+                <a:ea typeface="+mn-ea"/>
+                <a:cs typeface="Georgia"/>
+              </a:rPr>
+              <a:t>Curabitur</a:t>
+            </a:r>
+            <a:r>
+              <a:rPr kumimoji="0" lang="en-US" sz="3200" b="0" i="0" u="none" strike="noStrike" kern="1200" cap="none" spc="0" normalizeH="0" baseline="0" noProof="0" dirty="0" smtClean="0">
+                <a:ln>
+                  <a:noFill/>
+                </a:ln>
+                <a:solidFill>
+                  <a:schemeClr val="tx1"/>
+                </a:solidFill>
+                <a:effectLst/>
+                <a:uLnTx/>
+                <a:uFillTx/>
+                <a:latin typeface="Georgia"/>
+                <a:ea typeface="+mn-ea"/>
+                <a:cs typeface="Georgia"/>
+              </a:rPr>
+              <a:t> </a:t>
+            </a:r>
+            <a:r>
+              <a:rPr kumimoji="0" lang="en-US" sz="3200" b="0" i="0" u="none" strike="noStrike" kern="1200" cap="none" spc="0" normalizeH="0" baseline="0" noProof="0" dirty="0" err="1" smtClean="0">
+                <a:ln>
+                  <a:noFill/>
+                </a:ln>
+                <a:solidFill>
+                  <a:schemeClr val="tx1"/>
+                </a:solidFill>
+                <a:effectLst/>
+                <a:uLnTx/>
+                <a:uFillTx/>
+                <a:latin typeface="Georgia"/>
+                <a:ea typeface="+mn-ea"/>
+                <a:cs typeface="Georgia"/>
+              </a:rPr>
+              <a:t>condimentum</a:t>
+            </a:r>
+            <a:r>
+              <a:rPr kumimoji="0" lang="en-US" sz="3200" b="0" i="0" u="none" strike="noStrike" kern="1200" cap="none" spc="0" normalizeH="0" baseline="0" noProof="0" dirty="0" smtClean="0">
+                <a:ln>
+                  <a:noFill/>
+                </a:ln>
+                <a:solidFill>
+                  <a:schemeClr val="tx1"/>
+                </a:solidFill>
+                <a:effectLst/>
+                <a:uLnTx/>
+                <a:uFillTx/>
+                <a:latin typeface="Georgia"/>
+                <a:ea typeface="+mn-ea"/>
+                <a:cs typeface="Georgia"/>
+              </a:rPr>
+              <a:t> </a:t>
+            </a:r>
+            <a:r>
+              <a:rPr kumimoji="0" lang="en-US" sz="3200" b="0" i="0" u="none" strike="noStrike" kern="1200" cap="none" spc="0" normalizeH="0" baseline="0" noProof="0" dirty="0" err="1" smtClean="0">
+                <a:ln>
+                  <a:noFill/>
+                </a:ln>
+                <a:solidFill>
+                  <a:schemeClr val="tx1"/>
+                </a:solidFill>
+                <a:effectLst/>
+                <a:uLnTx/>
+                <a:uFillTx/>
+                <a:latin typeface="Georgia"/>
+                <a:ea typeface="+mn-ea"/>
+                <a:cs typeface="Georgia"/>
+              </a:rPr>
+              <a:t>consequat</a:t>
+            </a:r>
+            <a:r>
+              <a:rPr kumimoji="0" lang="en-US" sz="3200" b="0" i="0" u="none" strike="noStrike" kern="1200" cap="none" spc="0" normalizeH="0" baseline="0" noProof="0" dirty="0" smtClean="0">
+                <a:ln>
+                  <a:noFill/>
+                </a:ln>
+                <a:solidFill>
+                  <a:schemeClr val="tx1"/>
+                </a:solidFill>
+                <a:effectLst/>
+                <a:uLnTx/>
+                <a:uFillTx/>
+                <a:latin typeface="Georgia"/>
+                <a:ea typeface="+mn-ea"/>
+                <a:cs typeface="Georgia"/>
+              </a:rPr>
+              <a:t> nisi, in </a:t>
+            </a:r>
+            <a:r>
+              <a:rPr kumimoji="0" lang="en-US" sz="3200" b="0" i="0" u="none" strike="noStrike" kern="1200" cap="none" spc="0" normalizeH="0" baseline="0" noProof="0" dirty="0" err="1" smtClean="0">
+                <a:ln>
+                  <a:noFill/>
+                </a:ln>
+                <a:solidFill>
+                  <a:schemeClr val="tx1"/>
+                </a:solidFill>
+                <a:effectLst/>
+                <a:uLnTx/>
+                <a:uFillTx/>
+                <a:latin typeface="Georgia"/>
+                <a:ea typeface="+mn-ea"/>
+                <a:cs typeface="Georgia"/>
+              </a:rPr>
+              <a:t>aliquam</a:t>
+            </a:r>
+            <a:r>
+              <a:rPr kumimoji="0" lang="en-US" sz="3200" b="0" i="0" u="none" strike="noStrike" kern="1200" cap="none" spc="0" normalizeH="0" baseline="0" noProof="0" dirty="0" smtClean="0">
+                <a:ln>
+                  <a:noFill/>
+                </a:ln>
+                <a:solidFill>
+                  <a:schemeClr val="tx1"/>
+                </a:solidFill>
+                <a:effectLst/>
+                <a:uLnTx/>
+                <a:uFillTx/>
+                <a:latin typeface="Georgia"/>
+                <a:ea typeface="+mn-ea"/>
+                <a:cs typeface="Georgia"/>
+              </a:rPr>
+              <a:t> </a:t>
+            </a:r>
+            <a:r>
+              <a:rPr kumimoji="0" lang="en-US" sz="3200" b="0" i="0" u="none" strike="noStrike" kern="1200" cap="none" spc="0" normalizeH="0" baseline="0" noProof="0" dirty="0" err="1" smtClean="0">
+                <a:ln>
+                  <a:noFill/>
+                </a:ln>
+                <a:solidFill>
+                  <a:schemeClr val="tx1"/>
+                </a:solidFill>
+                <a:effectLst/>
+                <a:uLnTx/>
+                <a:uFillTx/>
+                <a:latin typeface="Georgia"/>
+                <a:ea typeface="+mn-ea"/>
+                <a:cs typeface="Georgia"/>
+              </a:rPr>
+              <a:t>nibh</a:t>
+            </a:r>
+            <a:r>
+              <a:rPr kumimoji="0" lang="en-US" sz="3200" b="0" i="0" u="none" strike="noStrike" kern="1200" cap="none" spc="0" normalizeH="0" baseline="0" noProof="0" dirty="0" smtClean="0">
+                <a:ln>
+                  <a:noFill/>
+                </a:ln>
+                <a:solidFill>
+                  <a:schemeClr val="tx1"/>
+                </a:solidFill>
+                <a:effectLst/>
+                <a:uLnTx/>
+                <a:uFillTx/>
+                <a:latin typeface="Georgia"/>
+                <a:ea typeface="+mn-ea"/>
+                <a:cs typeface="Georgia"/>
+              </a:rPr>
+              <a:t> </a:t>
+            </a:r>
+            <a:r>
+              <a:rPr kumimoji="0" lang="en-US" sz="3200" b="0" i="0" u="none" strike="noStrike" kern="1200" cap="none" spc="0" normalizeH="0" baseline="0" noProof="0" dirty="0" err="1" smtClean="0">
+                <a:ln>
+                  <a:noFill/>
+                </a:ln>
+                <a:solidFill>
+                  <a:schemeClr val="tx1"/>
+                </a:solidFill>
+                <a:effectLst/>
+                <a:uLnTx/>
+                <a:uFillTx/>
+                <a:latin typeface="Georgia"/>
+                <a:ea typeface="+mn-ea"/>
+                <a:cs typeface="Georgia"/>
+              </a:rPr>
+              <a:t>placerat</a:t>
+            </a:r>
+            <a:r>
+              <a:rPr kumimoji="0" lang="en-US" sz="3200" b="0" i="0" u="none" strike="noStrike" kern="1200" cap="none" spc="0" normalizeH="0" baseline="0" noProof="0" dirty="0" smtClean="0">
+                <a:ln>
+                  <a:noFill/>
+                </a:ln>
+                <a:solidFill>
+                  <a:schemeClr val="tx1"/>
+                </a:solidFill>
+                <a:effectLst/>
+                <a:uLnTx/>
+                <a:uFillTx/>
+                <a:latin typeface="Georgia"/>
+                <a:ea typeface="+mn-ea"/>
+                <a:cs typeface="Georgia"/>
+              </a:rPr>
+              <a:t> vel.</a:t>
+            </a:r>
+          </a:p>
+          <a:p>
+            <a:pPr marL="342900" marR="0" lvl="0" indent="-342900" algn="l" defTabSz="457200" rtl="0" eaLnBrk="1" fontAlgn="auto" latinLnBrk="0" hangingPunct="1">
+              <a:lnSpc>
+                <a:spcPct val="100000"/>
+              </a:lnSpc>
+              <a:spcBef>
+                <a:spcPct val="20000"/>
+              </a:spcBef>
+              <a:spcAft>
+                <a:spcPts val="0"/>
+              </a:spcAft>
+              <a:buClrTx/>
+              <a:buSzTx/>
+              <a:buFont typeface="Arial"/>
+              <a:buChar char="•"/>
+              <a:tabLst/>
+              <a:defRPr/>
+            </a:pPr>
+            <a:r>
+              <a:rPr kumimoji="0" lang="en-US" sz="3200" b="0" i="0" u="none" strike="noStrike" kern="1200" cap="none" spc="0" normalizeH="0" baseline="0" noProof="0" dirty="0" err="1" smtClean="0">
+                <a:ln>
+                  <a:noFill/>
+                </a:ln>
+                <a:solidFill>
+                  <a:schemeClr val="tx1"/>
+                </a:solidFill>
+                <a:effectLst/>
+                <a:uLnTx/>
+                <a:uFillTx/>
+                <a:latin typeface="Georgia"/>
+                <a:ea typeface="+mn-ea"/>
+                <a:cs typeface="Georgia"/>
+              </a:rPr>
+              <a:t>Curabitur</a:t>
+            </a:r>
+            <a:r>
+              <a:rPr kumimoji="0" lang="en-US" sz="3200" b="0" i="0" u="none" strike="noStrike" kern="1200" cap="none" spc="0" normalizeH="0" baseline="0" noProof="0" dirty="0" smtClean="0">
+                <a:ln>
+                  <a:noFill/>
+                </a:ln>
+                <a:solidFill>
+                  <a:schemeClr val="tx1"/>
+                </a:solidFill>
+                <a:effectLst/>
+                <a:uLnTx/>
+                <a:uFillTx/>
+                <a:latin typeface="Georgia"/>
+                <a:ea typeface="+mn-ea"/>
+                <a:cs typeface="Georgia"/>
+              </a:rPr>
+              <a:t> et </a:t>
+            </a:r>
+            <a:r>
+              <a:rPr kumimoji="0" lang="en-US" sz="3200" b="0" i="0" u="none" strike="noStrike" kern="1200" cap="none" spc="0" normalizeH="0" baseline="0" noProof="0" dirty="0" err="1" smtClean="0">
+                <a:ln>
+                  <a:noFill/>
+                </a:ln>
+                <a:solidFill>
+                  <a:schemeClr val="tx1"/>
+                </a:solidFill>
+                <a:effectLst/>
+                <a:uLnTx/>
+                <a:uFillTx/>
+                <a:latin typeface="Georgia"/>
+                <a:ea typeface="+mn-ea"/>
+                <a:cs typeface="Georgia"/>
+              </a:rPr>
+              <a:t>purus</a:t>
+            </a:r>
+            <a:r>
+              <a:rPr kumimoji="0" lang="en-US" sz="3200" b="0" i="0" u="none" strike="noStrike" kern="1200" cap="none" spc="0" normalizeH="0" baseline="0" noProof="0" dirty="0" smtClean="0">
+                <a:ln>
+                  <a:noFill/>
+                </a:ln>
+                <a:solidFill>
+                  <a:schemeClr val="tx1"/>
+                </a:solidFill>
+                <a:effectLst/>
+                <a:uLnTx/>
+                <a:uFillTx/>
+                <a:latin typeface="Georgia"/>
+                <a:ea typeface="+mn-ea"/>
+                <a:cs typeface="Georgia"/>
+              </a:rPr>
+              <a:t> </a:t>
+            </a:r>
+            <a:r>
+              <a:rPr kumimoji="0" lang="en-US" sz="3200" b="0" i="0" u="none" strike="noStrike" kern="1200" cap="none" spc="0" normalizeH="0" baseline="0" noProof="0" dirty="0" err="1" smtClean="0">
+                <a:ln>
+                  <a:noFill/>
+                </a:ln>
+                <a:solidFill>
+                  <a:schemeClr val="tx1"/>
+                </a:solidFill>
+                <a:effectLst/>
+                <a:uLnTx/>
+                <a:uFillTx/>
+                <a:latin typeface="Georgia"/>
+                <a:ea typeface="+mn-ea"/>
+                <a:cs typeface="Georgia"/>
+              </a:rPr>
+              <a:t>est</a:t>
+            </a:r>
+            <a:r>
+              <a:rPr kumimoji="0" lang="en-US" sz="3200" b="0" i="0" u="none" strike="noStrike" kern="1200" cap="none" spc="0" normalizeH="0" baseline="0" noProof="0" dirty="0" smtClean="0">
+                <a:ln>
+                  <a:noFill/>
+                </a:ln>
+                <a:solidFill>
+                  <a:schemeClr val="tx1"/>
+                </a:solidFill>
+                <a:effectLst/>
+                <a:uLnTx/>
+                <a:uFillTx/>
+                <a:latin typeface="Georgia"/>
+                <a:ea typeface="+mn-ea"/>
+                <a:cs typeface="Georgia"/>
+              </a:rPr>
+              <a:t>, at </a:t>
+            </a:r>
+            <a:r>
+              <a:rPr kumimoji="0" lang="en-US" sz="3200" b="0" i="0" u="none" strike="noStrike" kern="1200" cap="none" spc="0" normalizeH="0" baseline="0" noProof="0" dirty="0" err="1" smtClean="0">
+                <a:ln>
+                  <a:noFill/>
+                </a:ln>
+                <a:solidFill>
+                  <a:schemeClr val="tx1"/>
+                </a:solidFill>
+                <a:effectLst/>
+                <a:uLnTx/>
+                <a:uFillTx/>
+                <a:latin typeface="Georgia"/>
+                <a:ea typeface="+mn-ea"/>
+                <a:cs typeface="Georgia"/>
+              </a:rPr>
+              <a:t>facilisis</a:t>
+            </a:r>
+            <a:r>
+              <a:rPr kumimoji="0" lang="en-US" sz="3200" b="0" i="0" u="none" strike="noStrike" kern="1200" cap="none" spc="0" normalizeH="0" baseline="0" noProof="0" dirty="0" smtClean="0">
+                <a:ln>
+                  <a:noFill/>
+                </a:ln>
+                <a:solidFill>
+                  <a:schemeClr val="tx1"/>
+                </a:solidFill>
+                <a:effectLst/>
+                <a:uLnTx/>
+                <a:uFillTx/>
+                <a:latin typeface="Georgia"/>
+                <a:ea typeface="+mn-ea"/>
+                <a:cs typeface="Georgia"/>
+              </a:rPr>
+              <a:t> </a:t>
+            </a:r>
+            <a:r>
+              <a:rPr kumimoji="0" lang="en-US" sz="3200" b="0" i="0" u="none" strike="noStrike" kern="1200" cap="none" spc="0" normalizeH="0" baseline="0" noProof="0" dirty="0" err="1" smtClean="0">
+                <a:ln>
+                  <a:noFill/>
+                </a:ln>
+                <a:solidFill>
+                  <a:schemeClr val="tx1"/>
+                </a:solidFill>
+                <a:effectLst/>
+                <a:uLnTx/>
+                <a:uFillTx/>
+                <a:latin typeface="Georgia"/>
+                <a:ea typeface="+mn-ea"/>
+                <a:cs typeface="Georgia"/>
+              </a:rPr>
+              <a:t>nisl</a:t>
+            </a:r>
+            <a:r>
+              <a:rPr kumimoji="0" lang="en-US" sz="3200" b="0" i="0" u="none" strike="noStrike" kern="1200" cap="none" spc="0" normalizeH="0" baseline="0" noProof="0" dirty="0" smtClean="0">
+                <a:ln>
+                  <a:noFill/>
+                </a:ln>
+                <a:solidFill>
+                  <a:schemeClr val="tx1"/>
+                </a:solidFill>
+                <a:effectLst/>
+                <a:uLnTx/>
+                <a:uFillTx/>
+                <a:latin typeface="Georgia"/>
+                <a:ea typeface="+mn-ea"/>
+                <a:cs typeface="Georgia"/>
+              </a:rPr>
+              <a:t>.</a:t>
+            </a:r>
+          </a:p>
+          <a:p>
+            <a:pPr marL="342900" marR="0" lvl="0" indent="-342900" algn="l" defTabSz="457200" rtl="0" eaLnBrk="1" fontAlgn="auto" latinLnBrk="0" hangingPunct="1">
+              <a:lnSpc>
+                <a:spcPct val="100000"/>
+              </a:lnSpc>
+              <a:spcBef>
+                <a:spcPct val="20000"/>
+              </a:spcBef>
+              <a:spcAft>
+                <a:spcPts val="0"/>
+              </a:spcAft>
+              <a:buClrTx/>
+              <a:buSzTx/>
+              <a:buFont typeface="Arial"/>
+              <a:buChar char="•"/>
+              <a:tabLst/>
+              <a:defRPr/>
+            </a:pPr>
+            <a:r>
+              <a:rPr kumimoji="0" lang="en-US" sz="3200" b="0" i="0" u="none" strike="noStrike" kern="1200" cap="none" spc="0" normalizeH="0" baseline="0" noProof="0" dirty="0" err="1" smtClean="0">
+                <a:ln>
+                  <a:noFill/>
+                </a:ln>
+                <a:solidFill>
+                  <a:schemeClr val="tx1"/>
+                </a:solidFill>
+                <a:effectLst/>
+                <a:uLnTx/>
+                <a:uFillTx/>
+                <a:latin typeface="Georgia"/>
+                <a:ea typeface="+mn-ea"/>
+                <a:cs typeface="Georgia"/>
+              </a:rPr>
+              <a:t>Aenean</a:t>
+            </a:r>
+            <a:r>
+              <a:rPr kumimoji="0" lang="en-US" sz="3200" b="0" i="0" u="none" strike="noStrike" kern="1200" cap="none" spc="0" normalizeH="0" baseline="0" noProof="0" dirty="0" smtClean="0">
+                <a:ln>
+                  <a:noFill/>
+                </a:ln>
+                <a:solidFill>
+                  <a:schemeClr val="tx1"/>
+                </a:solidFill>
+                <a:effectLst/>
+                <a:uLnTx/>
+                <a:uFillTx/>
+                <a:latin typeface="Georgia"/>
+                <a:ea typeface="+mn-ea"/>
+                <a:cs typeface="Georgia"/>
+              </a:rPr>
+              <a:t> </a:t>
+            </a:r>
+            <a:r>
+              <a:rPr kumimoji="0" lang="en-US" sz="3200" b="0" i="0" u="none" strike="noStrike" kern="1200" cap="none" spc="0" normalizeH="0" baseline="0" noProof="0" dirty="0" err="1" smtClean="0">
+                <a:ln>
+                  <a:noFill/>
+                </a:ln>
+                <a:solidFill>
+                  <a:schemeClr val="tx1"/>
+                </a:solidFill>
+                <a:effectLst/>
+                <a:uLnTx/>
+                <a:uFillTx/>
+                <a:latin typeface="Georgia"/>
+                <a:ea typeface="+mn-ea"/>
+                <a:cs typeface="Georgia"/>
+              </a:rPr>
+              <a:t>posuere</a:t>
+            </a:r>
+            <a:r>
+              <a:rPr kumimoji="0" lang="en-US" sz="3200" b="0" i="0" u="none" strike="noStrike" kern="1200" cap="none" spc="0" normalizeH="0" baseline="0" noProof="0" dirty="0" smtClean="0">
+                <a:ln>
+                  <a:noFill/>
+                </a:ln>
+                <a:solidFill>
+                  <a:schemeClr val="tx1"/>
+                </a:solidFill>
+                <a:effectLst/>
+                <a:uLnTx/>
+                <a:uFillTx/>
+                <a:latin typeface="Georgia"/>
+                <a:ea typeface="+mn-ea"/>
+                <a:cs typeface="Georgia"/>
+              </a:rPr>
+              <a:t> lacus non </a:t>
+            </a:r>
+            <a:r>
+              <a:rPr kumimoji="0" lang="en-US" sz="3200" b="0" i="0" u="none" strike="noStrike" kern="1200" cap="none" spc="0" normalizeH="0" baseline="0" noProof="0" dirty="0" err="1" smtClean="0">
+                <a:ln>
+                  <a:noFill/>
+                </a:ln>
+                <a:solidFill>
+                  <a:schemeClr val="tx1"/>
+                </a:solidFill>
+                <a:effectLst/>
+                <a:uLnTx/>
+                <a:uFillTx/>
+                <a:latin typeface="Georgia"/>
+                <a:ea typeface="+mn-ea"/>
+                <a:cs typeface="Georgia"/>
+              </a:rPr>
+              <a:t>lectus</a:t>
+            </a:r>
+            <a:r>
+              <a:rPr kumimoji="0" lang="en-US" sz="3200" b="0" i="0" u="none" strike="noStrike" kern="1200" cap="none" spc="0" normalizeH="0" baseline="0" noProof="0" dirty="0" smtClean="0">
+                <a:ln>
+                  <a:noFill/>
+                </a:ln>
+                <a:solidFill>
+                  <a:schemeClr val="tx1"/>
+                </a:solidFill>
+                <a:effectLst/>
+                <a:uLnTx/>
+                <a:uFillTx/>
+                <a:latin typeface="Georgia"/>
+                <a:ea typeface="+mn-ea"/>
+                <a:cs typeface="Georgia"/>
+              </a:rPr>
+              <a:t> </a:t>
+            </a:r>
+            <a:r>
+              <a:rPr kumimoji="0" lang="en-US" sz="3200" b="0" i="0" u="none" strike="noStrike" kern="1200" cap="none" spc="0" normalizeH="0" baseline="0" noProof="0" dirty="0" err="1" smtClean="0">
+                <a:ln>
+                  <a:noFill/>
+                </a:ln>
+                <a:solidFill>
+                  <a:schemeClr val="tx1"/>
+                </a:solidFill>
+                <a:effectLst/>
+                <a:uLnTx/>
+                <a:uFillTx/>
+                <a:latin typeface="Georgia"/>
+                <a:ea typeface="+mn-ea"/>
+                <a:cs typeface="Georgia"/>
+              </a:rPr>
+              <a:t>malesuada</a:t>
+            </a:r>
+            <a:r>
+              <a:rPr kumimoji="0" lang="en-US" sz="3200" b="0" i="0" u="none" strike="noStrike" kern="1200" cap="none" spc="0" normalizeH="0" baseline="0" noProof="0" dirty="0" smtClean="0">
+                <a:ln>
+                  <a:noFill/>
+                </a:ln>
+                <a:solidFill>
+                  <a:schemeClr val="tx1"/>
+                </a:solidFill>
+                <a:effectLst/>
+                <a:uLnTx/>
+                <a:uFillTx/>
+                <a:latin typeface="Georgia"/>
+                <a:ea typeface="+mn-ea"/>
+                <a:cs typeface="Georgia"/>
+              </a:rPr>
+              <a:t> </a:t>
+            </a:r>
+            <a:r>
+              <a:rPr kumimoji="0" lang="en-US" sz="3200" b="0" i="0" u="none" strike="noStrike" kern="1200" cap="none" spc="0" normalizeH="0" baseline="0" noProof="0" dirty="0" err="1" smtClean="0">
+                <a:ln>
+                  <a:noFill/>
+                </a:ln>
+                <a:solidFill>
+                  <a:schemeClr val="tx1"/>
+                </a:solidFill>
+                <a:effectLst/>
+                <a:uLnTx/>
+                <a:uFillTx/>
+                <a:latin typeface="Georgia"/>
+                <a:ea typeface="+mn-ea"/>
+                <a:cs typeface="Georgia"/>
+              </a:rPr>
+              <a:t>congue</a:t>
+            </a:r>
+            <a:r>
+              <a:rPr kumimoji="0" lang="en-US" sz="3200" b="0" i="0" u="none" strike="noStrike" kern="1200" cap="none" spc="0" normalizeH="0" baseline="0" noProof="0" dirty="0" smtClean="0">
+                <a:ln>
+                  <a:noFill/>
+                </a:ln>
+                <a:solidFill>
+                  <a:schemeClr val="tx1"/>
+                </a:solidFill>
+                <a:effectLst/>
+                <a:uLnTx/>
+                <a:uFillTx/>
+                <a:latin typeface="Georgia"/>
+                <a:ea typeface="+mn-ea"/>
+                <a:cs typeface="Georgia"/>
+              </a:rPr>
+              <a:t>.</a:t>
+            </a:r>
+          </a:p>
+        </p:txBody>
+      </p:sp>
+    </p:spTree>
+    <p:extLst>
+      <p:ext uri="{BB962C8B-B14F-4D97-AF65-F5344CB8AC3E}">
+        <p14:creationId xmlns:p14="http://schemas.microsoft.com/office/powerpoint/2010/main" val="928428116"/>
+      </p:ext>
+    </p:extLst>
+  </p:cSld>
+  <p:clrMapOvr>
+    <a:masterClrMapping/>
+  </p:clrMapOvr>
+  <p:timing>
+    <p:tnLst>
+      <p:par>
+        <p:cTn id="1" dur="indefinite" restart="never" nodeType="tmRoot"/>
       </p:par>
     </p:tnLst>
   </p:timing>
@@ -3179,11 +6146,7 @@
           <a:p>
             <a:r>
               <a:rPr lang="en-US" dirty="0" smtClean="0"/>
-              <a:t>Click to </a:t>
-            </a:r>
-            <a:r>
-              <a:rPr lang="en-US" smtClean="0"/>
-              <a:t>add title</a:t>
+              <a:t>Why Genetic Programming?</a:t>
             </a:r>
             <a:endParaRPr lang="en-US" dirty="0"/>
           </a:p>
@@ -3213,6 +6176,1482 @@
               <a:rPr lang="en-US" smtClean="0"/>
               <a:pPr/>
               <a:t>2</a:t>
+            </a:fld>
+            <a:endParaRPr lang="en-US" dirty="0"/>
+          </a:p>
+        </p:txBody>
+      </p:sp>
+      <p:sp>
+        <p:nvSpPr>
+          <p:cNvPr id="4" name="Content Placeholder 2"/>
+          <p:cNvSpPr txBox="1">
+            <a:spLocks/>
+          </p:cNvSpPr>
+          <p:nvPr/>
+        </p:nvSpPr>
+        <p:spPr>
+          <a:xfrm>
+            <a:off x="1622812" y="1651000"/>
+            <a:ext cx="7063988" cy="4072754"/>
+          </a:xfrm>
+          <a:prstGeom prst="rect">
+            <a:avLst/>
+          </a:prstGeom>
+        </p:spPr>
+        <p:txBody>
+          <a:bodyPr vert="horz" lIns="91440" tIns="45720" rIns="91440" bIns="45720" rtlCol="0">
+            <a:normAutofit/>
+          </a:bodyPr>
+          <a:lstStyle/>
+          <a:p>
+            <a:pPr marL="342900" marR="0" lvl="0" indent="-342900" algn="l" defTabSz="457200" rtl="0" eaLnBrk="1" fontAlgn="auto" latinLnBrk="0" hangingPunct="1">
+              <a:lnSpc>
+                <a:spcPct val="100000"/>
+              </a:lnSpc>
+              <a:spcBef>
+                <a:spcPct val="20000"/>
+              </a:spcBef>
+              <a:spcAft>
+                <a:spcPts val="0"/>
+              </a:spcAft>
+              <a:buClrTx/>
+              <a:buSzTx/>
+              <a:buFont typeface="Arial"/>
+              <a:buChar char="•"/>
+              <a:tabLst/>
+              <a:defRPr/>
+            </a:pPr>
+            <a:r>
+              <a:rPr kumimoji="0" lang="en-US" sz="3200" b="0" i="0" u="none" strike="noStrike" kern="1200" cap="none" spc="0" normalizeH="0" baseline="0" noProof="0" dirty="0" smtClean="0">
+                <a:ln>
+                  <a:noFill/>
+                </a:ln>
+                <a:solidFill>
+                  <a:schemeClr val="tx1"/>
+                </a:solidFill>
+                <a:effectLst/>
+                <a:uLnTx/>
+                <a:uFillTx/>
+                <a:latin typeface="Georgia"/>
+                <a:ea typeface="+mn-ea"/>
+                <a:cs typeface="Georgia"/>
+              </a:rPr>
+              <a:t>Demonstrate the use of genetic programming (GP)</a:t>
+            </a:r>
+            <a:r>
+              <a:rPr kumimoji="0" lang="en-US" sz="3200" b="0" i="0" u="none" strike="noStrike" kern="1200" cap="none" spc="0" normalizeH="0" noProof="0" dirty="0" smtClean="0">
+                <a:ln>
+                  <a:noFill/>
+                </a:ln>
+                <a:solidFill>
+                  <a:schemeClr val="tx1"/>
+                </a:solidFill>
+                <a:effectLst/>
+                <a:uLnTx/>
+                <a:uFillTx/>
+                <a:latin typeface="Georgia"/>
+                <a:ea typeface="+mn-ea"/>
+                <a:cs typeface="Georgia"/>
+              </a:rPr>
+              <a:t> with graph algorithms</a:t>
+            </a:r>
+          </a:p>
+          <a:p>
+            <a:pPr marL="342900" marR="0" lvl="0" indent="-342900" algn="l" defTabSz="457200" rtl="0" eaLnBrk="1" fontAlgn="auto" latinLnBrk="0" hangingPunct="1">
+              <a:lnSpc>
+                <a:spcPct val="100000"/>
+              </a:lnSpc>
+              <a:spcBef>
+                <a:spcPct val="20000"/>
+              </a:spcBef>
+              <a:spcAft>
+                <a:spcPts val="0"/>
+              </a:spcAft>
+              <a:buClrTx/>
+              <a:buSzTx/>
+              <a:buFont typeface="Arial"/>
+              <a:buChar char="•"/>
+              <a:tabLst/>
+              <a:defRPr/>
+            </a:pPr>
+            <a:r>
+              <a:rPr lang="en-US" sz="3200" dirty="0" smtClean="0">
+                <a:latin typeface="Georgia"/>
+                <a:cs typeface="Georgia"/>
+              </a:rPr>
+              <a:t>Once implemented, a GP can be used to solve a variety of related problems</a:t>
+            </a:r>
+            <a:endParaRPr kumimoji="0" lang="en-US" sz="3200" b="0" i="0" u="none" strike="noStrike" kern="1200" cap="none" spc="0" normalizeH="0" baseline="0" noProof="0" dirty="0" smtClean="0">
+              <a:ln>
+                <a:noFill/>
+              </a:ln>
+              <a:solidFill>
+                <a:schemeClr val="tx1"/>
+              </a:solidFill>
+              <a:effectLst/>
+              <a:uLnTx/>
+              <a:uFillTx/>
+              <a:latin typeface="Georgia"/>
+              <a:ea typeface="+mn-ea"/>
+              <a:cs typeface="Georgia"/>
+            </a:endParaRPr>
+          </a:p>
+        </p:txBody>
+      </p:sp>
+    </p:spTree>
+  </p:cSld>
+  <p:clrMapOvr>
+    <a:masterClrMapping/>
+  </p:clrMapOvr>
+  <p:timing>
+    <p:tnLst>
+      <p:par>
+        <p:cTn id="1" dur="indefinite" restart="never" nodeType="tmRoot"/>
+      </p:par>
+    </p:tnLst>
+  </p:timing>
+</p:sld>
+</file>
+
+<file path=ppt/slides/slide3.xml><?xml version="1.0" encoding="utf-8"?>
+<p:sld xmlns:a="http://schemas.openxmlformats.org/drawingml/2006/main" xmlns:r="http://schemas.openxmlformats.org/officeDocument/2006/relationships" xmlns:p="http://schemas.openxmlformats.org/presentationml/2006/main">
+  <p:cSld>
+    <p:spTree>
+      <p:nvGrpSpPr>
+        <p:cNvPr id="1" name=""/>
+        <p:cNvGrpSpPr/>
+        <p:nvPr/>
+      </p:nvGrpSpPr>
+      <p:grpSpPr>
+        <a:xfrm>
+          <a:off x="0" y="0"/>
+          <a:ext cx="0" cy="0"/>
+          <a:chOff x="0" y="0"/>
+          <a:chExt cx="0" cy="0"/>
+        </a:xfrm>
+      </p:grpSpPr>
+      <p:sp>
+        <p:nvSpPr>
+          <p:cNvPr id="2" name="Title 1"/>
+          <p:cNvSpPr>
+            <a:spLocks noGrp="1"/>
+          </p:cNvSpPr>
+          <p:nvPr>
+            <p:ph type="title"/>
+          </p:nvPr>
+        </p:nvSpPr>
+        <p:spPr/>
+        <p:txBody>
+          <a:bodyPr/>
+          <a:lstStyle/>
+          <a:p>
+            <a:r>
+              <a:rPr lang="en-US" dirty="0" smtClean="0"/>
+              <a:t>Why Random Graphs?</a:t>
+            </a:r>
+            <a:endParaRPr lang="en-US" dirty="0"/>
+          </a:p>
+        </p:txBody>
+      </p:sp>
+      <p:sp>
+        <p:nvSpPr>
+          <p:cNvPr id="5" name="Slide Number Placeholder 4"/>
+          <p:cNvSpPr>
+            <a:spLocks noGrp="1"/>
+          </p:cNvSpPr>
+          <p:nvPr>
+            <p:ph type="sldNum" sz="quarter" idx="11"/>
+          </p:nvPr>
+        </p:nvSpPr>
+        <p:spPr>
+          <a:xfrm>
+            <a:off x="6366508" y="6505575"/>
+            <a:ext cx="2320292" cy="365125"/>
+          </a:xfrm>
+        </p:spPr>
+        <p:txBody>
+          <a:bodyPr/>
+          <a:lstStyle/>
+          <a:p>
+            <a:fld id="{6189B349-B284-884E-BF58-0D68D479BD97}" type="slidenum">
+              <a:rPr lang="en-US" smtClean="0"/>
+              <a:pPr/>
+              <a:t>3</a:t>
+            </a:fld>
+            <a:endParaRPr lang="en-US" dirty="0"/>
+          </a:p>
+        </p:txBody>
+      </p:sp>
+      <p:sp>
+        <p:nvSpPr>
+          <p:cNvPr id="4" name="Content Placeholder 2"/>
+          <p:cNvSpPr txBox="1">
+            <a:spLocks/>
+          </p:cNvSpPr>
+          <p:nvPr/>
+        </p:nvSpPr>
+        <p:spPr>
+          <a:xfrm>
+            <a:off x="1622812" y="1651000"/>
+            <a:ext cx="7063988" cy="4072754"/>
+          </a:xfrm>
+          <a:prstGeom prst="rect">
+            <a:avLst/>
+          </a:prstGeom>
+        </p:spPr>
+        <p:txBody>
+          <a:bodyPr vert="horz" lIns="91440" tIns="45720" rIns="91440" bIns="45720" rtlCol="0">
+            <a:normAutofit/>
+          </a:bodyPr>
+          <a:lstStyle/>
+          <a:p>
+            <a:pPr marL="342900" marR="0" lvl="0" indent="-342900" algn="l" defTabSz="457200" rtl="0" eaLnBrk="1" fontAlgn="auto" latinLnBrk="0" hangingPunct="1">
+              <a:lnSpc>
+                <a:spcPct val="100000"/>
+              </a:lnSpc>
+              <a:spcBef>
+                <a:spcPct val="20000"/>
+              </a:spcBef>
+              <a:spcAft>
+                <a:spcPts val="0"/>
+              </a:spcAft>
+              <a:buClrTx/>
+              <a:buSzTx/>
+              <a:buFont typeface="Arial"/>
+              <a:buChar char="•"/>
+              <a:tabLst/>
+              <a:defRPr/>
+            </a:pPr>
+            <a:r>
+              <a:rPr kumimoji="0" lang="en-US" sz="3200" b="0" i="0" u="none" strike="noStrike" kern="1200" cap="none" spc="0" normalizeH="0" baseline="0" noProof="0" dirty="0" smtClean="0">
+                <a:ln>
+                  <a:noFill/>
+                </a:ln>
+                <a:solidFill>
+                  <a:schemeClr val="tx1"/>
+                </a:solidFill>
+                <a:effectLst/>
+                <a:uLnTx/>
+                <a:uFillTx/>
+                <a:latin typeface="Georgia"/>
+                <a:ea typeface="+mn-ea"/>
+                <a:cs typeface="Georgia"/>
+              </a:rPr>
+              <a:t>Random graphs can</a:t>
+            </a:r>
+            <a:r>
+              <a:rPr kumimoji="0" lang="en-US" sz="3200" b="0" i="0" u="none" strike="noStrike" kern="1200" cap="none" spc="0" normalizeH="0" noProof="0" dirty="0" smtClean="0">
+                <a:ln>
+                  <a:noFill/>
+                </a:ln>
+                <a:solidFill>
+                  <a:schemeClr val="tx1"/>
+                </a:solidFill>
+                <a:effectLst/>
+                <a:uLnTx/>
+                <a:uFillTx/>
+                <a:latin typeface="Georgia"/>
+                <a:ea typeface="+mn-ea"/>
+                <a:cs typeface="Georgia"/>
+              </a:rPr>
+              <a:t> be used to generate test data for graph algorithms</a:t>
+            </a:r>
+          </a:p>
+          <a:p>
+            <a:pPr marL="342900" marR="0" lvl="0" indent="-342900" algn="l" defTabSz="457200" rtl="0" eaLnBrk="1" fontAlgn="auto" latinLnBrk="0" hangingPunct="1">
+              <a:lnSpc>
+                <a:spcPct val="100000"/>
+              </a:lnSpc>
+              <a:spcBef>
+                <a:spcPct val="20000"/>
+              </a:spcBef>
+              <a:spcAft>
+                <a:spcPts val="0"/>
+              </a:spcAft>
+              <a:buClrTx/>
+              <a:buSzTx/>
+              <a:buFont typeface="Arial"/>
+              <a:buChar char="•"/>
+              <a:tabLst/>
+              <a:defRPr/>
+            </a:pPr>
+            <a:r>
+              <a:rPr lang="en-US" sz="3200" baseline="0" dirty="0" smtClean="0">
+                <a:latin typeface="Georgia"/>
+                <a:cs typeface="Georgia"/>
+              </a:rPr>
+              <a:t>Can</a:t>
+            </a:r>
+            <a:r>
+              <a:rPr lang="en-US" sz="3200" dirty="0" smtClean="0">
+                <a:latin typeface="Georgia"/>
+                <a:cs typeface="Georgia"/>
+              </a:rPr>
+              <a:t> also be used to simulate networks (computer, social, organizational, etc.)</a:t>
+            </a:r>
+            <a:endParaRPr kumimoji="0" lang="en-US" sz="3200" b="0" i="0" u="none" strike="noStrike" kern="1200" cap="none" spc="0" normalizeH="0" baseline="0" noProof="0" dirty="0" smtClean="0">
+              <a:ln>
+                <a:noFill/>
+              </a:ln>
+              <a:solidFill>
+                <a:schemeClr val="tx1"/>
+              </a:solidFill>
+              <a:effectLst/>
+              <a:uLnTx/>
+              <a:uFillTx/>
+              <a:latin typeface="Georgia"/>
+              <a:ea typeface="+mn-ea"/>
+              <a:cs typeface="Georgia"/>
+            </a:endParaRPr>
+          </a:p>
+        </p:txBody>
+      </p:sp>
+    </p:spTree>
+    <p:extLst>
+      <p:ext uri="{BB962C8B-B14F-4D97-AF65-F5344CB8AC3E}">
+        <p14:creationId xmlns:p14="http://schemas.microsoft.com/office/powerpoint/2010/main" val="2718508941"/>
+      </p:ext>
+    </p:extLst>
+  </p:cSld>
+  <p:clrMapOvr>
+    <a:masterClrMapping/>
+  </p:clrMapOvr>
+  <p:timing>
+    <p:tnLst>
+      <p:par>
+        <p:cTn id="1" dur="indefinite" restart="never" nodeType="tmRoot"/>
+      </p:par>
+    </p:tnLst>
+  </p:timing>
+</p:sld>
+</file>
+
+<file path=ppt/slides/slide4.xml><?xml version="1.0" encoding="utf-8"?>
+<p:sld xmlns:a="http://schemas.openxmlformats.org/drawingml/2006/main" xmlns:r="http://schemas.openxmlformats.org/officeDocument/2006/relationships" xmlns:p="http://schemas.openxmlformats.org/presentationml/2006/main">
+  <p:cSld>
+    <p:spTree>
+      <p:nvGrpSpPr>
+        <p:cNvPr id="1" name=""/>
+        <p:cNvGrpSpPr/>
+        <p:nvPr/>
+      </p:nvGrpSpPr>
+      <p:grpSpPr>
+        <a:xfrm>
+          <a:off x="0" y="0"/>
+          <a:ext cx="0" cy="0"/>
+          <a:chOff x="0" y="0"/>
+          <a:chExt cx="0" cy="0"/>
+        </a:xfrm>
+      </p:grpSpPr>
+      <p:sp>
+        <p:nvSpPr>
+          <p:cNvPr id="2" name="Title 1"/>
+          <p:cNvSpPr>
+            <a:spLocks noGrp="1"/>
+          </p:cNvSpPr>
+          <p:nvPr>
+            <p:ph type="title"/>
+          </p:nvPr>
+        </p:nvSpPr>
+        <p:spPr/>
+        <p:txBody>
+          <a:bodyPr>
+            <a:normAutofit fontScale="90000"/>
+          </a:bodyPr>
+          <a:lstStyle/>
+          <a:p>
+            <a:r>
+              <a:rPr lang="en-US" dirty="0" smtClean="0"/>
+              <a:t>Current Random Graph Models:</a:t>
+            </a:r>
+            <a:br>
+              <a:rPr lang="en-US" dirty="0" smtClean="0"/>
+            </a:br>
+            <a:r>
+              <a:rPr lang="hu-HU" dirty="0">
+                <a:latin typeface="Arial" panose="020B0604020202020204" pitchFamily="34" charset="0"/>
+                <a:cs typeface="Arial" panose="020B0604020202020204" pitchFamily="34" charset="0"/>
+              </a:rPr>
+              <a:t>Erdős–Rényi</a:t>
+            </a:r>
+            <a:endParaRPr lang="en-US" dirty="0">
+              <a:latin typeface="Arial" panose="020B0604020202020204" pitchFamily="34" charset="0"/>
+              <a:cs typeface="Arial" panose="020B0604020202020204" pitchFamily="34" charset="0"/>
+            </a:endParaRPr>
+          </a:p>
+        </p:txBody>
+      </p:sp>
+      <p:sp>
+        <p:nvSpPr>
+          <p:cNvPr id="5" name="Slide Number Placeholder 4"/>
+          <p:cNvSpPr>
+            <a:spLocks noGrp="1"/>
+          </p:cNvSpPr>
+          <p:nvPr>
+            <p:ph type="sldNum" sz="quarter" idx="11"/>
+          </p:nvPr>
+        </p:nvSpPr>
+        <p:spPr>
+          <a:xfrm>
+            <a:off x="6366508" y="6505575"/>
+            <a:ext cx="2320292" cy="365125"/>
+          </a:xfrm>
+        </p:spPr>
+        <p:txBody>
+          <a:bodyPr/>
+          <a:lstStyle/>
+          <a:p>
+            <a:fld id="{6189B349-B284-884E-BF58-0D68D479BD97}" type="slidenum">
+              <a:rPr lang="en-US" smtClean="0"/>
+              <a:pPr/>
+              <a:t>4</a:t>
+            </a:fld>
+            <a:endParaRPr lang="en-US" dirty="0"/>
+          </a:p>
+        </p:txBody>
+      </p:sp>
+      <p:sp>
+        <p:nvSpPr>
+          <p:cNvPr id="4" name="Content Placeholder 2"/>
+          <p:cNvSpPr txBox="1">
+            <a:spLocks/>
+          </p:cNvSpPr>
+          <p:nvPr/>
+        </p:nvSpPr>
+        <p:spPr>
+          <a:xfrm>
+            <a:off x="1622812" y="1651000"/>
+            <a:ext cx="7063988" cy="4072754"/>
+          </a:xfrm>
+          <a:prstGeom prst="rect">
+            <a:avLst/>
+          </a:prstGeom>
+        </p:spPr>
+        <p:txBody>
+          <a:bodyPr vert="horz" lIns="91440" tIns="45720" rIns="91440" bIns="45720" rtlCol="0">
+            <a:normAutofit/>
+          </a:bodyPr>
+          <a:lstStyle/>
+          <a:p>
+            <a:pPr marL="342900" lvl="0" indent="-342900">
+              <a:spcBef>
+                <a:spcPct val="20000"/>
+              </a:spcBef>
+              <a:buFont typeface="Arial"/>
+              <a:buChar char="•"/>
+              <a:defRPr/>
+            </a:pPr>
+            <a:r>
+              <a:rPr lang="en-US" sz="3200" dirty="0" smtClean="0">
+                <a:latin typeface="Georgia" panose="02040502050405020303" pitchFamily="18" charset="0"/>
+              </a:rPr>
+              <a:t>Each possible edge has an independent probability of being included</a:t>
+            </a:r>
+          </a:p>
+          <a:p>
+            <a:pPr marL="342900" lvl="0" indent="-342900">
+              <a:spcBef>
+                <a:spcPct val="20000"/>
+              </a:spcBef>
+              <a:buFont typeface="Arial"/>
+              <a:buChar char="•"/>
+              <a:defRPr/>
+            </a:pPr>
+            <a:r>
+              <a:rPr lang="en-US" sz="3200" dirty="0" smtClean="0">
+                <a:latin typeface="Georgia" panose="02040502050405020303" pitchFamily="18" charset="0"/>
+              </a:rPr>
+              <a:t>Purely random model</a:t>
+            </a:r>
+          </a:p>
+          <a:p>
+            <a:pPr marL="342900" lvl="0" indent="-342900">
+              <a:spcBef>
+                <a:spcPct val="20000"/>
+              </a:spcBef>
+              <a:buFont typeface="Arial"/>
+              <a:buChar char="•"/>
+              <a:defRPr/>
+            </a:pPr>
+            <a:r>
+              <a:rPr lang="en-US" sz="3200" dirty="0" smtClean="0">
+                <a:latin typeface="Georgia" panose="02040502050405020303" pitchFamily="18" charset="0"/>
+              </a:rPr>
+              <a:t>Provides a poor simulation of real-world graphs, such as social networks</a:t>
+            </a:r>
+          </a:p>
+          <a:p>
+            <a:pPr marL="342900" lvl="0" indent="-342900">
+              <a:spcBef>
+                <a:spcPct val="20000"/>
+              </a:spcBef>
+              <a:buFont typeface="Arial"/>
+              <a:buChar char="•"/>
+              <a:defRPr/>
+            </a:pPr>
+            <a:endParaRPr kumimoji="0" lang="en-US" sz="3200" b="0" i="0" u="none" strike="noStrike" kern="1200" cap="none" spc="0" normalizeH="0" baseline="0" noProof="0" dirty="0" smtClean="0">
+              <a:ln>
+                <a:noFill/>
+              </a:ln>
+              <a:solidFill>
+                <a:schemeClr val="tx1"/>
+              </a:solidFill>
+              <a:effectLst/>
+              <a:uLnTx/>
+              <a:uFillTx/>
+              <a:latin typeface="Georgia" panose="02040502050405020303" pitchFamily="18" charset="0"/>
+              <a:cs typeface="Georgia"/>
+            </a:endParaRPr>
+          </a:p>
+        </p:txBody>
+      </p:sp>
+    </p:spTree>
+    <p:extLst>
+      <p:ext uri="{BB962C8B-B14F-4D97-AF65-F5344CB8AC3E}">
+        <p14:creationId xmlns:p14="http://schemas.microsoft.com/office/powerpoint/2010/main" val="93811400"/>
+      </p:ext>
+    </p:extLst>
+  </p:cSld>
+  <p:clrMapOvr>
+    <a:masterClrMapping/>
+  </p:clrMapOvr>
+  <p:timing>
+    <p:tnLst>
+      <p:par>
+        <p:cTn id="1" dur="indefinite" restart="never" nodeType="tmRoot"/>
+      </p:par>
+    </p:tnLst>
+  </p:timing>
+</p:sld>
+</file>
+
+<file path=ppt/slides/slide5.xml><?xml version="1.0" encoding="utf-8"?>
+<p:sld xmlns:a="http://schemas.openxmlformats.org/drawingml/2006/main" xmlns:r="http://schemas.openxmlformats.org/officeDocument/2006/relationships" xmlns:p="http://schemas.openxmlformats.org/presentationml/2006/main">
+  <p:cSld>
+    <p:spTree>
+      <p:nvGrpSpPr>
+        <p:cNvPr id="1" name=""/>
+        <p:cNvGrpSpPr/>
+        <p:nvPr/>
+      </p:nvGrpSpPr>
+      <p:grpSpPr>
+        <a:xfrm>
+          <a:off x="0" y="0"/>
+          <a:ext cx="0" cy="0"/>
+          <a:chOff x="0" y="0"/>
+          <a:chExt cx="0" cy="0"/>
+        </a:xfrm>
+      </p:grpSpPr>
+      <p:sp>
+        <p:nvSpPr>
+          <p:cNvPr id="2" name="Title 1"/>
+          <p:cNvSpPr>
+            <a:spLocks noGrp="1"/>
+          </p:cNvSpPr>
+          <p:nvPr>
+            <p:ph type="title"/>
+          </p:nvPr>
+        </p:nvSpPr>
+        <p:spPr/>
+        <p:txBody>
+          <a:bodyPr>
+            <a:normAutofit fontScale="90000"/>
+          </a:bodyPr>
+          <a:lstStyle/>
+          <a:p>
+            <a:r>
+              <a:rPr lang="en-US" dirty="0" smtClean="0"/>
+              <a:t>Current Random Graph Models:</a:t>
+            </a:r>
+            <a:br>
+              <a:rPr lang="en-US" dirty="0" smtClean="0"/>
+            </a:br>
+            <a:r>
+              <a:rPr lang="en-US" dirty="0" smtClean="0"/>
+              <a:t>Random Geometric</a:t>
+            </a:r>
+            <a:endParaRPr lang="en-US" dirty="0"/>
+          </a:p>
+        </p:txBody>
+      </p:sp>
+      <p:sp>
+        <p:nvSpPr>
+          <p:cNvPr id="5" name="Slide Number Placeholder 4"/>
+          <p:cNvSpPr>
+            <a:spLocks noGrp="1"/>
+          </p:cNvSpPr>
+          <p:nvPr>
+            <p:ph type="sldNum" sz="quarter" idx="11"/>
+          </p:nvPr>
+        </p:nvSpPr>
+        <p:spPr>
+          <a:xfrm>
+            <a:off x="6366508" y="6505575"/>
+            <a:ext cx="2320292" cy="365125"/>
+          </a:xfrm>
+        </p:spPr>
+        <p:txBody>
+          <a:bodyPr/>
+          <a:lstStyle/>
+          <a:p>
+            <a:fld id="{6189B349-B284-884E-BF58-0D68D479BD97}" type="slidenum">
+              <a:rPr lang="en-US" smtClean="0"/>
+              <a:pPr/>
+              <a:t>5</a:t>
+            </a:fld>
+            <a:endParaRPr lang="en-US" dirty="0"/>
+          </a:p>
+        </p:txBody>
+      </p:sp>
+      <p:sp>
+        <p:nvSpPr>
+          <p:cNvPr id="4" name="Content Placeholder 2"/>
+          <p:cNvSpPr txBox="1">
+            <a:spLocks/>
+          </p:cNvSpPr>
+          <p:nvPr/>
+        </p:nvSpPr>
+        <p:spPr>
+          <a:xfrm>
+            <a:off x="1622812" y="1651000"/>
+            <a:ext cx="7063988" cy="4072754"/>
+          </a:xfrm>
+          <a:prstGeom prst="rect">
+            <a:avLst/>
+          </a:prstGeom>
+        </p:spPr>
+        <p:txBody>
+          <a:bodyPr vert="horz" lIns="91440" tIns="45720" rIns="91440" bIns="45720" rtlCol="0">
+            <a:normAutofit/>
+          </a:bodyPr>
+          <a:lstStyle/>
+          <a:p>
+            <a:pPr marL="342900" lvl="0" indent="-342900">
+              <a:spcBef>
+                <a:spcPct val="20000"/>
+              </a:spcBef>
+              <a:buFont typeface="Arial"/>
+              <a:buChar char="•"/>
+              <a:defRPr/>
+            </a:pPr>
+            <a:r>
+              <a:rPr lang="en-US" sz="3200" dirty="0" smtClean="0">
+                <a:latin typeface="Georgia" panose="02040502050405020303" pitchFamily="18" charset="0"/>
+              </a:rPr>
+              <a:t>Vertices placed randomly, edges exist between nearby vertices</a:t>
+            </a:r>
+          </a:p>
+          <a:p>
+            <a:pPr marL="342900" lvl="0" indent="-342900">
+              <a:spcBef>
+                <a:spcPct val="20000"/>
+              </a:spcBef>
+              <a:buFont typeface="Arial"/>
+              <a:buChar char="•"/>
+              <a:defRPr/>
+            </a:pPr>
+            <a:r>
+              <a:rPr lang="en-US" sz="3200" dirty="0" smtClean="0">
+                <a:latin typeface="Georgia" panose="02040502050405020303" pitchFamily="18" charset="0"/>
+              </a:rPr>
+              <a:t>Relates well to wireless sensor networks</a:t>
+            </a:r>
+          </a:p>
+          <a:p>
+            <a:pPr marL="342900" lvl="0" indent="-342900">
+              <a:spcBef>
+                <a:spcPct val="20000"/>
+              </a:spcBef>
+              <a:buFont typeface="Arial"/>
+              <a:buChar char="•"/>
+              <a:defRPr/>
+            </a:pPr>
+            <a:r>
+              <a:rPr lang="en-US" sz="3200" dirty="0" smtClean="0">
+                <a:latin typeface="Georgia" panose="02040502050405020303" pitchFamily="18" charset="0"/>
+              </a:rPr>
+              <a:t>Not practical for applications which are unaffected by physical locations</a:t>
+            </a:r>
+          </a:p>
+          <a:p>
+            <a:pPr marL="342900" lvl="0" indent="-342900">
+              <a:spcBef>
+                <a:spcPct val="20000"/>
+              </a:spcBef>
+              <a:buFont typeface="Arial"/>
+              <a:buChar char="•"/>
+              <a:defRPr/>
+            </a:pPr>
+            <a:endParaRPr kumimoji="0" lang="en-US" sz="3200" b="0" i="0" u="none" strike="noStrike" kern="1200" cap="none" spc="0" normalizeH="0" baseline="0" noProof="0" dirty="0" smtClean="0">
+              <a:ln>
+                <a:noFill/>
+              </a:ln>
+              <a:solidFill>
+                <a:schemeClr val="tx1"/>
+              </a:solidFill>
+              <a:effectLst/>
+              <a:uLnTx/>
+              <a:uFillTx/>
+              <a:latin typeface="Georgia" panose="02040502050405020303" pitchFamily="18" charset="0"/>
+              <a:cs typeface="Georgia"/>
+            </a:endParaRPr>
+          </a:p>
+        </p:txBody>
+      </p:sp>
+    </p:spTree>
+    <p:extLst>
+      <p:ext uri="{BB962C8B-B14F-4D97-AF65-F5344CB8AC3E}">
+        <p14:creationId xmlns:p14="http://schemas.microsoft.com/office/powerpoint/2010/main" val="663238853"/>
+      </p:ext>
+    </p:extLst>
+  </p:cSld>
+  <p:clrMapOvr>
+    <a:masterClrMapping/>
+  </p:clrMapOvr>
+  <p:timing>
+    <p:tnLst>
+      <p:par>
+        <p:cTn id="1" dur="indefinite" restart="never" nodeType="tmRoot"/>
+      </p:par>
+    </p:tnLst>
+  </p:timing>
+</p:sld>
+</file>
+
+<file path=ppt/slides/slide6.xml><?xml version="1.0" encoding="utf-8"?>
+<p:sld xmlns:a="http://schemas.openxmlformats.org/drawingml/2006/main" xmlns:r="http://schemas.openxmlformats.org/officeDocument/2006/relationships" xmlns:p="http://schemas.openxmlformats.org/presentationml/2006/main">
+  <p:cSld>
+    <p:spTree>
+      <p:nvGrpSpPr>
+        <p:cNvPr id="1" name=""/>
+        <p:cNvGrpSpPr/>
+        <p:nvPr/>
+      </p:nvGrpSpPr>
+      <p:grpSpPr>
+        <a:xfrm>
+          <a:off x="0" y="0"/>
+          <a:ext cx="0" cy="0"/>
+          <a:chOff x="0" y="0"/>
+          <a:chExt cx="0" cy="0"/>
+        </a:xfrm>
+      </p:grpSpPr>
+      <p:sp>
+        <p:nvSpPr>
+          <p:cNvPr id="2" name="Title 1"/>
+          <p:cNvSpPr>
+            <a:spLocks noGrp="1"/>
+          </p:cNvSpPr>
+          <p:nvPr>
+            <p:ph type="title"/>
+          </p:nvPr>
+        </p:nvSpPr>
+        <p:spPr/>
+        <p:txBody>
+          <a:bodyPr>
+            <a:normAutofit fontScale="90000"/>
+          </a:bodyPr>
+          <a:lstStyle/>
+          <a:p>
+            <a:r>
+              <a:rPr lang="en-US" dirty="0" smtClean="0"/>
+              <a:t>Current Random Graph Models:</a:t>
+            </a:r>
+            <a:br>
+              <a:rPr lang="en-US" dirty="0" smtClean="0"/>
+            </a:br>
+            <a:r>
+              <a:rPr lang="en-US" dirty="0" smtClean="0"/>
+              <a:t>Scale-free</a:t>
+            </a:r>
+            <a:endParaRPr lang="en-US" dirty="0"/>
+          </a:p>
+        </p:txBody>
+      </p:sp>
+      <p:sp>
+        <p:nvSpPr>
+          <p:cNvPr id="5" name="Slide Number Placeholder 4"/>
+          <p:cNvSpPr>
+            <a:spLocks noGrp="1"/>
+          </p:cNvSpPr>
+          <p:nvPr>
+            <p:ph type="sldNum" sz="quarter" idx="11"/>
+          </p:nvPr>
+        </p:nvSpPr>
+        <p:spPr>
+          <a:xfrm>
+            <a:off x="6366508" y="6505575"/>
+            <a:ext cx="2320292" cy="365125"/>
+          </a:xfrm>
+        </p:spPr>
+        <p:txBody>
+          <a:bodyPr/>
+          <a:lstStyle/>
+          <a:p>
+            <a:fld id="{6189B349-B284-884E-BF58-0D68D479BD97}" type="slidenum">
+              <a:rPr lang="en-US" smtClean="0"/>
+              <a:pPr/>
+              <a:t>6</a:t>
+            </a:fld>
+            <a:endParaRPr lang="en-US" dirty="0"/>
+          </a:p>
+        </p:txBody>
+      </p:sp>
+      <p:sp>
+        <p:nvSpPr>
+          <p:cNvPr id="4" name="Content Placeholder 2"/>
+          <p:cNvSpPr txBox="1">
+            <a:spLocks/>
+          </p:cNvSpPr>
+          <p:nvPr/>
+        </p:nvSpPr>
+        <p:spPr>
+          <a:xfrm>
+            <a:off x="1622812" y="1651000"/>
+            <a:ext cx="7063988" cy="4072754"/>
+          </a:xfrm>
+          <a:prstGeom prst="rect">
+            <a:avLst/>
+          </a:prstGeom>
+        </p:spPr>
+        <p:txBody>
+          <a:bodyPr vert="horz" lIns="91440" tIns="45720" rIns="91440" bIns="45720" rtlCol="0">
+            <a:normAutofit/>
+          </a:bodyPr>
+          <a:lstStyle/>
+          <a:p>
+            <a:pPr marL="342900" lvl="0" indent="-342900">
+              <a:spcBef>
+                <a:spcPct val="20000"/>
+              </a:spcBef>
+              <a:buFont typeface="Arial"/>
+              <a:buChar char="•"/>
+              <a:defRPr/>
+            </a:pPr>
+            <a:r>
+              <a:rPr lang="en-US" sz="3200" dirty="0" smtClean="0">
+                <a:latin typeface="Georgia" panose="02040502050405020303" pitchFamily="18" charset="0"/>
+              </a:rPr>
+              <a:t>Vertex degree distributions follow a power law relation</a:t>
+            </a:r>
+          </a:p>
+          <a:p>
+            <a:pPr marL="342900" lvl="0" indent="-342900">
+              <a:spcBef>
+                <a:spcPct val="20000"/>
+              </a:spcBef>
+              <a:buFont typeface="Arial"/>
+              <a:buChar char="•"/>
+              <a:defRPr/>
+            </a:pPr>
+            <a:r>
+              <a:rPr lang="en-US" sz="3200" dirty="0" smtClean="0">
+                <a:latin typeface="Georgia" panose="02040502050405020303" pitchFamily="18" charset="0"/>
+                <a:cs typeface="Georgia"/>
+              </a:rPr>
+              <a:t>Majority of edges are incident to a small portion of the vertex set</a:t>
+            </a:r>
+          </a:p>
+          <a:p>
+            <a:pPr marL="342900" lvl="0" indent="-342900">
+              <a:spcBef>
+                <a:spcPct val="20000"/>
+              </a:spcBef>
+              <a:buFont typeface="Arial"/>
+              <a:buChar char="•"/>
+              <a:defRPr/>
+            </a:pPr>
+            <a:r>
+              <a:rPr lang="en-US" sz="3200" dirty="0" smtClean="0">
+                <a:latin typeface="Georgia" panose="02040502050405020303" pitchFamily="18" charset="0"/>
+                <a:cs typeface="Georgia"/>
+              </a:rPr>
+              <a:t>Often used for modeling computer and social networks</a:t>
+            </a:r>
+            <a:endParaRPr kumimoji="0" lang="en-US" sz="3200" b="0" i="0" u="none" strike="noStrike" kern="1200" cap="none" spc="0" normalizeH="0" baseline="0" noProof="0" dirty="0" smtClean="0">
+              <a:ln>
+                <a:noFill/>
+              </a:ln>
+              <a:solidFill>
+                <a:schemeClr val="tx1"/>
+              </a:solidFill>
+              <a:effectLst/>
+              <a:uLnTx/>
+              <a:uFillTx/>
+              <a:latin typeface="Georgia" panose="02040502050405020303" pitchFamily="18" charset="0"/>
+              <a:cs typeface="Georgia"/>
+            </a:endParaRPr>
+          </a:p>
+        </p:txBody>
+      </p:sp>
+    </p:spTree>
+    <p:extLst>
+      <p:ext uri="{BB962C8B-B14F-4D97-AF65-F5344CB8AC3E}">
+        <p14:creationId xmlns:p14="http://schemas.microsoft.com/office/powerpoint/2010/main" val="3408421941"/>
+      </p:ext>
+    </p:extLst>
+  </p:cSld>
+  <p:clrMapOvr>
+    <a:masterClrMapping/>
+  </p:clrMapOvr>
+  <p:timing>
+    <p:tnLst>
+      <p:par>
+        <p:cTn id="1" dur="indefinite" restart="never" nodeType="tmRoot"/>
+      </p:par>
+    </p:tnLst>
+  </p:timing>
+</p:sld>
+</file>
+
+<file path=ppt/slides/slide7.xml><?xml version="1.0" encoding="utf-8"?>
+<p:sld xmlns:a="http://schemas.openxmlformats.org/drawingml/2006/main" xmlns:r="http://schemas.openxmlformats.org/officeDocument/2006/relationships" xmlns:p="http://schemas.openxmlformats.org/presentationml/2006/main">
+  <p:cSld>
+    <p:spTree>
+      <p:nvGrpSpPr>
+        <p:cNvPr id="1" name=""/>
+        <p:cNvGrpSpPr/>
+        <p:nvPr/>
+      </p:nvGrpSpPr>
+      <p:grpSpPr>
+        <a:xfrm>
+          <a:off x="0" y="0"/>
+          <a:ext cx="0" cy="0"/>
+          <a:chOff x="0" y="0"/>
+          <a:chExt cx="0" cy="0"/>
+        </a:xfrm>
+      </p:grpSpPr>
+      <p:sp>
+        <p:nvSpPr>
+          <p:cNvPr id="2" name="Title 1"/>
+          <p:cNvSpPr>
+            <a:spLocks noGrp="1"/>
+          </p:cNvSpPr>
+          <p:nvPr>
+            <p:ph type="title"/>
+          </p:nvPr>
+        </p:nvSpPr>
+        <p:spPr/>
+        <p:txBody>
+          <a:bodyPr/>
+          <a:lstStyle/>
+          <a:p>
+            <a:r>
+              <a:rPr lang="en-US" dirty="0" smtClean="0"/>
+              <a:t>Room for Specialization</a:t>
+            </a:r>
+            <a:endParaRPr lang="en-US" dirty="0"/>
+          </a:p>
+        </p:txBody>
+      </p:sp>
+      <p:sp>
+        <p:nvSpPr>
+          <p:cNvPr id="5" name="Slide Number Placeholder 4"/>
+          <p:cNvSpPr>
+            <a:spLocks noGrp="1"/>
+          </p:cNvSpPr>
+          <p:nvPr>
+            <p:ph type="sldNum" sz="quarter" idx="11"/>
+          </p:nvPr>
+        </p:nvSpPr>
+        <p:spPr>
+          <a:xfrm>
+            <a:off x="6366508" y="6505575"/>
+            <a:ext cx="2320292" cy="365125"/>
+          </a:xfrm>
+        </p:spPr>
+        <p:txBody>
+          <a:bodyPr/>
+          <a:lstStyle/>
+          <a:p>
+            <a:fld id="{6189B349-B284-884E-BF58-0D68D479BD97}" type="slidenum">
+              <a:rPr lang="en-US" smtClean="0"/>
+              <a:pPr/>
+              <a:t>7</a:t>
+            </a:fld>
+            <a:endParaRPr lang="en-US" dirty="0"/>
+          </a:p>
+        </p:txBody>
+      </p:sp>
+      <p:sp>
+        <p:nvSpPr>
+          <p:cNvPr id="4" name="Content Placeholder 2"/>
+          <p:cNvSpPr txBox="1">
+            <a:spLocks/>
+          </p:cNvSpPr>
+          <p:nvPr/>
+        </p:nvSpPr>
+        <p:spPr>
+          <a:xfrm>
+            <a:off x="1622812" y="1651000"/>
+            <a:ext cx="7063988" cy="4072754"/>
+          </a:xfrm>
+          <a:prstGeom prst="rect">
+            <a:avLst/>
+          </a:prstGeom>
+        </p:spPr>
+        <p:txBody>
+          <a:bodyPr vert="horz" lIns="91440" tIns="45720" rIns="91440" bIns="45720" rtlCol="0">
+            <a:normAutofit lnSpcReduction="10000"/>
+          </a:bodyPr>
+          <a:lstStyle/>
+          <a:p>
+            <a:pPr marL="342900" marR="0" lvl="0" indent="-342900" algn="l" defTabSz="457200" rtl="0" eaLnBrk="1" fontAlgn="auto" latinLnBrk="0" hangingPunct="1">
+              <a:lnSpc>
+                <a:spcPct val="100000"/>
+              </a:lnSpc>
+              <a:spcBef>
+                <a:spcPct val="20000"/>
+              </a:spcBef>
+              <a:spcAft>
+                <a:spcPts val="0"/>
+              </a:spcAft>
+              <a:buClrTx/>
+              <a:buSzTx/>
+              <a:buFont typeface="Arial"/>
+              <a:buChar char="•"/>
+              <a:tabLst/>
+              <a:defRPr/>
+            </a:pPr>
+            <a:r>
+              <a:rPr kumimoji="0" lang="en-US" sz="3200" b="0" i="0" u="none" strike="noStrike" kern="1200" cap="none" spc="0" normalizeH="0" baseline="0" noProof="0" dirty="0" smtClean="0">
+                <a:ln>
+                  <a:noFill/>
+                </a:ln>
+                <a:solidFill>
+                  <a:schemeClr val="tx1"/>
+                </a:solidFill>
+                <a:effectLst/>
+                <a:uLnTx/>
+                <a:uFillTx/>
+                <a:latin typeface="Georgia"/>
+                <a:ea typeface="+mn-ea"/>
+                <a:cs typeface="Georgia"/>
+              </a:rPr>
+              <a:t>Graphs needed</a:t>
+            </a:r>
+            <a:r>
+              <a:rPr kumimoji="0" lang="en-US" sz="3200" b="0" i="0" u="none" strike="noStrike" kern="1200" cap="none" spc="0" normalizeH="0" noProof="0" dirty="0" smtClean="0">
+                <a:ln>
+                  <a:noFill/>
+                </a:ln>
+                <a:solidFill>
+                  <a:schemeClr val="tx1"/>
+                </a:solidFill>
+                <a:effectLst/>
+                <a:uLnTx/>
+                <a:uFillTx/>
+                <a:latin typeface="Georgia"/>
+                <a:ea typeface="+mn-ea"/>
+                <a:cs typeface="Georgia"/>
+              </a:rPr>
+              <a:t> with a specific characteristic (topology motifs, sub-graph structure, etc.)</a:t>
+            </a:r>
+          </a:p>
+          <a:p>
+            <a:pPr marL="342900" marR="0" lvl="0" indent="-342900" algn="l" defTabSz="457200" rtl="0" eaLnBrk="1" fontAlgn="auto" latinLnBrk="0" hangingPunct="1">
+              <a:lnSpc>
+                <a:spcPct val="100000"/>
+              </a:lnSpc>
+              <a:spcBef>
+                <a:spcPct val="20000"/>
+              </a:spcBef>
+              <a:spcAft>
+                <a:spcPts val="0"/>
+              </a:spcAft>
+              <a:buClrTx/>
+              <a:buSzTx/>
+              <a:buFont typeface="Arial"/>
+              <a:buChar char="•"/>
+              <a:tabLst/>
+              <a:defRPr/>
+            </a:pPr>
+            <a:r>
+              <a:rPr lang="en-US" sz="3200" baseline="0" dirty="0" smtClean="0">
+                <a:latin typeface="Georgia"/>
+                <a:cs typeface="Georgia"/>
+              </a:rPr>
+              <a:t>Method of construction is unclear or unimportant</a:t>
+            </a:r>
+          </a:p>
+          <a:p>
+            <a:pPr marL="342900" marR="0" lvl="0" indent="-342900" algn="l" defTabSz="457200" rtl="0" eaLnBrk="1" fontAlgn="auto" latinLnBrk="0" hangingPunct="1">
+              <a:lnSpc>
+                <a:spcPct val="100000"/>
+              </a:lnSpc>
+              <a:spcBef>
+                <a:spcPct val="20000"/>
+              </a:spcBef>
+              <a:spcAft>
+                <a:spcPts val="0"/>
+              </a:spcAft>
+              <a:buClrTx/>
+              <a:buSzTx/>
+              <a:buFont typeface="Arial"/>
+              <a:buChar char="•"/>
+              <a:tabLst/>
+              <a:defRPr/>
+            </a:pPr>
+            <a:r>
+              <a:rPr kumimoji="0" lang="en-US" sz="3200" b="0" i="0" u="none" strike="noStrike" kern="1200" cap="none" spc="0" normalizeH="0" noProof="0" dirty="0" smtClean="0">
+                <a:ln>
+                  <a:noFill/>
+                </a:ln>
+                <a:solidFill>
+                  <a:schemeClr val="tx1"/>
+                </a:solidFill>
+                <a:effectLst/>
+                <a:uLnTx/>
+                <a:uFillTx/>
+                <a:latin typeface="Georgia"/>
+                <a:ea typeface="+mn-ea"/>
+                <a:cs typeface="Georgia"/>
+              </a:rPr>
+              <a:t>When it’s easier to define your requirements than it is to construct your solution, evolve it!</a:t>
+            </a:r>
+            <a:endParaRPr kumimoji="0" lang="en-US" sz="3200" b="0" i="0" u="none" strike="noStrike" kern="1200" cap="none" spc="0" normalizeH="0" baseline="0" noProof="0" dirty="0" smtClean="0">
+              <a:ln>
+                <a:noFill/>
+              </a:ln>
+              <a:solidFill>
+                <a:schemeClr val="tx1"/>
+              </a:solidFill>
+              <a:effectLst/>
+              <a:uLnTx/>
+              <a:uFillTx/>
+              <a:latin typeface="Georgia"/>
+              <a:ea typeface="+mn-ea"/>
+              <a:cs typeface="Georgia"/>
+            </a:endParaRPr>
+          </a:p>
+        </p:txBody>
+      </p:sp>
+    </p:spTree>
+    <p:extLst>
+      <p:ext uri="{BB962C8B-B14F-4D97-AF65-F5344CB8AC3E}">
+        <p14:creationId xmlns:p14="http://schemas.microsoft.com/office/powerpoint/2010/main" val="1835311759"/>
+      </p:ext>
+    </p:extLst>
+  </p:cSld>
+  <p:clrMapOvr>
+    <a:masterClrMapping/>
+  </p:clrMapOvr>
+  <p:timing>
+    <p:tnLst>
+      <p:par>
+        <p:cTn id="1" dur="indefinite" restart="never" nodeType="tmRoot"/>
+      </p:par>
+    </p:tnLst>
+  </p:timing>
+</p:sld>
+</file>
+
+<file path=ppt/slides/slide8.xml><?xml version="1.0" encoding="utf-8"?>
+<p:sld xmlns:a="http://schemas.openxmlformats.org/drawingml/2006/main" xmlns:r="http://schemas.openxmlformats.org/officeDocument/2006/relationships" xmlns:p="http://schemas.openxmlformats.org/presentationml/2006/main">
+  <p:cSld>
+    <p:spTree>
+      <p:nvGrpSpPr>
+        <p:cNvPr id="1" name=""/>
+        <p:cNvGrpSpPr/>
+        <p:nvPr/>
+      </p:nvGrpSpPr>
+      <p:grpSpPr>
+        <a:xfrm>
+          <a:off x="0" y="0"/>
+          <a:ext cx="0" cy="0"/>
+          <a:chOff x="0" y="0"/>
+          <a:chExt cx="0" cy="0"/>
+        </a:xfrm>
+      </p:grpSpPr>
+      <p:sp>
+        <p:nvSpPr>
+          <p:cNvPr id="2" name="Title 1"/>
+          <p:cNvSpPr>
+            <a:spLocks noGrp="1"/>
+          </p:cNvSpPr>
+          <p:nvPr>
+            <p:ph type="title"/>
+          </p:nvPr>
+        </p:nvSpPr>
+        <p:spPr/>
+        <p:txBody>
+          <a:bodyPr/>
+          <a:lstStyle/>
+          <a:p>
+            <a:r>
+              <a:rPr lang="en-US" dirty="0" smtClean="0"/>
+              <a:t>An Example</a:t>
+            </a:r>
+            <a:endParaRPr lang="en-US" dirty="0"/>
+          </a:p>
+        </p:txBody>
+      </p:sp>
+      <p:sp>
+        <p:nvSpPr>
+          <p:cNvPr id="5" name="Slide Number Placeholder 4"/>
+          <p:cNvSpPr>
+            <a:spLocks noGrp="1"/>
+          </p:cNvSpPr>
+          <p:nvPr>
+            <p:ph type="sldNum" sz="quarter" idx="11"/>
+          </p:nvPr>
+        </p:nvSpPr>
+        <p:spPr>
+          <a:xfrm>
+            <a:off x="6366508" y="6505575"/>
+            <a:ext cx="2320292" cy="365125"/>
+          </a:xfrm>
+        </p:spPr>
+        <p:txBody>
+          <a:bodyPr/>
+          <a:lstStyle/>
+          <a:p>
+            <a:fld id="{6189B349-B284-884E-BF58-0D68D479BD97}" type="slidenum">
+              <a:rPr lang="en-US" smtClean="0"/>
+              <a:pPr/>
+              <a:t>8</a:t>
+            </a:fld>
+            <a:endParaRPr lang="en-US" dirty="0"/>
+          </a:p>
+        </p:txBody>
+      </p:sp>
+      <p:sp>
+        <p:nvSpPr>
+          <p:cNvPr id="4" name="Content Placeholder 2"/>
+          <p:cNvSpPr txBox="1">
+            <a:spLocks/>
+          </p:cNvSpPr>
+          <p:nvPr/>
+        </p:nvSpPr>
+        <p:spPr>
+          <a:xfrm>
+            <a:off x="1622812" y="1651000"/>
+            <a:ext cx="7063988" cy="4072754"/>
+          </a:xfrm>
+          <a:prstGeom prst="rect">
+            <a:avLst/>
+          </a:prstGeom>
+        </p:spPr>
+        <p:txBody>
+          <a:bodyPr vert="horz" lIns="91440" tIns="45720" rIns="91440" bIns="45720" rtlCol="0">
+            <a:normAutofit lnSpcReduction="10000"/>
+          </a:bodyPr>
+          <a:lstStyle/>
+          <a:p>
+            <a:pPr marL="342900" marR="0" lvl="0" indent="-342900" algn="l" defTabSz="457200" rtl="0" eaLnBrk="1" fontAlgn="auto" latinLnBrk="0" hangingPunct="1">
+              <a:lnSpc>
+                <a:spcPct val="100000"/>
+              </a:lnSpc>
+              <a:spcBef>
+                <a:spcPct val="20000"/>
+              </a:spcBef>
+              <a:spcAft>
+                <a:spcPts val="0"/>
+              </a:spcAft>
+              <a:buClrTx/>
+              <a:buSzTx/>
+              <a:buFont typeface="Arial"/>
+              <a:buChar char="•"/>
+              <a:tabLst/>
+              <a:defRPr/>
+            </a:pPr>
+            <a:r>
+              <a:rPr kumimoji="0" lang="en-US" sz="3200" b="0" i="0" u="none" strike="noStrike" kern="1200" cap="none" spc="0" normalizeH="0" baseline="0" noProof="0" dirty="0" smtClean="0">
+                <a:ln>
+                  <a:noFill/>
+                </a:ln>
+                <a:solidFill>
+                  <a:schemeClr val="tx1"/>
+                </a:solidFill>
+                <a:effectLst/>
+                <a:uLnTx/>
+                <a:uFillTx/>
+                <a:latin typeface="Georgia"/>
+                <a:ea typeface="+mn-ea"/>
+                <a:cs typeface="Georgia"/>
+              </a:rPr>
+              <a:t>You’ve designed a new graph partitioning</a:t>
+            </a:r>
+            <a:r>
+              <a:rPr kumimoji="0" lang="en-US" sz="3200" b="0" i="0" u="none" strike="noStrike" kern="1200" cap="none" spc="0" normalizeH="0" noProof="0" dirty="0" smtClean="0">
+                <a:ln>
+                  <a:noFill/>
+                </a:ln>
+                <a:solidFill>
+                  <a:schemeClr val="tx1"/>
+                </a:solidFill>
+                <a:effectLst/>
+                <a:uLnTx/>
+                <a:uFillTx/>
+                <a:latin typeface="Georgia"/>
+                <a:ea typeface="+mn-ea"/>
+                <a:cs typeface="Georgia"/>
+              </a:rPr>
+              <a:t> algorithm and you want to test its limitations</a:t>
+            </a:r>
+          </a:p>
+          <a:p>
+            <a:pPr marL="342900" marR="0" lvl="0" indent="-342900" algn="l" defTabSz="457200" rtl="0" eaLnBrk="1" fontAlgn="auto" latinLnBrk="0" hangingPunct="1">
+              <a:lnSpc>
+                <a:spcPct val="100000"/>
+              </a:lnSpc>
+              <a:spcBef>
+                <a:spcPct val="20000"/>
+              </a:spcBef>
+              <a:spcAft>
+                <a:spcPts val="0"/>
+              </a:spcAft>
+              <a:buClrTx/>
+              <a:buSzTx/>
+              <a:buFont typeface="Arial"/>
+              <a:buChar char="•"/>
+              <a:tabLst/>
+              <a:defRPr/>
+            </a:pPr>
+            <a:r>
+              <a:rPr lang="en-US" sz="3200" baseline="0" dirty="0" smtClean="0">
+                <a:latin typeface="Georgia"/>
+                <a:cs typeface="Georgia"/>
+              </a:rPr>
+              <a:t>Evolve</a:t>
+            </a:r>
+            <a:r>
+              <a:rPr lang="en-US" sz="3200" dirty="0" smtClean="0">
+                <a:latin typeface="Georgia"/>
+                <a:cs typeface="Georgia"/>
+              </a:rPr>
+              <a:t> a program which generates random graphs on which your algorithm performs poorly</a:t>
+            </a:r>
+          </a:p>
+          <a:p>
+            <a:pPr marL="342900" marR="0" lvl="0" indent="-342900" algn="l" defTabSz="457200" rtl="0" eaLnBrk="1" fontAlgn="auto" latinLnBrk="0" hangingPunct="1">
+              <a:lnSpc>
+                <a:spcPct val="100000"/>
+              </a:lnSpc>
+              <a:spcBef>
+                <a:spcPct val="20000"/>
+              </a:spcBef>
+              <a:spcAft>
+                <a:spcPts val="0"/>
+              </a:spcAft>
+              <a:buClrTx/>
+              <a:buSzTx/>
+              <a:buFont typeface="Arial"/>
+              <a:buChar char="•"/>
+              <a:tabLst/>
+              <a:defRPr/>
+            </a:pPr>
+            <a:r>
+              <a:rPr lang="en-US" sz="3200" dirty="0" smtClean="0">
+                <a:latin typeface="Georgia"/>
+                <a:cs typeface="Georgia"/>
+              </a:rPr>
+              <a:t>Highlights the weaknesses of your algorithm</a:t>
+            </a:r>
+            <a:endParaRPr kumimoji="0" lang="en-US" sz="3200" b="0" i="0" u="none" strike="noStrike" kern="1200" cap="none" spc="0" normalizeH="0" baseline="0" noProof="0" dirty="0" smtClean="0">
+              <a:ln>
+                <a:noFill/>
+              </a:ln>
+              <a:solidFill>
+                <a:schemeClr val="tx1"/>
+              </a:solidFill>
+              <a:effectLst/>
+              <a:uLnTx/>
+              <a:uFillTx/>
+              <a:latin typeface="Georgia"/>
+              <a:ea typeface="+mn-ea"/>
+              <a:cs typeface="Georgia"/>
+            </a:endParaRPr>
+          </a:p>
+        </p:txBody>
+      </p:sp>
+    </p:spTree>
+    <p:extLst>
+      <p:ext uri="{BB962C8B-B14F-4D97-AF65-F5344CB8AC3E}">
+        <p14:creationId xmlns:p14="http://schemas.microsoft.com/office/powerpoint/2010/main" val="2169810312"/>
+      </p:ext>
+    </p:extLst>
+  </p:cSld>
+  <p:clrMapOvr>
+    <a:masterClrMapping/>
+  </p:clrMapOvr>
+  <p:timing>
+    <p:tnLst>
+      <p:par>
+        <p:cTn id="1" dur="indefinite" restart="never" nodeType="tmRoot"/>
+      </p:par>
+    </p:tnLst>
+  </p:timing>
+</p:sld>
+</file>
+
+<file path=ppt/slides/slide9.xml><?xml version="1.0" encoding="utf-8"?>
+<p:sld xmlns:a="http://schemas.openxmlformats.org/drawingml/2006/main" xmlns:r="http://schemas.openxmlformats.org/officeDocument/2006/relationships" xmlns:p="http://schemas.openxmlformats.org/presentationml/2006/main">
+  <p:cSld>
+    <p:spTree>
+      <p:nvGrpSpPr>
+        <p:cNvPr id="1" name=""/>
+        <p:cNvGrpSpPr/>
+        <p:nvPr/>
+      </p:nvGrpSpPr>
+      <p:grpSpPr>
+        <a:xfrm>
+          <a:off x="0" y="0"/>
+          <a:ext cx="0" cy="0"/>
+          <a:chOff x="0" y="0"/>
+          <a:chExt cx="0" cy="0"/>
+        </a:xfrm>
+      </p:grpSpPr>
+      <p:sp>
+        <p:nvSpPr>
+          <p:cNvPr id="2" name="Title 1"/>
+          <p:cNvSpPr>
+            <a:spLocks noGrp="1"/>
+          </p:cNvSpPr>
+          <p:nvPr>
+            <p:ph type="title"/>
+          </p:nvPr>
+        </p:nvSpPr>
+        <p:spPr/>
+        <p:txBody>
+          <a:bodyPr/>
+          <a:lstStyle/>
+          <a:p>
+            <a:r>
+              <a:rPr lang="en-US" dirty="0" smtClean="0"/>
+              <a:t>Click to </a:t>
+            </a:r>
+            <a:r>
+              <a:rPr lang="en-US" smtClean="0"/>
+              <a:t>add title</a:t>
+            </a:r>
+            <a:endParaRPr lang="en-US" dirty="0"/>
+          </a:p>
+        </p:txBody>
+      </p:sp>
+      <p:sp>
+        <p:nvSpPr>
+          <p:cNvPr id="5" name="Slide Number Placeholder 4"/>
+          <p:cNvSpPr>
+            <a:spLocks noGrp="1"/>
+          </p:cNvSpPr>
+          <p:nvPr>
+            <p:ph type="sldNum" sz="quarter" idx="11"/>
+          </p:nvPr>
+        </p:nvSpPr>
+        <p:spPr>
+          <a:xfrm>
+            <a:off x="6366508" y="6505575"/>
+            <a:ext cx="2320292" cy="365125"/>
+          </a:xfrm>
+        </p:spPr>
+        <p:txBody>
+          <a:bodyPr/>
+          <a:lstStyle/>
+          <a:p>
+            <a:fld id="{6189B349-B284-884E-BF58-0D68D479BD97}" type="slidenum">
+              <a:rPr lang="en-US" smtClean="0"/>
+              <a:pPr/>
+              <a:t>9</a:t>
             </a:fld>
             <a:endParaRPr lang="en-US" dirty="0"/>
           </a:p>
@@ -4598,6 +9037,11 @@
         </p:txBody>
       </p:sp>
     </p:spTree>
+    <p:extLst>
+      <p:ext uri="{BB962C8B-B14F-4D97-AF65-F5344CB8AC3E}">
+        <p14:creationId xmlns:p14="http://schemas.microsoft.com/office/powerpoint/2010/main" val="1328209255"/>
+      </p:ext>
+    </p:extLst>
   </p:cSld>
   <p:clrMapOvr>
     <a:masterClrMapping/>
@@ -4605,7 +9049,7 @@
   <p:timing>
     <p:tnLst>
       <p:par>
-        <p:cTn xmlns:p14="http://schemas.microsoft.com/office/powerpoint/2010/main" id="1" dur="indefinite" restart="never" nodeType="tmRoot"/>
+        <p:cTn id="1" dur="indefinite" restart="never" nodeType="tmRoot"/>
       </p:par>
     </p:tnLst>
   </p:timing>

</xml_diff>